<commit_message>
Added black and white master slide for printing
</commit_message>
<xml_diff>
--- a/templates/ftsrg-presentation.pptx
+++ b/templates/ftsrg-presentation.pptx
@@ -3,13 +3,14 @@
 <p:presentation xmlns:a="http://schemas.openxmlformats.org/drawingml/2006/main" xmlns:r="http://schemas.openxmlformats.org/officeDocument/2006/relationships" xmlns:p="http://schemas.openxmlformats.org/presentationml/2006/main" saveSubsetFonts="1" autoCompressPictures="0">
   <p:sldMasterIdLst>
     <p:sldMasterId id="2147483648" r:id="rId1"/>
+    <p:sldMasterId id="2147483655" r:id="rId2"/>
   </p:sldMasterIdLst>
   <p:notesMasterIdLst>
-    <p:notesMasterId r:id="rId4"/>
+    <p:notesMasterId r:id="rId5"/>
   </p:notesMasterIdLst>
   <p:sldIdLst>
-    <p:sldId id="304" r:id="rId2"/>
-    <p:sldId id="305" r:id="rId3"/>
+    <p:sldId id="304" r:id="rId3"/>
+    <p:sldId id="305" r:id="rId4"/>
   </p:sldIdLst>
   <p:sldSz cx="9144000" cy="6858000" type="screen4x3"/>
   <p:notesSz cx="6858000" cy="9144000"/>
@@ -220,7 +221,7 @@
             <a:fld id="{B9130191-0BE1-0142-AFC1-0297AE024A0E}" type="datetimeFigureOut">
               <a:rPr lang="en-US" smtClean="0"/>
               <a:pPr/>
-              <a:t>10/19/2014</a:t>
+              <a:t>10/30/2014</a:t>
             </a:fld>
             <a:endParaRPr lang="en-US"/>
           </a:p>
@@ -1100,6 +1101,501 @@
 </p:sldLayout>
 </file>
 
+<file path=ppt/slideLayouts/slideLayout10.xml><?xml version="1.0" encoding="utf-8"?>
+<p:sldLayout xmlns:a="http://schemas.openxmlformats.org/drawingml/2006/main" xmlns:r="http://schemas.openxmlformats.org/officeDocument/2006/relationships" xmlns:p="http://schemas.openxmlformats.org/presentationml/2006/main" type="twoObj" preserve="1">
+  <p:cSld name="2 tartalomrész">
+    <p:spTree>
+      <p:nvGrpSpPr>
+        <p:cNvPr id="1" name=""/>
+        <p:cNvGrpSpPr/>
+        <p:nvPr/>
+      </p:nvGrpSpPr>
+      <p:grpSpPr>
+        <a:xfrm>
+          <a:off x="0" y="0"/>
+          <a:ext cx="0" cy="0"/>
+          <a:chOff x="0" y="0"/>
+          <a:chExt cx="0" cy="0"/>
+        </a:xfrm>
+      </p:grpSpPr>
+      <p:sp>
+        <p:nvSpPr>
+          <p:cNvPr id="2" name="Cím 1"/>
+          <p:cNvSpPr>
+            <a:spLocks noGrp="1"/>
+          </p:cNvSpPr>
+          <p:nvPr>
+            <p:ph type="title"/>
+          </p:nvPr>
+        </p:nvSpPr>
+        <p:spPr/>
+        <p:txBody>
+          <a:bodyPr/>
+          <a:lstStyle/>
+          <a:p>
+            <a:r>
+              <a:rPr lang="hu-HU" smtClean="0"/>
+              <a:t>Mintacím szerkesztése</a:t>
+            </a:r>
+            <a:endParaRPr lang="hu-HU"/>
+          </a:p>
+        </p:txBody>
+      </p:sp>
+      <p:sp>
+        <p:nvSpPr>
+          <p:cNvPr id="3" name="Tartalom helye 2"/>
+          <p:cNvSpPr>
+            <a:spLocks noGrp="1"/>
+          </p:cNvSpPr>
+          <p:nvPr>
+            <p:ph sz="half" idx="1"/>
+          </p:nvPr>
+        </p:nvSpPr>
+        <p:spPr>
+          <a:xfrm>
+            <a:off x="117414" y="836578"/>
+            <a:ext cx="4378386" cy="5513462"/>
+          </a:xfrm>
+        </p:spPr>
+        <p:txBody>
+          <a:bodyPr/>
+          <a:lstStyle>
+            <a:lvl1pPr>
+              <a:defRPr sz="2800"/>
+            </a:lvl1pPr>
+            <a:lvl2pPr>
+              <a:defRPr sz="2400"/>
+            </a:lvl2pPr>
+            <a:lvl3pPr>
+              <a:defRPr sz="2000"/>
+            </a:lvl3pPr>
+            <a:lvl4pPr>
+              <a:defRPr sz="1800"/>
+            </a:lvl4pPr>
+            <a:lvl5pPr>
+              <a:defRPr sz="1800"/>
+            </a:lvl5pPr>
+            <a:lvl6pPr>
+              <a:defRPr sz="1800"/>
+            </a:lvl6pPr>
+            <a:lvl7pPr>
+              <a:defRPr sz="1800"/>
+            </a:lvl7pPr>
+            <a:lvl8pPr>
+              <a:defRPr sz="1800"/>
+            </a:lvl8pPr>
+            <a:lvl9pPr>
+              <a:defRPr sz="1800"/>
+            </a:lvl9pPr>
+          </a:lstStyle>
+          <a:p>
+            <a:pPr lvl="0"/>
+            <a:r>
+              <a:rPr lang="hu-HU" smtClean="0"/>
+              <a:t>Mintaszöveg szerkesztése</a:t>
+            </a:r>
+          </a:p>
+          <a:p>
+            <a:pPr lvl="1"/>
+            <a:r>
+              <a:rPr lang="hu-HU" smtClean="0"/>
+              <a:t>Második szint</a:t>
+            </a:r>
+          </a:p>
+          <a:p>
+            <a:pPr lvl="2"/>
+            <a:r>
+              <a:rPr lang="hu-HU" smtClean="0"/>
+              <a:t>Harmadik szint</a:t>
+            </a:r>
+          </a:p>
+          <a:p>
+            <a:pPr lvl="3"/>
+            <a:r>
+              <a:rPr lang="hu-HU" smtClean="0"/>
+              <a:t>Negyedik szint</a:t>
+            </a:r>
+          </a:p>
+          <a:p>
+            <a:pPr lvl="4"/>
+            <a:r>
+              <a:rPr lang="hu-HU" smtClean="0"/>
+              <a:t>Ötödik szint</a:t>
+            </a:r>
+            <a:endParaRPr lang="hu-HU" dirty="0"/>
+          </a:p>
+        </p:txBody>
+      </p:sp>
+      <p:sp>
+        <p:nvSpPr>
+          <p:cNvPr id="4" name="Tartalom helye 3"/>
+          <p:cNvSpPr>
+            <a:spLocks noGrp="1"/>
+          </p:cNvSpPr>
+          <p:nvPr>
+            <p:ph sz="half" idx="2"/>
+          </p:nvPr>
+        </p:nvSpPr>
+        <p:spPr>
+          <a:xfrm>
+            <a:off x="4648199" y="836577"/>
+            <a:ext cx="4341873" cy="5513463"/>
+          </a:xfrm>
+        </p:spPr>
+        <p:txBody>
+          <a:bodyPr/>
+          <a:lstStyle>
+            <a:lvl1pPr>
+              <a:defRPr sz="2800"/>
+            </a:lvl1pPr>
+            <a:lvl2pPr>
+              <a:defRPr sz="2400"/>
+            </a:lvl2pPr>
+            <a:lvl3pPr>
+              <a:defRPr sz="2000"/>
+            </a:lvl3pPr>
+            <a:lvl4pPr>
+              <a:defRPr sz="1800"/>
+            </a:lvl4pPr>
+            <a:lvl5pPr>
+              <a:defRPr sz="1800"/>
+            </a:lvl5pPr>
+            <a:lvl6pPr>
+              <a:defRPr sz="1800"/>
+            </a:lvl6pPr>
+            <a:lvl7pPr>
+              <a:defRPr sz="1800"/>
+            </a:lvl7pPr>
+            <a:lvl8pPr>
+              <a:defRPr sz="1800"/>
+            </a:lvl8pPr>
+            <a:lvl9pPr>
+              <a:defRPr sz="1800"/>
+            </a:lvl9pPr>
+          </a:lstStyle>
+          <a:p>
+            <a:pPr lvl="0"/>
+            <a:r>
+              <a:rPr lang="hu-HU" smtClean="0"/>
+              <a:t>Mintaszöveg szerkesztése</a:t>
+            </a:r>
+          </a:p>
+          <a:p>
+            <a:pPr lvl="1"/>
+            <a:r>
+              <a:rPr lang="hu-HU" smtClean="0"/>
+              <a:t>Második szint</a:t>
+            </a:r>
+          </a:p>
+          <a:p>
+            <a:pPr lvl="2"/>
+            <a:r>
+              <a:rPr lang="hu-HU" smtClean="0"/>
+              <a:t>Harmadik szint</a:t>
+            </a:r>
+          </a:p>
+          <a:p>
+            <a:pPr lvl="3"/>
+            <a:r>
+              <a:rPr lang="hu-HU" smtClean="0"/>
+              <a:t>Negyedik szint</a:t>
+            </a:r>
+          </a:p>
+          <a:p>
+            <a:pPr lvl="4"/>
+            <a:r>
+              <a:rPr lang="hu-HU" smtClean="0"/>
+              <a:t>Ötödik szint</a:t>
+            </a:r>
+            <a:endParaRPr lang="hu-HU"/>
+          </a:p>
+        </p:txBody>
+      </p:sp>
+    </p:spTree>
+    <p:extLst>
+      <p:ext uri="{BB962C8B-B14F-4D97-AF65-F5344CB8AC3E}">
+        <p14:creationId xmlns:p14="http://schemas.microsoft.com/office/powerpoint/2010/main" val="2730459887"/>
+      </p:ext>
+    </p:extLst>
+  </p:cSld>
+  <p:clrMapOvr>
+    <a:masterClrMapping/>
+  </p:clrMapOvr>
+  <p:timing>
+    <p:tnLst>
+      <p:par>
+        <p:cTn id="1" dur="indefinite" restart="never" nodeType="tmRoot"/>
+      </p:par>
+    </p:tnLst>
+  </p:timing>
+</p:sldLayout>
+</file>
+
+<file path=ppt/slideLayouts/slideLayout11.xml><?xml version="1.0" encoding="utf-8"?>
+<p:sldLayout xmlns:a="http://schemas.openxmlformats.org/drawingml/2006/main" xmlns:r="http://schemas.openxmlformats.org/officeDocument/2006/relationships" xmlns:p="http://schemas.openxmlformats.org/presentationml/2006/main" type="blank" preserve="1">
+  <p:cSld name="Üres">
+    <p:spTree>
+      <p:nvGrpSpPr>
+        <p:cNvPr id="1" name=""/>
+        <p:cNvGrpSpPr/>
+        <p:nvPr/>
+      </p:nvGrpSpPr>
+      <p:grpSpPr>
+        <a:xfrm>
+          <a:off x="0" y="0"/>
+          <a:ext cx="0" cy="0"/>
+          <a:chOff x="0" y="0"/>
+          <a:chExt cx="0" cy="0"/>
+        </a:xfrm>
+      </p:grpSpPr>
+    </p:spTree>
+    <p:extLst>
+      <p:ext uri="{BB962C8B-B14F-4D97-AF65-F5344CB8AC3E}">
+        <p14:creationId xmlns:p14="http://schemas.microsoft.com/office/powerpoint/2010/main" val="2402234298"/>
+      </p:ext>
+    </p:extLst>
+  </p:cSld>
+  <p:clrMapOvr>
+    <a:masterClrMapping/>
+  </p:clrMapOvr>
+  <p:timing>
+    <p:tnLst>
+      <p:par>
+        <p:cTn id="1" dur="indefinite" restart="never" nodeType="tmRoot"/>
+      </p:par>
+    </p:tnLst>
+  </p:timing>
+</p:sldLayout>
+</file>
+
+<file path=ppt/slideLayouts/slideLayout12.xml><?xml version="1.0" encoding="utf-8"?>
+<p:sldLayout xmlns:a="http://schemas.openxmlformats.org/drawingml/2006/main" xmlns:r="http://schemas.openxmlformats.org/officeDocument/2006/relationships" xmlns:p="http://schemas.openxmlformats.org/presentationml/2006/main" type="objTx" preserve="1">
+  <p:cSld name="DEMO">
+    <p:spTree>
+      <p:nvGrpSpPr>
+        <p:cNvPr id="1" name=""/>
+        <p:cNvGrpSpPr/>
+        <p:nvPr/>
+      </p:nvGrpSpPr>
+      <p:grpSpPr>
+        <a:xfrm>
+          <a:off x="0" y="0"/>
+          <a:ext cx="0" cy="0"/>
+          <a:chOff x="0" y="0"/>
+          <a:chExt cx="0" cy="0"/>
+        </a:xfrm>
+      </p:grpSpPr>
+      <p:sp>
+        <p:nvSpPr>
+          <p:cNvPr id="2" name="Cím 1"/>
+          <p:cNvSpPr>
+            <a:spLocks noGrp="1"/>
+          </p:cNvSpPr>
+          <p:nvPr>
+            <p:ph type="title"/>
+          </p:nvPr>
+        </p:nvSpPr>
+        <p:spPr>
+          <a:xfrm>
+            <a:off x="117414" y="142830"/>
+            <a:ext cx="1668429" cy="720000"/>
+          </a:xfrm>
+        </p:spPr>
+        <p:txBody>
+          <a:bodyPr>
+            <a:noAutofit/>
+          </a:bodyPr>
+          <a:lstStyle>
+            <a:lvl1pPr algn="l">
+              <a:defRPr sz="4000" b="1"/>
+            </a:lvl1pPr>
+          </a:lstStyle>
+          <a:p>
+            <a:r>
+              <a:rPr lang="hu-HU" smtClean="0"/>
+              <a:t>Mintacím szerkesztése</a:t>
+            </a:r>
+            <a:endParaRPr lang="hu-HU" dirty="0"/>
+          </a:p>
+        </p:txBody>
+      </p:sp>
+      <p:sp>
+        <p:nvSpPr>
+          <p:cNvPr id="3" name="Tartalom helye 2"/>
+          <p:cNvSpPr>
+            <a:spLocks noGrp="1"/>
+          </p:cNvSpPr>
+          <p:nvPr>
+            <p:ph idx="1"/>
+          </p:nvPr>
+        </p:nvSpPr>
+        <p:spPr>
+          <a:xfrm>
+            <a:off x="117413" y="1019142"/>
+            <a:ext cx="8872659" cy="5367411"/>
+          </a:xfrm>
+        </p:spPr>
+        <p:txBody>
+          <a:bodyPr/>
+          <a:lstStyle>
+            <a:lvl1pPr>
+              <a:defRPr sz="3200"/>
+            </a:lvl1pPr>
+            <a:lvl2pPr>
+              <a:defRPr sz="2800"/>
+            </a:lvl2pPr>
+            <a:lvl3pPr>
+              <a:defRPr sz="2400"/>
+            </a:lvl3pPr>
+            <a:lvl4pPr>
+              <a:defRPr sz="2000"/>
+            </a:lvl4pPr>
+            <a:lvl5pPr>
+              <a:defRPr sz="2000"/>
+            </a:lvl5pPr>
+            <a:lvl6pPr>
+              <a:defRPr sz="2000"/>
+            </a:lvl6pPr>
+            <a:lvl7pPr>
+              <a:defRPr sz="2000"/>
+            </a:lvl7pPr>
+            <a:lvl8pPr>
+              <a:defRPr sz="2000"/>
+            </a:lvl8pPr>
+            <a:lvl9pPr>
+              <a:defRPr sz="2000"/>
+            </a:lvl9pPr>
+          </a:lstStyle>
+          <a:p>
+            <a:pPr lvl="0"/>
+            <a:r>
+              <a:rPr lang="hu-HU" smtClean="0"/>
+              <a:t>Mintaszöveg szerkesztése</a:t>
+            </a:r>
+          </a:p>
+          <a:p>
+            <a:pPr lvl="1"/>
+            <a:r>
+              <a:rPr lang="hu-HU" smtClean="0"/>
+              <a:t>Második szint</a:t>
+            </a:r>
+          </a:p>
+          <a:p>
+            <a:pPr lvl="2"/>
+            <a:r>
+              <a:rPr lang="hu-HU" smtClean="0"/>
+              <a:t>Harmadik szint</a:t>
+            </a:r>
+          </a:p>
+          <a:p>
+            <a:pPr lvl="3"/>
+            <a:r>
+              <a:rPr lang="hu-HU" smtClean="0"/>
+              <a:t>Negyedik szint</a:t>
+            </a:r>
+          </a:p>
+          <a:p>
+            <a:pPr lvl="4"/>
+            <a:r>
+              <a:rPr lang="hu-HU" smtClean="0"/>
+              <a:t>Ötödik szint</a:t>
+            </a:r>
+            <a:endParaRPr lang="hu-HU"/>
+          </a:p>
+        </p:txBody>
+      </p:sp>
+      <p:sp>
+        <p:nvSpPr>
+          <p:cNvPr id="4" name="Szöveg helye 3"/>
+          <p:cNvSpPr>
+            <a:spLocks noGrp="1"/>
+          </p:cNvSpPr>
+          <p:nvPr>
+            <p:ph type="body" sz="half" idx="2"/>
+          </p:nvPr>
+        </p:nvSpPr>
+        <p:spPr>
+          <a:xfrm>
+            <a:off x="1782765" y="142830"/>
+            <a:ext cx="7207308" cy="720000"/>
+          </a:xfrm>
+          <a:ln>
+            <a:solidFill>
+              <a:srgbClr val="000000"/>
+            </a:solidFill>
+          </a:ln>
+        </p:spPr>
+        <p:txBody>
+          <a:bodyPr anchor="ctr">
+            <a:noAutofit/>
+          </a:bodyPr>
+          <a:lstStyle>
+            <a:lvl1pPr marL="0" indent="0">
+              <a:buNone/>
+              <a:defRPr sz="4000"/>
+            </a:lvl1pPr>
+            <a:lvl2pPr marL="457200" indent="0">
+              <a:buNone/>
+              <a:defRPr sz="1200"/>
+            </a:lvl2pPr>
+            <a:lvl3pPr marL="914400" indent="0">
+              <a:buNone/>
+              <a:defRPr sz="1000"/>
+            </a:lvl3pPr>
+            <a:lvl4pPr marL="1371600" indent="0">
+              <a:buNone/>
+              <a:defRPr sz="900"/>
+            </a:lvl4pPr>
+            <a:lvl5pPr marL="1828800" indent="0">
+              <a:buNone/>
+              <a:defRPr sz="900"/>
+            </a:lvl5pPr>
+            <a:lvl6pPr marL="2286000" indent="0">
+              <a:buNone/>
+              <a:defRPr sz="900"/>
+            </a:lvl6pPr>
+            <a:lvl7pPr marL="2743200" indent="0">
+              <a:buNone/>
+              <a:defRPr sz="900"/>
+            </a:lvl7pPr>
+            <a:lvl8pPr marL="3200400" indent="0">
+              <a:buNone/>
+              <a:defRPr sz="900"/>
+            </a:lvl8pPr>
+            <a:lvl9pPr marL="3657600" indent="0">
+              <a:buNone/>
+              <a:defRPr sz="900"/>
+            </a:lvl9pPr>
+          </a:lstStyle>
+          <a:p>
+            <a:pPr lvl="0"/>
+            <a:r>
+              <a:rPr lang="hu-HU" smtClean="0"/>
+              <a:t>Mintaszöveg szerkesztése</a:t>
+            </a:r>
+          </a:p>
+        </p:txBody>
+      </p:sp>
+    </p:spTree>
+    <p:extLst>
+      <p:ext uri="{BB962C8B-B14F-4D97-AF65-F5344CB8AC3E}">
+        <p14:creationId xmlns:p14="http://schemas.microsoft.com/office/powerpoint/2010/main" val="2506634814"/>
+      </p:ext>
+    </p:extLst>
+  </p:cSld>
+  <p:clrMapOvr>
+    <a:masterClrMapping/>
+  </p:clrMapOvr>
+  <p:timing>
+    <p:tnLst>
+      <p:par>
+        <p:cTn id="1" dur="indefinite" restart="never" nodeType="tmRoot"/>
+      </p:par>
+    </p:tnLst>
+  </p:timing>
+</p:sldLayout>
+</file>
+
 <file path=ppt/slideLayouts/slideLayout2.xml><?xml version="1.0" encoding="utf-8"?>
 <p:sldLayout xmlns:a="http://schemas.openxmlformats.org/drawingml/2006/main" xmlns:r="http://schemas.openxmlformats.org/officeDocument/2006/relationships" xmlns:p="http://schemas.openxmlformats.org/presentationml/2006/main" type="obj" preserve="1">
   <p:cSld name="Cím és tartalom">
@@ -1881,6 +2377,850 @@
 </p:sldLayout>
 </file>
 
+<file path=ppt/slideLayouts/slideLayout7.xml><?xml version="1.0" encoding="utf-8"?>
+<p:sldLayout xmlns:a="http://schemas.openxmlformats.org/drawingml/2006/main" xmlns:r="http://schemas.openxmlformats.org/officeDocument/2006/relationships" xmlns:p="http://schemas.openxmlformats.org/presentationml/2006/main" type="title" preserve="1">
+  <p:cSld name="Címdia">
+    <p:spTree>
+      <p:nvGrpSpPr>
+        <p:cNvPr id="1" name=""/>
+        <p:cNvGrpSpPr/>
+        <p:nvPr/>
+      </p:nvGrpSpPr>
+      <p:grpSpPr>
+        <a:xfrm>
+          <a:off x="0" y="0"/>
+          <a:ext cx="0" cy="0"/>
+          <a:chOff x="0" y="0"/>
+          <a:chExt cx="0" cy="0"/>
+        </a:xfrm>
+      </p:grpSpPr>
+      <p:sp>
+        <p:nvSpPr>
+          <p:cNvPr id="4" name="Rectangle 9"/>
+          <p:cNvSpPr>
+            <a:spLocks noChangeArrowheads="1"/>
+          </p:cNvSpPr>
+          <p:nvPr/>
+        </p:nvSpPr>
+        <p:spPr bwMode="auto">
+          <a:xfrm>
+            <a:off x="0" y="6356350"/>
+            <a:ext cx="9144000" cy="501650"/>
+          </a:xfrm>
+          <a:prstGeom prst="rect">
+            <a:avLst/>
+          </a:prstGeom>
+          <a:solidFill>
+            <a:schemeClr val="bg1"/>
+          </a:solidFill>
+          <a:ln w="12700">
+            <a:solidFill>
+              <a:schemeClr val="tx1"/>
+            </a:solidFill>
+            <a:miter lim="800000"/>
+            <a:headEnd/>
+            <a:tailEnd/>
+          </a:ln>
+          <a:effectLst/>
+        </p:spPr>
+        <p:txBody>
+          <a:bodyPr wrap="none" anchor="ctr"/>
+          <a:lstStyle/>
+          <a:p>
+            <a:pPr fontAlgn="auto">
+              <a:spcBef>
+                <a:spcPts val="0"/>
+              </a:spcBef>
+              <a:spcAft>
+                <a:spcPts val="0"/>
+              </a:spcAft>
+              <a:defRPr/>
+            </a:pPr>
+            <a:endParaRPr lang="hu-HU">
+              <a:latin typeface="+mn-lt"/>
+              <a:cs typeface="+mn-cs"/>
+            </a:endParaRPr>
+          </a:p>
+        </p:txBody>
+      </p:sp>
+      <p:sp>
+        <p:nvSpPr>
+          <p:cNvPr id="5" name="Text Box 10"/>
+          <p:cNvSpPr txBox="1">
+            <a:spLocks noChangeArrowheads="1"/>
+          </p:cNvSpPr>
+          <p:nvPr/>
+        </p:nvSpPr>
+        <p:spPr bwMode="auto">
+          <a:xfrm>
+            <a:off x="-17463" y="6413500"/>
+            <a:ext cx="3649663" cy="400110"/>
+          </a:xfrm>
+          <a:prstGeom prst="rect">
+            <a:avLst/>
+          </a:prstGeom>
+          <a:noFill/>
+          <a:ln w="12700" algn="ctr">
+            <a:noFill/>
+            <a:miter lim="800000"/>
+            <a:headEnd/>
+            <a:tailEnd/>
+          </a:ln>
+          <a:effectLst/>
+        </p:spPr>
+        <p:txBody>
+          <a:bodyPr>
+            <a:spAutoFit/>
+          </a:bodyPr>
+          <a:lstStyle/>
+          <a:p>
+            <a:pPr defTabSz="762000" fontAlgn="auto">
+              <a:spcBef>
+                <a:spcPts val="0"/>
+              </a:spcBef>
+              <a:spcAft>
+                <a:spcPts val="0"/>
+              </a:spcAft>
+              <a:defRPr/>
+            </a:pPr>
+            <a:r>
+              <a:rPr lang="en-US" sz="1000" b="1" dirty="0" smtClean="0">
+                <a:solidFill>
+                  <a:schemeClr val="tx1"/>
+                </a:solidFill>
+                <a:latin typeface="+mn-lt"/>
+                <a:cs typeface="+mn-cs"/>
+              </a:rPr>
+              <a:t>Budapest University of Technology and Economics</a:t>
+            </a:r>
+            <a:r>
+              <a:rPr lang="hu-HU" sz="1000" b="1" dirty="0" smtClean="0">
+                <a:solidFill>
+                  <a:schemeClr val="tx1"/>
+                </a:solidFill>
+                <a:latin typeface="+mn-lt"/>
+                <a:cs typeface="+mn-cs"/>
+              </a:rPr>
+              <a:t/>
+            </a:r>
+            <a:br>
+              <a:rPr lang="hu-HU" sz="1000" b="1" dirty="0" smtClean="0">
+                <a:solidFill>
+                  <a:schemeClr val="tx1"/>
+                </a:solidFill>
+                <a:latin typeface="+mn-lt"/>
+                <a:cs typeface="+mn-cs"/>
+              </a:rPr>
+            </a:br>
+            <a:r>
+              <a:rPr lang="en-US" sz="1000" b="1" dirty="0" smtClean="0">
+                <a:solidFill>
+                  <a:schemeClr val="tx1"/>
+                </a:solidFill>
+                <a:latin typeface="+mn-lt"/>
+                <a:cs typeface="+mn-cs"/>
+              </a:rPr>
+              <a:t>Department of Measurement and Information Systems</a:t>
+            </a:r>
+            <a:endParaRPr lang="en-US" sz="1000" b="1" dirty="0">
+              <a:solidFill>
+                <a:schemeClr val="tx1"/>
+              </a:solidFill>
+              <a:latin typeface="+mn-lt"/>
+              <a:cs typeface="+mn-cs"/>
+            </a:endParaRPr>
+          </a:p>
+        </p:txBody>
+      </p:sp>
+      <p:sp>
+        <p:nvSpPr>
+          <p:cNvPr id="8" name="Rectangle 20"/>
+          <p:cNvSpPr>
+            <a:spLocks noChangeArrowheads="1"/>
+          </p:cNvSpPr>
+          <p:nvPr/>
+        </p:nvSpPr>
+        <p:spPr bwMode="auto">
+          <a:xfrm>
+            <a:off x="0" y="0"/>
+            <a:ext cx="9144000" cy="501650"/>
+          </a:xfrm>
+          <a:prstGeom prst="rect">
+            <a:avLst/>
+          </a:prstGeom>
+          <a:noFill/>
+          <a:ln w="12700">
+            <a:solidFill>
+              <a:schemeClr val="tx1"/>
+            </a:solidFill>
+            <a:miter lim="800000"/>
+            <a:headEnd/>
+            <a:tailEnd/>
+          </a:ln>
+          <a:effectLst/>
+        </p:spPr>
+        <p:txBody>
+          <a:bodyPr wrap="none" anchor="ctr"/>
+          <a:lstStyle/>
+          <a:p>
+            <a:pPr fontAlgn="auto">
+              <a:spcBef>
+                <a:spcPts val="0"/>
+              </a:spcBef>
+              <a:spcAft>
+                <a:spcPts val="0"/>
+              </a:spcAft>
+              <a:defRPr/>
+            </a:pPr>
+            <a:endParaRPr lang="hu-HU">
+              <a:latin typeface="+mn-lt"/>
+              <a:cs typeface="+mn-cs"/>
+            </a:endParaRPr>
+          </a:p>
+        </p:txBody>
+      </p:sp>
+      <p:sp>
+        <p:nvSpPr>
+          <p:cNvPr id="2" name="Cím 1"/>
+          <p:cNvSpPr>
+            <a:spLocks noGrp="1"/>
+          </p:cNvSpPr>
+          <p:nvPr>
+            <p:ph type="ctrTitle"/>
+          </p:nvPr>
+        </p:nvSpPr>
+        <p:spPr>
+          <a:xfrm>
+            <a:off x="685800" y="1374767"/>
+            <a:ext cx="7772400" cy="1470025"/>
+          </a:xfrm>
+        </p:spPr>
+        <p:txBody>
+          <a:bodyPr/>
+          <a:lstStyle/>
+          <a:p>
+            <a:r>
+              <a:rPr lang="hu-HU" smtClean="0"/>
+              <a:t>Mintacím szerkesztése</a:t>
+            </a:r>
+            <a:endParaRPr lang="hu-HU" dirty="0"/>
+          </a:p>
+        </p:txBody>
+      </p:sp>
+      <p:sp>
+        <p:nvSpPr>
+          <p:cNvPr id="3" name="Alcím 2"/>
+          <p:cNvSpPr>
+            <a:spLocks noGrp="1"/>
+          </p:cNvSpPr>
+          <p:nvPr>
+            <p:ph type="subTitle" idx="1"/>
+          </p:nvPr>
+        </p:nvSpPr>
+        <p:spPr>
+          <a:xfrm>
+            <a:off x="1371600" y="3246435"/>
+            <a:ext cx="6400800" cy="1277955"/>
+          </a:xfrm>
+        </p:spPr>
+        <p:txBody>
+          <a:bodyPr/>
+          <a:lstStyle>
+            <a:lvl1pPr marL="0" indent="0" algn="ctr">
+              <a:buNone/>
+              <a:defRPr>
+                <a:solidFill>
+                  <a:schemeClr val="tx1"/>
+                </a:solidFill>
+              </a:defRPr>
+            </a:lvl1pPr>
+            <a:lvl2pPr marL="457200" indent="0" algn="ctr">
+              <a:buNone/>
+              <a:defRPr>
+                <a:solidFill>
+                  <a:schemeClr val="tx1">
+                    <a:tint val="75000"/>
+                  </a:schemeClr>
+                </a:solidFill>
+              </a:defRPr>
+            </a:lvl2pPr>
+            <a:lvl3pPr marL="914400" indent="0" algn="ctr">
+              <a:buNone/>
+              <a:defRPr>
+                <a:solidFill>
+                  <a:schemeClr val="tx1">
+                    <a:tint val="75000"/>
+                  </a:schemeClr>
+                </a:solidFill>
+              </a:defRPr>
+            </a:lvl3pPr>
+            <a:lvl4pPr marL="1371600" indent="0" algn="ctr">
+              <a:buNone/>
+              <a:defRPr>
+                <a:solidFill>
+                  <a:schemeClr val="tx1">
+                    <a:tint val="75000"/>
+                  </a:schemeClr>
+                </a:solidFill>
+              </a:defRPr>
+            </a:lvl4pPr>
+            <a:lvl5pPr marL="1828800" indent="0" algn="ctr">
+              <a:buNone/>
+              <a:defRPr>
+                <a:solidFill>
+                  <a:schemeClr val="tx1">
+                    <a:tint val="75000"/>
+                  </a:schemeClr>
+                </a:solidFill>
+              </a:defRPr>
+            </a:lvl5pPr>
+            <a:lvl6pPr marL="2286000" indent="0" algn="ctr">
+              <a:buNone/>
+              <a:defRPr>
+                <a:solidFill>
+                  <a:schemeClr val="tx1">
+                    <a:tint val="75000"/>
+                  </a:schemeClr>
+                </a:solidFill>
+              </a:defRPr>
+            </a:lvl6pPr>
+            <a:lvl7pPr marL="2743200" indent="0" algn="ctr">
+              <a:buNone/>
+              <a:defRPr>
+                <a:solidFill>
+                  <a:schemeClr val="tx1">
+                    <a:tint val="75000"/>
+                  </a:schemeClr>
+                </a:solidFill>
+              </a:defRPr>
+            </a:lvl7pPr>
+            <a:lvl8pPr marL="3200400" indent="0" algn="ctr">
+              <a:buNone/>
+              <a:defRPr>
+                <a:solidFill>
+                  <a:schemeClr val="tx1">
+                    <a:tint val="75000"/>
+                  </a:schemeClr>
+                </a:solidFill>
+              </a:defRPr>
+            </a:lvl8pPr>
+            <a:lvl9pPr marL="3657600" indent="0" algn="ctr">
+              <a:buNone/>
+              <a:defRPr>
+                <a:solidFill>
+                  <a:schemeClr val="tx1">
+                    <a:tint val="75000"/>
+                  </a:schemeClr>
+                </a:solidFill>
+              </a:defRPr>
+            </a:lvl9pPr>
+          </a:lstStyle>
+          <a:p>
+            <a:r>
+              <a:rPr lang="hu-HU" smtClean="0"/>
+              <a:t>Alcím mintájának szerkesztése</a:t>
+            </a:r>
+            <a:endParaRPr lang="hu-HU" dirty="0"/>
+          </a:p>
+        </p:txBody>
+      </p:sp>
+      <p:sp>
+        <p:nvSpPr>
+          <p:cNvPr id="10" name="Text Box 10"/>
+          <p:cNvSpPr txBox="1">
+            <a:spLocks noChangeArrowheads="1"/>
+          </p:cNvSpPr>
+          <p:nvPr userDrawn="1"/>
+        </p:nvSpPr>
+        <p:spPr bwMode="auto">
+          <a:xfrm>
+            <a:off x="1000125" y="4725145"/>
+            <a:ext cx="7143750" cy="830997"/>
+          </a:xfrm>
+          <a:prstGeom prst="rect">
+            <a:avLst/>
+          </a:prstGeom>
+          <a:noFill/>
+          <a:ln w="12700" algn="ctr">
+            <a:noFill/>
+            <a:miter lim="800000"/>
+            <a:headEnd/>
+            <a:tailEnd/>
+          </a:ln>
+          <a:effectLst/>
+        </p:spPr>
+        <p:txBody>
+          <a:bodyPr wrap="square">
+            <a:spAutoFit/>
+          </a:bodyPr>
+          <a:lstStyle/>
+          <a:p>
+            <a:pPr algn="ctr" defTabSz="762000" fontAlgn="auto">
+              <a:spcBef>
+                <a:spcPts val="0"/>
+              </a:spcBef>
+              <a:spcAft>
+                <a:spcPts val="0"/>
+              </a:spcAft>
+              <a:defRPr/>
+            </a:pPr>
+            <a:r>
+              <a:rPr lang="hu-HU" sz="2400" b="1" dirty="0">
+                <a:latin typeface="+mn-lt"/>
+                <a:cs typeface="+mn-cs"/>
+              </a:rPr>
+              <a:t>Budapest University of </a:t>
+            </a:r>
+            <a:r>
+              <a:rPr lang="en-US" sz="2400" b="1" dirty="0">
+                <a:latin typeface="+mn-lt"/>
+                <a:cs typeface="+mn-cs"/>
+              </a:rPr>
+              <a:t>Technology</a:t>
+            </a:r>
+            <a:r>
+              <a:rPr lang="hu-HU" sz="2400" b="1" dirty="0">
+                <a:latin typeface="+mn-lt"/>
+                <a:cs typeface="+mn-cs"/>
+              </a:rPr>
+              <a:t> and </a:t>
+            </a:r>
+            <a:r>
+              <a:rPr lang="en-US" sz="2400" b="1" dirty="0" smtClean="0">
+                <a:latin typeface="+mn-lt"/>
+                <a:cs typeface="+mn-cs"/>
+              </a:rPr>
+              <a:t>Economics</a:t>
+            </a:r>
+            <a:r>
+              <a:rPr lang="hu-HU" sz="2400" b="1" dirty="0" smtClean="0">
+                <a:latin typeface="+mn-lt"/>
+                <a:cs typeface="+mn-cs"/>
+              </a:rPr>
+              <a:t/>
+            </a:r>
+            <a:br>
+              <a:rPr lang="hu-HU" sz="2400" b="1" dirty="0" smtClean="0">
+                <a:latin typeface="+mn-lt"/>
+                <a:cs typeface="+mn-cs"/>
+              </a:rPr>
+            </a:br>
+            <a:r>
+              <a:rPr lang="hu-HU" sz="2400" b="1" dirty="0" smtClean="0">
+                <a:latin typeface="+mn-lt"/>
+                <a:cs typeface="+mn-cs"/>
+              </a:rPr>
+              <a:t>Fault</a:t>
+            </a:r>
+            <a:r>
+              <a:rPr lang="hu-HU" sz="2400" b="1" baseline="0" dirty="0" smtClean="0">
+                <a:latin typeface="+mn-lt"/>
+                <a:cs typeface="+mn-cs"/>
+              </a:rPr>
+              <a:t> Tolerant Systems Research Group</a:t>
+            </a:r>
+            <a:endParaRPr lang="en-US" sz="2400" b="1" dirty="0">
+              <a:latin typeface="+mn-lt"/>
+              <a:cs typeface="+mn-cs"/>
+            </a:endParaRPr>
+          </a:p>
+        </p:txBody>
+      </p:sp>
+      <p:pic>
+        <p:nvPicPr>
+          <p:cNvPr id="13" name="Kép 12"/>
+          <p:cNvPicPr>
+            <a:picLocks noChangeAspect="1"/>
+          </p:cNvPicPr>
+          <p:nvPr userDrawn="1"/>
+        </p:nvPicPr>
+        <p:blipFill>
+          <a:blip r:embed="rId2">
+            <a:extLst>
+              <a:ext uri="{28A0092B-C50C-407E-A947-70E740481C1C}">
+                <a14:useLocalDpi xmlns:a14="http://schemas.microsoft.com/office/drawing/2010/main" val="0"/>
+              </a:ext>
+            </a:extLst>
+          </a:blip>
+          <a:stretch>
+            <a:fillRect/>
+          </a:stretch>
+        </p:blipFill>
+        <p:spPr>
+          <a:xfrm>
+            <a:off x="7506891" y="6380679"/>
+            <a:ext cx="1598400" cy="428173"/>
+          </a:xfrm>
+          <a:prstGeom prst="rect">
+            <a:avLst/>
+          </a:prstGeom>
+        </p:spPr>
+      </p:pic>
+      <p:pic>
+        <p:nvPicPr>
+          <p:cNvPr id="18" name="Kép 17"/>
+          <p:cNvPicPr>
+            <a:picLocks noChangeAspect="1"/>
+          </p:cNvPicPr>
+          <p:nvPr userDrawn="1"/>
+        </p:nvPicPr>
+        <p:blipFill>
+          <a:blip r:embed="rId3">
+            <a:extLst>
+              <a:ext uri="{28A0092B-C50C-407E-A947-70E740481C1C}">
+                <a14:useLocalDpi xmlns:a14="http://schemas.microsoft.com/office/drawing/2010/main" val="0"/>
+              </a:ext>
+            </a:extLst>
+          </a:blip>
+          <a:stretch>
+            <a:fillRect/>
+          </a:stretch>
+        </p:blipFill>
+        <p:spPr>
+          <a:xfrm>
+            <a:off x="3576997" y="5572835"/>
+            <a:ext cx="1890000" cy="632812"/>
+          </a:xfrm>
+          <a:prstGeom prst="rect">
+            <a:avLst/>
+          </a:prstGeom>
+          <a:noFill/>
+          <a:ln>
+            <a:noFill/>
+          </a:ln>
+        </p:spPr>
+      </p:pic>
+    </p:spTree>
+    <p:extLst>
+      <p:ext uri="{BB962C8B-B14F-4D97-AF65-F5344CB8AC3E}">
+        <p14:creationId xmlns:p14="http://schemas.microsoft.com/office/powerpoint/2010/main" val="1348005940"/>
+      </p:ext>
+    </p:extLst>
+  </p:cSld>
+  <p:clrMapOvr>
+    <a:masterClrMapping/>
+  </p:clrMapOvr>
+  <p:timing>
+    <p:tnLst>
+      <p:par>
+        <p:cTn id="1" dur="indefinite" restart="never" nodeType="tmRoot"/>
+      </p:par>
+    </p:tnLst>
+  </p:timing>
+</p:sldLayout>
+</file>
+
+<file path=ppt/slideLayouts/slideLayout8.xml><?xml version="1.0" encoding="utf-8"?>
+<p:sldLayout xmlns:a="http://schemas.openxmlformats.org/drawingml/2006/main" xmlns:r="http://schemas.openxmlformats.org/officeDocument/2006/relationships" xmlns:p="http://schemas.openxmlformats.org/presentationml/2006/main" type="obj" preserve="1">
+  <p:cSld name="Cím és tartalom">
+    <p:bg>
+      <p:bgPr>
+        <a:solidFill>
+          <a:schemeClr val="bg1"/>
+        </a:solidFill>
+        <a:effectLst/>
+      </p:bgPr>
+    </p:bg>
+    <p:spTree>
+      <p:nvGrpSpPr>
+        <p:cNvPr id="1" name=""/>
+        <p:cNvGrpSpPr/>
+        <p:nvPr/>
+      </p:nvGrpSpPr>
+      <p:grpSpPr>
+        <a:xfrm>
+          <a:off x="0" y="0"/>
+          <a:ext cx="0" cy="0"/>
+          <a:chOff x="0" y="0"/>
+          <a:chExt cx="0" cy="0"/>
+        </a:xfrm>
+      </p:grpSpPr>
+      <p:sp>
+        <p:nvSpPr>
+          <p:cNvPr id="2" name="Cím 1"/>
+          <p:cNvSpPr>
+            <a:spLocks noGrp="1"/>
+          </p:cNvSpPr>
+          <p:nvPr>
+            <p:ph type="title"/>
+          </p:nvPr>
+        </p:nvSpPr>
+        <p:spPr/>
+        <p:txBody>
+          <a:bodyPr/>
+          <a:lstStyle/>
+          <a:p>
+            <a:r>
+              <a:rPr lang="hu-HU" smtClean="0"/>
+              <a:t>Mintacím szerkesztése</a:t>
+            </a:r>
+            <a:endParaRPr lang="hu-HU"/>
+          </a:p>
+        </p:txBody>
+      </p:sp>
+      <p:sp>
+        <p:nvSpPr>
+          <p:cNvPr id="3" name="Tartalom helye 2"/>
+          <p:cNvSpPr>
+            <a:spLocks noGrp="1"/>
+          </p:cNvSpPr>
+          <p:nvPr>
+            <p:ph idx="1"/>
+          </p:nvPr>
+        </p:nvSpPr>
+        <p:spPr/>
+        <p:txBody>
+          <a:bodyPr/>
+          <a:lstStyle/>
+          <a:p>
+            <a:pPr lvl="0"/>
+            <a:r>
+              <a:rPr lang="hu-HU" dirty="0" smtClean="0"/>
+              <a:t>Mintaszöveg szerkesztése</a:t>
+            </a:r>
+          </a:p>
+          <a:p>
+            <a:pPr lvl="1"/>
+            <a:r>
+              <a:rPr lang="hu-HU" dirty="0" smtClean="0"/>
+              <a:t>Második szint</a:t>
+            </a:r>
+          </a:p>
+          <a:p>
+            <a:pPr lvl="2"/>
+            <a:r>
+              <a:rPr lang="hu-HU" dirty="0" smtClean="0"/>
+              <a:t>Harmadik szint</a:t>
+            </a:r>
+          </a:p>
+          <a:p>
+            <a:pPr lvl="3"/>
+            <a:r>
+              <a:rPr lang="hu-HU" dirty="0" smtClean="0"/>
+              <a:t>Negyedik szint</a:t>
+            </a:r>
+          </a:p>
+          <a:p>
+            <a:pPr lvl="4"/>
+            <a:r>
+              <a:rPr lang="hu-HU" dirty="0" smtClean="0"/>
+              <a:t>Ötödik szint</a:t>
+            </a:r>
+            <a:endParaRPr lang="hu-HU" dirty="0"/>
+          </a:p>
+        </p:txBody>
+      </p:sp>
+    </p:spTree>
+    <p:extLst>
+      <p:ext uri="{BB962C8B-B14F-4D97-AF65-F5344CB8AC3E}">
+        <p14:creationId xmlns:p14="http://schemas.microsoft.com/office/powerpoint/2010/main" val="1616852640"/>
+      </p:ext>
+    </p:extLst>
+  </p:cSld>
+  <p:clrMapOvr>
+    <a:masterClrMapping/>
+  </p:clrMapOvr>
+  <p:timing>
+    <p:tnLst>
+      <p:par>
+        <p:cTn id="1" dur="indefinite" restart="never" nodeType="tmRoot"/>
+      </p:par>
+    </p:tnLst>
+  </p:timing>
+</p:sldLayout>
+</file>
+
+<file path=ppt/slideLayouts/slideLayout9.xml><?xml version="1.0" encoding="utf-8"?>
+<p:sldLayout xmlns:a="http://schemas.openxmlformats.org/drawingml/2006/main" xmlns:r="http://schemas.openxmlformats.org/officeDocument/2006/relationships" xmlns:p="http://schemas.openxmlformats.org/presentationml/2006/main" type="secHead" preserve="1">
+  <p:cSld name="Szakaszfejléc">
+    <p:spTree>
+      <p:nvGrpSpPr>
+        <p:cNvPr id="1" name=""/>
+        <p:cNvGrpSpPr/>
+        <p:nvPr/>
+      </p:nvGrpSpPr>
+      <p:grpSpPr>
+        <a:xfrm>
+          <a:off x="0" y="0"/>
+          <a:ext cx="0" cy="0"/>
+          <a:chOff x="0" y="0"/>
+          <a:chExt cx="0" cy="0"/>
+        </a:xfrm>
+      </p:grpSpPr>
+      <p:sp>
+        <p:nvSpPr>
+          <p:cNvPr id="2" name="Cím 1"/>
+          <p:cNvSpPr>
+            <a:spLocks noGrp="1"/>
+          </p:cNvSpPr>
+          <p:nvPr>
+            <p:ph type="title"/>
+          </p:nvPr>
+        </p:nvSpPr>
+        <p:spPr>
+          <a:xfrm>
+            <a:off x="628596" y="2844792"/>
+            <a:ext cx="7776000" cy="1362075"/>
+          </a:xfrm>
+        </p:spPr>
+        <p:txBody>
+          <a:bodyPr/>
+          <a:lstStyle>
+            <a:lvl1pPr algn="ctr">
+              <a:defRPr sz="4000" b="1" cap="all"/>
+            </a:lvl1pPr>
+          </a:lstStyle>
+          <a:p>
+            <a:r>
+              <a:rPr lang="hu-HU" smtClean="0"/>
+              <a:t>Mintacím szerkesztése</a:t>
+            </a:r>
+            <a:endParaRPr lang="hu-HU" dirty="0"/>
+          </a:p>
+        </p:txBody>
+      </p:sp>
+      <p:sp>
+        <p:nvSpPr>
+          <p:cNvPr id="3" name="Szöveg helye 2"/>
+          <p:cNvSpPr>
+            <a:spLocks noGrp="1"/>
+          </p:cNvSpPr>
+          <p:nvPr>
+            <p:ph type="body" idx="1"/>
+          </p:nvPr>
+        </p:nvSpPr>
+        <p:spPr>
+          <a:xfrm>
+            <a:off x="628596" y="4195773"/>
+            <a:ext cx="7772400" cy="1500187"/>
+          </a:xfrm>
+          <a:ln>
+            <a:solidFill>
+              <a:srgbClr val="000000"/>
+            </a:solidFill>
+          </a:ln>
+        </p:spPr>
+        <p:txBody>
+          <a:bodyPr anchor="ctr"/>
+          <a:lstStyle>
+            <a:lvl1pPr marL="0" indent="0">
+              <a:buNone/>
+              <a:defRPr sz="2000">
+                <a:solidFill>
+                  <a:schemeClr val="tx1"/>
+                </a:solidFill>
+              </a:defRPr>
+            </a:lvl1pPr>
+            <a:lvl2pPr marL="457200" indent="0">
+              <a:buNone/>
+              <a:defRPr sz="1800">
+                <a:solidFill>
+                  <a:schemeClr val="tx1">
+                    <a:tint val="75000"/>
+                  </a:schemeClr>
+                </a:solidFill>
+              </a:defRPr>
+            </a:lvl2pPr>
+            <a:lvl3pPr marL="914400" indent="0">
+              <a:buNone/>
+              <a:defRPr sz="1600">
+                <a:solidFill>
+                  <a:schemeClr val="tx1">
+                    <a:tint val="75000"/>
+                  </a:schemeClr>
+                </a:solidFill>
+              </a:defRPr>
+            </a:lvl3pPr>
+            <a:lvl4pPr marL="1371600" indent="0">
+              <a:buNone/>
+              <a:defRPr sz="1400">
+                <a:solidFill>
+                  <a:schemeClr val="tx1">
+                    <a:tint val="75000"/>
+                  </a:schemeClr>
+                </a:solidFill>
+              </a:defRPr>
+            </a:lvl4pPr>
+            <a:lvl5pPr marL="1828800" indent="0">
+              <a:buNone/>
+              <a:defRPr sz="1400">
+                <a:solidFill>
+                  <a:schemeClr val="tx1">
+                    <a:tint val="75000"/>
+                  </a:schemeClr>
+                </a:solidFill>
+              </a:defRPr>
+            </a:lvl5pPr>
+            <a:lvl6pPr marL="2286000" indent="0">
+              <a:buNone/>
+              <a:defRPr sz="1400">
+                <a:solidFill>
+                  <a:schemeClr val="tx1">
+                    <a:tint val="75000"/>
+                  </a:schemeClr>
+                </a:solidFill>
+              </a:defRPr>
+            </a:lvl6pPr>
+            <a:lvl7pPr marL="2743200" indent="0">
+              <a:buNone/>
+              <a:defRPr sz="1400">
+                <a:solidFill>
+                  <a:schemeClr val="tx1">
+                    <a:tint val="75000"/>
+                  </a:schemeClr>
+                </a:solidFill>
+              </a:defRPr>
+            </a:lvl7pPr>
+            <a:lvl8pPr marL="3200400" indent="0">
+              <a:buNone/>
+              <a:defRPr sz="1400">
+                <a:solidFill>
+                  <a:schemeClr val="tx1">
+                    <a:tint val="75000"/>
+                  </a:schemeClr>
+                </a:solidFill>
+              </a:defRPr>
+            </a:lvl8pPr>
+            <a:lvl9pPr marL="3657600" indent="0">
+              <a:buNone/>
+              <a:defRPr sz="1400">
+                <a:solidFill>
+                  <a:schemeClr val="tx1">
+                    <a:tint val="75000"/>
+                  </a:schemeClr>
+                </a:solidFill>
+              </a:defRPr>
+            </a:lvl9pPr>
+          </a:lstStyle>
+          <a:p>
+            <a:pPr lvl="0"/>
+            <a:r>
+              <a:rPr lang="hu-HU" smtClean="0"/>
+              <a:t>Mintaszöveg szerkesztése</a:t>
+            </a:r>
+          </a:p>
+        </p:txBody>
+      </p:sp>
+    </p:spTree>
+    <p:extLst>
+      <p:ext uri="{BB962C8B-B14F-4D97-AF65-F5344CB8AC3E}">
+        <p14:creationId xmlns:p14="http://schemas.microsoft.com/office/powerpoint/2010/main" val="1827891253"/>
+      </p:ext>
+    </p:extLst>
+  </p:cSld>
+  <p:clrMapOvr>
+    <a:masterClrMapping/>
+  </p:clrMapOvr>
+  <p:timing>
+    <p:tnLst>
+      <p:par>
+        <p:cTn id="1" dur="indefinite" restart="never" nodeType="tmRoot"/>
+      </p:par>
+    </p:tnLst>
+  </p:timing>
+</p:sldLayout>
+</file>
+
 <file path=ppt/slideMasters/slideMaster1.xml><?xml version="1.0" encoding="utf-8"?>
 <p:sldMaster xmlns:a="http://schemas.openxmlformats.org/drawingml/2006/main" xmlns:r="http://schemas.openxmlformats.org/officeDocument/2006/relationships" xmlns:p="http://schemas.openxmlformats.org/presentationml/2006/main">
   <p:cSld>
@@ -1984,7 +3324,7 @@
         </p:blipFill>
         <p:spPr>
           <a:xfrm>
-            <a:off x="22185" y="6486525"/>
+            <a:off x="22185" y="6491287"/>
             <a:ext cx="1225630" cy="343842"/>
           </a:xfrm>
           <a:prstGeom prst="rect">
@@ -2166,6 +3506,669 @@
         <a:defRPr sz="4000" kern="1200">
           <a:solidFill>
             <a:srgbClr val="F8F8F8"/>
+          </a:solidFill>
+          <a:latin typeface="+mj-lt"/>
+          <a:ea typeface="+mj-ea"/>
+          <a:cs typeface="+mj-cs"/>
+        </a:defRPr>
+      </a:lvl1pPr>
+      <a:lvl2pPr algn="ctr" rtl="0" eaLnBrk="1" fontAlgn="base" hangingPunct="1">
+        <a:spcBef>
+          <a:spcPct val="0"/>
+        </a:spcBef>
+        <a:spcAft>
+          <a:spcPct val="0"/>
+        </a:spcAft>
+        <a:defRPr sz="4000">
+          <a:solidFill>
+            <a:srgbClr val="F8F8F8"/>
+          </a:solidFill>
+          <a:latin typeface="Calibri" pitchFamily="34" charset="0"/>
+        </a:defRPr>
+      </a:lvl2pPr>
+      <a:lvl3pPr algn="ctr" rtl="0" eaLnBrk="1" fontAlgn="base" hangingPunct="1">
+        <a:spcBef>
+          <a:spcPct val="0"/>
+        </a:spcBef>
+        <a:spcAft>
+          <a:spcPct val="0"/>
+        </a:spcAft>
+        <a:defRPr sz="4000">
+          <a:solidFill>
+            <a:srgbClr val="F8F8F8"/>
+          </a:solidFill>
+          <a:latin typeface="Calibri" pitchFamily="34" charset="0"/>
+        </a:defRPr>
+      </a:lvl3pPr>
+      <a:lvl4pPr algn="ctr" rtl="0" eaLnBrk="1" fontAlgn="base" hangingPunct="1">
+        <a:spcBef>
+          <a:spcPct val="0"/>
+        </a:spcBef>
+        <a:spcAft>
+          <a:spcPct val="0"/>
+        </a:spcAft>
+        <a:defRPr sz="4000">
+          <a:solidFill>
+            <a:srgbClr val="F8F8F8"/>
+          </a:solidFill>
+          <a:latin typeface="Calibri" pitchFamily="34" charset="0"/>
+        </a:defRPr>
+      </a:lvl4pPr>
+      <a:lvl5pPr algn="ctr" rtl="0" eaLnBrk="1" fontAlgn="base" hangingPunct="1">
+        <a:spcBef>
+          <a:spcPct val="0"/>
+        </a:spcBef>
+        <a:spcAft>
+          <a:spcPct val="0"/>
+        </a:spcAft>
+        <a:defRPr sz="4000">
+          <a:solidFill>
+            <a:srgbClr val="F8F8F8"/>
+          </a:solidFill>
+          <a:latin typeface="Calibri" pitchFamily="34" charset="0"/>
+        </a:defRPr>
+      </a:lvl5pPr>
+      <a:lvl6pPr marL="457200" algn="ctr" rtl="0" eaLnBrk="1" fontAlgn="base" hangingPunct="1">
+        <a:spcBef>
+          <a:spcPct val="0"/>
+        </a:spcBef>
+        <a:spcAft>
+          <a:spcPct val="0"/>
+        </a:spcAft>
+        <a:defRPr sz="4000">
+          <a:solidFill>
+            <a:srgbClr val="F8F8F8"/>
+          </a:solidFill>
+          <a:latin typeface="Calibri" pitchFamily="34" charset="0"/>
+        </a:defRPr>
+      </a:lvl6pPr>
+      <a:lvl7pPr marL="914400" algn="ctr" rtl="0" eaLnBrk="1" fontAlgn="base" hangingPunct="1">
+        <a:spcBef>
+          <a:spcPct val="0"/>
+        </a:spcBef>
+        <a:spcAft>
+          <a:spcPct val="0"/>
+        </a:spcAft>
+        <a:defRPr sz="4000">
+          <a:solidFill>
+            <a:srgbClr val="F8F8F8"/>
+          </a:solidFill>
+          <a:latin typeface="Calibri" pitchFamily="34" charset="0"/>
+        </a:defRPr>
+      </a:lvl7pPr>
+      <a:lvl8pPr marL="1371600" algn="ctr" rtl="0" eaLnBrk="1" fontAlgn="base" hangingPunct="1">
+        <a:spcBef>
+          <a:spcPct val="0"/>
+        </a:spcBef>
+        <a:spcAft>
+          <a:spcPct val="0"/>
+        </a:spcAft>
+        <a:defRPr sz="4000">
+          <a:solidFill>
+            <a:srgbClr val="F8F8F8"/>
+          </a:solidFill>
+          <a:latin typeface="Calibri" pitchFamily="34" charset="0"/>
+        </a:defRPr>
+      </a:lvl8pPr>
+      <a:lvl9pPr marL="1828800" algn="ctr" rtl="0" eaLnBrk="1" fontAlgn="base" hangingPunct="1">
+        <a:spcBef>
+          <a:spcPct val="0"/>
+        </a:spcBef>
+        <a:spcAft>
+          <a:spcPct val="0"/>
+        </a:spcAft>
+        <a:defRPr sz="4000">
+          <a:solidFill>
+            <a:srgbClr val="F8F8F8"/>
+          </a:solidFill>
+          <a:latin typeface="Calibri" pitchFamily="34" charset="0"/>
+        </a:defRPr>
+      </a:lvl9pPr>
+    </p:titleStyle>
+    <p:bodyStyle>
+      <a:lvl1pPr marL="342900" indent="-342900" algn="l" rtl="0" eaLnBrk="1" fontAlgn="base" hangingPunct="1">
+        <a:spcBef>
+          <a:spcPct val="20000"/>
+        </a:spcBef>
+        <a:spcAft>
+          <a:spcPct val="0"/>
+        </a:spcAft>
+        <a:buClr>
+          <a:srgbClr val="762536"/>
+        </a:buClr>
+        <a:buFont typeface="Wingdings" pitchFamily="2" charset="2"/>
+        <a:buChar char="§"/>
+        <a:defRPr sz="3200" kern="1200">
+          <a:solidFill>
+            <a:schemeClr val="tx1"/>
+          </a:solidFill>
+          <a:latin typeface="+mn-lt"/>
+          <a:ea typeface="+mn-ea"/>
+          <a:cs typeface="+mn-cs"/>
+        </a:defRPr>
+      </a:lvl1pPr>
+      <a:lvl2pPr marL="742950" indent="-285750" algn="l" rtl="0" eaLnBrk="1" fontAlgn="base" hangingPunct="1">
+        <a:spcBef>
+          <a:spcPct val="20000"/>
+        </a:spcBef>
+        <a:spcAft>
+          <a:spcPct val="0"/>
+        </a:spcAft>
+        <a:buClr>
+          <a:srgbClr val="762536"/>
+        </a:buClr>
+        <a:buFont typeface="Courier New" pitchFamily="49" charset="0"/>
+        <a:buChar char="o"/>
+        <a:defRPr sz="2800" kern="1200">
+          <a:solidFill>
+            <a:schemeClr val="tx1"/>
+          </a:solidFill>
+          <a:latin typeface="+mn-lt"/>
+          <a:ea typeface="+mn-ea"/>
+          <a:cs typeface="+mn-cs"/>
+        </a:defRPr>
+      </a:lvl2pPr>
+      <a:lvl3pPr marL="1143000" indent="-228600" algn="l" rtl="0" eaLnBrk="1" fontAlgn="base" hangingPunct="1">
+        <a:spcBef>
+          <a:spcPct val="20000"/>
+        </a:spcBef>
+        <a:spcAft>
+          <a:spcPct val="0"/>
+        </a:spcAft>
+        <a:buClr>
+          <a:srgbClr val="762536"/>
+        </a:buClr>
+        <a:buFont typeface="Arial" charset="0"/>
+        <a:buChar char="•"/>
+        <a:defRPr sz="2400" kern="1200">
+          <a:solidFill>
+            <a:schemeClr val="tx1"/>
+          </a:solidFill>
+          <a:latin typeface="+mn-lt"/>
+          <a:ea typeface="+mn-ea"/>
+          <a:cs typeface="+mn-cs"/>
+        </a:defRPr>
+      </a:lvl3pPr>
+      <a:lvl4pPr marL="1600200" indent="-228600" algn="l" rtl="0" eaLnBrk="1" fontAlgn="base" hangingPunct="1">
+        <a:spcBef>
+          <a:spcPct val="20000"/>
+        </a:spcBef>
+        <a:spcAft>
+          <a:spcPct val="0"/>
+        </a:spcAft>
+        <a:buClr>
+          <a:srgbClr val="762536"/>
+        </a:buClr>
+        <a:buFont typeface="Arial" charset="0"/>
+        <a:buChar char="–"/>
+        <a:defRPr sz="2000" kern="1200">
+          <a:solidFill>
+            <a:schemeClr val="tx1"/>
+          </a:solidFill>
+          <a:latin typeface="+mn-lt"/>
+          <a:ea typeface="+mn-ea"/>
+          <a:cs typeface="+mn-cs"/>
+        </a:defRPr>
+      </a:lvl4pPr>
+      <a:lvl5pPr marL="2057400" indent="-228600" algn="l" rtl="0" eaLnBrk="1" fontAlgn="base" hangingPunct="1">
+        <a:spcBef>
+          <a:spcPct val="20000"/>
+        </a:spcBef>
+        <a:spcAft>
+          <a:spcPct val="0"/>
+        </a:spcAft>
+        <a:buClr>
+          <a:srgbClr val="762536"/>
+        </a:buClr>
+        <a:buFont typeface="Arial" charset="0"/>
+        <a:buChar char="»"/>
+        <a:defRPr sz="2000" kern="1200">
+          <a:solidFill>
+            <a:schemeClr val="tx1"/>
+          </a:solidFill>
+          <a:latin typeface="+mn-lt"/>
+          <a:ea typeface="+mn-ea"/>
+          <a:cs typeface="+mn-cs"/>
+        </a:defRPr>
+      </a:lvl5pPr>
+      <a:lvl6pPr marL="2514600" indent="-228600" algn="l" defTabSz="914400" rtl="0" eaLnBrk="1" latinLnBrk="0" hangingPunct="1">
+        <a:spcBef>
+          <a:spcPct val="20000"/>
+        </a:spcBef>
+        <a:buFont typeface="Arial" pitchFamily="34" charset="0"/>
+        <a:buChar char="•"/>
+        <a:defRPr sz="2000" kern="1200">
+          <a:solidFill>
+            <a:schemeClr val="tx1"/>
+          </a:solidFill>
+          <a:latin typeface="+mn-lt"/>
+          <a:ea typeface="+mn-ea"/>
+          <a:cs typeface="+mn-cs"/>
+        </a:defRPr>
+      </a:lvl6pPr>
+      <a:lvl7pPr marL="2971800" indent="-228600" algn="l" defTabSz="914400" rtl="0" eaLnBrk="1" latinLnBrk="0" hangingPunct="1">
+        <a:spcBef>
+          <a:spcPct val="20000"/>
+        </a:spcBef>
+        <a:buFont typeface="Arial" pitchFamily="34" charset="0"/>
+        <a:buChar char="•"/>
+        <a:defRPr sz="2000" kern="1200">
+          <a:solidFill>
+            <a:schemeClr val="tx1"/>
+          </a:solidFill>
+          <a:latin typeface="+mn-lt"/>
+          <a:ea typeface="+mn-ea"/>
+          <a:cs typeface="+mn-cs"/>
+        </a:defRPr>
+      </a:lvl7pPr>
+      <a:lvl8pPr marL="3429000" indent="-228600" algn="l" defTabSz="914400" rtl="0" eaLnBrk="1" latinLnBrk="0" hangingPunct="1">
+        <a:spcBef>
+          <a:spcPct val="20000"/>
+        </a:spcBef>
+        <a:buFont typeface="Arial" pitchFamily="34" charset="0"/>
+        <a:buChar char="•"/>
+        <a:defRPr sz="2000" kern="1200">
+          <a:solidFill>
+            <a:schemeClr val="tx1"/>
+          </a:solidFill>
+          <a:latin typeface="+mn-lt"/>
+          <a:ea typeface="+mn-ea"/>
+          <a:cs typeface="+mn-cs"/>
+        </a:defRPr>
+      </a:lvl8pPr>
+      <a:lvl9pPr marL="3886200" indent="-228600" algn="l" defTabSz="914400" rtl="0" eaLnBrk="1" latinLnBrk="0" hangingPunct="1">
+        <a:spcBef>
+          <a:spcPct val="20000"/>
+        </a:spcBef>
+        <a:buFont typeface="Arial" pitchFamily="34" charset="0"/>
+        <a:buChar char="•"/>
+        <a:defRPr sz="2000" kern="1200">
+          <a:solidFill>
+            <a:schemeClr val="tx1"/>
+          </a:solidFill>
+          <a:latin typeface="+mn-lt"/>
+          <a:ea typeface="+mn-ea"/>
+          <a:cs typeface="+mn-cs"/>
+        </a:defRPr>
+      </a:lvl9pPr>
+    </p:bodyStyle>
+    <p:otherStyle>
+      <a:defPPr>
+        <a:defRPr lang="hu-HU"/>
+      </a:defPPr>
+      <a:lvl1pPr marL="0" algn="l" defTabSz="914400" rtl="0" eaLnBrk="1" latinLnBrk="0" hangingPunct="1">
+        <a:defRPr sz="1800" kern="1200">
+          <a:solidFill>
+            <a:schemeClr val="tx1"/>
+          </a:solidFill>
+          <a:latin typeface="+mn-lt"/>
+          <a:ea typeface="+mn-ea"/>
+          <a:cs typeface="+mn-cs"/>
+        </a:defRPr>
+      </a:lvl1pPr>
+      <a:lvl2pPr marL="457200" algn="l" defTabSz="914400" rtl="0" eaLnBrk="1" latinLnBrk="0" hangingPunct="1">
+        <a:defRPr sz="1800" kern="1200">
+          <a:solidFill>
+            <a:schemeClr val="tx1"/>
+          </a:solidFill>
+          <a:latin typeface="+mn-lt"/>
+          <a:ea typeface="+mn-ea"/>
+          <a:cs typeface="+mn-cs"/>
+        </a:defRPr>
+      </a:lvl2pPr>
+      <a:lvl3pPr marL="914400" algn="l" defTabSz="914400" rtl="0" eaLnBrk="1" latinLnBrk="0" hangingPunct="1">
+        <a:defRPr sz="1800" kern="1200">
+          <a:solidFill>
+            <a:schemeClr val="tx1"/>
+          </a:solidFill>
+          <a:latin typeface="+mn-lt"/>
+          <a:ea typeface="+mn-ea"/>
+          <a:cs typeface="+mn-cs"/>
+        </a:defRPr>
+      </a:lvl3pPr>
+      <a:lvl4pPr marL="1371600" algn="l" defTabSz="914400" rtl="0" eaLnBrk="1" latinLnBrk="0" hangingPunct="1">
+        <a:defRPr sz="1800" kern="1200">
+          <a:solidFill>
+            <a:schemeClr val="tx1"/>
+          </a:solidFill>
+          <a:latin typeface="+mn-lt"/>
+          <a:ea typeface="+mn-ea"/>
+          <a:cs typeface="+mn-cs"/>
+        </a:defRPr>
+      </a:lvl4pPr>
+      <a:lvl5pPr marL="1828800" algn="l" defTabSz="914400" rtl="0" eaLnBrk="1" latinLnBrk="0" hangingPunct="1">
+        <a:defRPr sz="1800" kern="1200">
+          <a:solidFill>
+            <a:schemeClr val="tx1"/>
+          </a:solidFill>
+          <a:latin typeface="+mn-lt"/>
+          <a:ea typeface="+mn-ea"/>
+          <a:cs typeface="+mn-cs"/>
+        </a:defRPr>
+      </a:lvl5pPr>
+      <a:lvl6pPr marL="2286000" algn="l" defTabSz="914400" rtl="0" eaLnBrk="1" latinLnBrk="0" hangingPunct="1">
+        <a:defRPr sz="1800" kern="1200">
+          <a:solidFill>
+            <a:schemeClr val="tx1"/>
+          </a:solidFill>
+          <a:latin typeface="+mn-lt"/>
+          <a:ea typeface="+mn-ea"/>
+          <a:cs typeface="+mn-cs"/>
+        </a:defRPr>
+      </a:lvl6pPr>
+      <a:lvl7pPr marL="2743200" algn="l" defTabSz="914400" rtl="0" eaLnBrk="1" latinLnBrk="0" hangingPunct="1">
+        <a:defRPr sz="1800" kern="1200">
+          <a:solidFill>
+            <a:schemeClr val="tx1"/>
+          </a:solidFill>
+          <a:latin typeface="+mn-lt"/>
+          <a:ea typeface="+mn-ea"/>
+          <a:cs typeface="+mn-cs"/>
+        </a:defRPr>
+      </a:lvl7pPr>
+      <a:lvl8pPr marL="3200400" algn="l" defTabSz="914400" rtl="0" eaLnBrk="1" latinLnBrk="0" hangingPunct="1">
+        <a:defRPr sz="1800" kern="1200">
+          <a:solidFill>
+            <a:schemeClr val="tx1"/>
+          </a:solidFill>
+          <a:latin typeface="+mn-lt"/>
+          <a:ea typeface="+mn-ea"/>
+          <a:cs typeface="+mn-cs"/>
+        </a:defRPr>
+      </a:lvl8pPr>
+      <a:lvl9pPr marL="3657600" algn="l" defTabSz="914400" rtl="0" eaLnBrk="1" latinLnBrk="0" hangingPunct="1">
+        <a:defRPr sz="1800" kern="1200">
+          <a:solidFill>
+            <a:schemeClr val="tx1"/>
+          </a:solidFill>
+          <a:latin typeface="+mn-lt"/>
+          <a:ea typeface="+mn-ea"/>
+          <a:cs typeface="+mn-cs"/>
+        </a:defRPr>
+      </a:lvl9pPr>
+    </p:otherStyle>
+  </p:txStyles>
+</p:sldMaster>
+</file>
+
+<file path=ppt/slideMasters/slideMaster2.xml><?xml version="1.0" encoding="utf-8"?>
+<p:sldMaster xmlns:a="http://schemas.openxmlformats.org/drawingml/2006/main" xmlns:r="http://schemas.openxmlformats.org/officeDocument/2006/relationships" xmlns:p="http://schemas.openxmlformats.org/presentationml/2006/main" preserve="1">
+  <p:cSld>
+    <p:bg>
+      <p:bgRef idx="1001">
+        <a:schemeClr val="bg1"/>
+      </p:bgRef>
+    </p:bg>
+    <p:spTree>
+      <p:nvGrpSpPr>
+        <p:cNvPr id="1" name=""/>
+        <p:cNvGrpSpPr/>
+        <p:nvPr/>
+      </p:nvGrpSpPr>
+      <p:grpSpPr>
+        <a:xfrm>
+          <a:off x="0" y="0"/>
+          <a:ext cx="0" cy="0"/>
+          <a:chOff x="0" y="0"/>
+          <a:chExt cx="0" cy="0"/>
+        </a:xfrm>
+      </p:grpSpPr>
+      <p:sp>
+        <p:nvSpPr>
+          <p:cNvPr id="7" name="Rectangle 22"/>
+          <p:cNvSpPr>
+            <a:spLocks noChangeArrowheads="1"/>
+          </p:cNvSpPr>
+          <p:nvPr/>
+        </p:nvSpPr>
+        <p:spPr bwMode="auto">
+          <a:xfrm>
+            <a:off x="0" y="6477000"/>
+            <a:ext cx="9144000" cy="381000"/>
+          </a:xfrm>
+          <a:prstGeom prst="rect">
+            <a:avLst/>
+          </a:prstGeom>
+          <a:noFill/>
+          <a:ln w="9525">
+            <a:solidFill>
+              <a:schemeClr val="tx1"/>
+            </a:solidFill>
+            <a:miter lim="800000"/>
+            <a:headEnd/>
+            <a:tailEnd/>
+          </a:ln>
+          <a:effectLst/>
+        </p:spPr>
+        <p:txBody>
+          <a:bodyPr wrap="none" anchor="ctr"/>
+          <a:lstStyle/>
+          <a:p>
+            <a:pPr fontAlgn="auto">
+              <a:spcBef>
+                <a:spcPts val="0"/>
+              </a:spcBef>
+              <a:spcAft>
+                <a:spcPts val="0"/>
+              </a:spcAft>
+              <a:defRPr/>
+            </a:pPr>
+            <a:endParaRPr lang="hu-HU" dirty="0">
+              <a:latin typeface="+mn-lt"/>
+              <a:cs typeface="+mn-cs"/>
+            </a:endParaRPr>
+          </a:p>
+        </p:txBody>
+      </p:sp>
+      <p:sp>
+        <p:nvSpPr>
+          <p:cNvPr id="1026" name="Cím helye 1"/>
+          <p:cNvSpPr>
+            <a:spLocks noGrp="1"/>
+          </p:cNvSpPr>
+          <p:nvPr>
+            <p:ph type="title"/>
+          </p:nvPr>
+        </p:nvSpPr>
+        <p:spPr bwMode="auto">
+          <a:xfrm>
+            <a:off x="0" y="0"/>
+            <a:ext cx="9144000" cy="720725"/>
+          </a:xfrm>
+          <a:prstGeom prst="rect">
+            <a:avLst/>
+          </a:prstGeom>
+          <a:noFill/>
+          <a:ln w="9525">
+            <a:solidFill>
+              <a:schemeClr val="tx1"/>
+            </a:solidFill>
+            <a:miter lim="800000"/>
+            <a:headEnd/>
+            <a:tailEnd/>
+          </a:ln>
+        </p:spPr>
+        <p:txBody>
+          <a:bodyPr vert="horz" wrap="square" lIns="91440" tIns="45720" rIns="91440" bIns="45720" numCol="1" anchor="ctr" anchorCtr="0" compatLnSpc="1">
+            <a:prstTxWarp prst="textNoShape">
+              <a:avLst/>
+            </a:prstTxWarp>
+          </a:bodyPr>
+          <a:lstStyle/>
+          <a:p>
+            <a:pPr lvl="0"/>
+            <a:r>
+              <a:rPr lang="hu-HU" smtClean="0"/>
+              <a:t>Mintacím szerkesztése</a:t>
+            </a:r>
+          </a:p>
+        </p:txBody>
+      </p:sp>
+      <p:sp>
+        <p:nvSpPr>
+          <p:cNvPr id="1027" name="Szöveg helye 2"/>
+          <p:cNvSpPr>
+            <a:spLocks noGrp="1"/>
+          </p:cNvSpPr>
+          <p:nvPr>
+            <p:ph type="body" idx="1"/>
+          </p:nvPr>
+        </p:nvSpPr>
+        <p:spPr bwMode="auto">
+          <a:xfrm>
+            <a:off x="142875" y="857250"/>
+            <a:ext cx="8858250" cy="5529263"/>
+          </a:xfrm>
+          <a:prstGeom prst="rect">
+            <a:avLst/>
+          </a:prstGeom>
+          <a:noFill/>
+          <a:ln w="9525">
+            <a:noFill/>
+            <a:miter lim="800000"/>
+            <a:headEnd/>
+            <a:tailEnd/>
+          </a:ln>
+        </p:spPr>
+        <p:txBody>
+          <a:bodyPr vert="horz" wrap="square" lIns="91440" tIns="45720" rIns="91440" bIns="45720" numCol="1" anchor="t" anchorCtr="0" compatLnSpc="1">
+            <a:prstTxWarp prst="textNoShape">
+              <a:avLst/>
+            </a:prstTxWarp>
+          </a:bodyPr>
+          <a:lstStyle/>
+          <a:p>
+            <a:pPr lvl="0"/>
+            <a:r>
+              <a:rPr lang="hu-HU" dirty="0" smtClean="0"/>
+              <a:t>Mintaszöveg szerkesztése</a:t>
+            </a:r>
+          </a:p>
+          <a:p>
+            <a:pPr lvl="1"/>
+            <a:r>
+              <a:rPr lang="hu-HU" dirty="0" smtClean="0"/>
+              <a:t>Második szint</a:t>
+            </a:r>
+          </a:p>
+          <a:p>
+            <a:pPr lvl="2"/>
+            <a:r>
+              <a:rPr lang="hu-HU" dirty="0" smtClean="0"/>
+              <a:t>Harmadik szint</a:t>
+            </a:r>
+          </a:p>
+          <a:p>
+            <a:pPr lvl="3"/>
+            <a:r>
+              <a:rPr lang="hu-HU" dirty="0" smtClean="0"/>
+              <a:t>Negyedik szint</a:t>
+            </a:r>
+          </a:p>
+          <a:p>
+            <a:pPr lvl="4"/>
+            <a:r>
+              <a:rPr lang="hu-HU" dirty="0" smtClean="0"/>
+              <a:t>Ötödik szint</a:t>
+            </a:r>
+          </a:p>
+        </p:txBody>
+      </p:sp>
+      <p:pic>
+        <p:nvPicPr>
+          <p:cNvPr id="11" name="Kép 10"/>
+          <p:cNvPicPr>
+            <a:picLocks noChangeAspect="1"/>
+          </p:cNvPicPr>
+          <p:nvPr userDrawn="1"/>
+        </p:nvPicPr>
+        <p:blipFill>
+          <a:blip r:embed="rId8">
+            <a:extLst>
+              <a:ext uri="{28A0092B-C50C-407E-A947-70E740481C1C}">
+                <a14:useLocalDpi xmlns:a14="http://schemas.microsoft.com/office/drawing/2010/main" val="0"/>
+              </a:ext>
+            </a:extLst>
+          </a:blip>
+          <a:stretch>
+            <a:fillRect/>
+          </a:stretch>
+        </p:blipFill>
+        <p:spPr>
+          <a:xfrm>
+            <a:off x="22185" y="6500811"/>
+            <a:ext cx="1227600" cy="328845"/>
+          </a:xfrm>
+          <a:prstGeom prst="rect">
+            <a:avLst/>
+          </a:prstGeom>
+        </p:spPr>
+      </p:pic>
+      <p:pic>
+        <p:nvPicPr>
+          <p:cNvPr id="14" name="Kép 13"/>
+          <p:cNvPicPr>
+            <a:picLocks noChangeAspect="1"/>
+          </p:cNvPicPr>
+          <p:nvPr userDrawn="1"/>
+        </p:nvPicPr>
+        <p:blipFill>
+          <a:blip r:embed="rId9">
+            <a:extLst>
+              <a:ext uri="{28A0092B-C50C-407E-A947-70E740481C1C}">
+                <a14:useLocalDpi xmlns:a14="http://schemas.microsoft.com/office/drawing/2010/main" val="0"/>
+              </a:ext>
+            </a:extLst>
+          </a:blip>
+          <a:stretch>
+            <a:fillRect/>
+          </a:stretch>
+        </p:blipFill>
+        <p:spPr>
+          <a:xfrm>
+            <a:off x="8055354" y="6489700"/>
+            <a:ext cx="1051200" cy="351964"/>
+          </a:xfrm>
+          <a:prstGeom prst="rect">
+            <a:avLst/>
+          </a:prstGeom>
+        </p:spPr>
+      </p:pic>
+    </p:spTree>
+    <p:extLst>
+      <p:ext uri="{BB962C8B-B14F-4D97-AF65-F5344CB8AC3E}">
+        <p14:creationId xmlns:p14="http://schemas.microsoft.com/office/powerpoint/2010/main" val="3404289094"/>
+      </p:ext>
+    </p:extLst>
+  </p:cSld>
+  <p:clrMap bg1="lt1" tx1="dk1" bg2="lt2" tx2="dk2" accent1="accent1" accent2="accent2" accent3="accent3" accent4="accent4" accent5="accent5" accent6="accent6" hlink="hlink" folHlink="folHlink"/>
+  <p:sldLayoutIdLst>
+    <p:sldLayoutId id="2147483656" r:id="rId1"/>
+    <p:sldLayoutId id="2147483657" r:id="rId2"/>
+    <p:sldLayoutId id="2147483658" r:id="rId3"/>
+    <p:sldLayoutId id="2147483659" r:id="rId4"/>
+    <p:sldLayoutId id="2147483660" r:id="rId5"/>
+    <p:sldLayoutId id="2147483661" r:id="rId6"/>
+  </p:sldLayoutIdLst>
+  <p:timing>
+    <p:tnLst>
+      <p:par>
+        <p:cTn id="1" dur="indefinite" restart="never" nodeType="tmRoot"/>
+      </p:par>
+    </p:tnLst>
+  </p:timing>
+  <p:txStyles>
+    <p:titleStyle>
+      <a:lvl1pPr algn="ctr" rtl="0" eaLnBrk="1" fontAlgn="base" hangingPunct="1">
+        <a:spcBef>
+          <a:spcPct val="0"/>
+        </a:spcBef>
+        <a:spcAft>
+          <a:spcPct val="0"/>
+        </a:spcAft>
+        <a:defRPr sz="4000" kern="1200">
+          <a:solidFill>
+            <a:schemeClr val="tx1"/>
           </a:solidFill>
           <a:latin typeface="+mj-lt"/>
           <a:ea typeface="+mj-ea"/>
@@ -3188,6 +5191,459 @@
 </file>
 
 <file path=ppt/theme/theme2.xml><?xml version="1.0" encoding="utf-8"?>
+<a:theme xmlns:a="http://schemas.openxmlformats.org/drawingml/2006/main" name="1_FTSRG">
+  <a:themeElements>
+    <a:clrScheme name="ftsrg-scheme">
+      <a:dk1>
+        <a:srgbClr val="000000"/>
+      </a:dk1>
+      <a:lt1>
+        <a:srgbClr val="FFFFFF"/>
+      </a:lt1>
+      <a:dk2>
+        <a:srgbClr val="621E0F"/>
+      </a:dk2>
+      <a:lt2>
+        <a:srgbClr val="FFFFFF"/>
+      </a:lt2>
+      <a:accent1>
+        <a:srgbClr val="F9DD2F"/>
+      </a:accent1>
+      <a:accent2>
+        <a:srgbClr val="E67300"/>
+      </a:accent2>
+      <a:accent3>
+        <a:srgbClr val="007D00"/>
+      </a:accent3>
+      <a:accent4>
+        <a:srgbClr val="762536"/>
+      </a:accent4>
+      <a:accent5>
+        <a:srgbClr val="2B56CF"/>
+      </a:accent5>
+      <a:accent6>
+        <a:srgbClr val="929598"/>
+      </a:accent6>
+      <a:hlink>
+        <a:srgbClr val="0038AE"/>
+      </a:hlink>
+      <a:folHlink>
+        <a:srgbClr val="0038AE"/>
+      </a:folHlink>
+    </a:clrScheme>
+    <a:fontScheme name="Office">
+      <a:majorFont>
+        <a:latin typeface="Calibri"/>
+        <a:ea typeface=""/>
+        <a:cs typeface=""/>
+        <a:font script="Jpan" typeface="ＭＳ Ｐゴシック"/>
+        <a:font script="Hang" typeface="맑은 고딕"/>
+        <a:font script="Hans" typeface="宋体"/>
+        <a:font script="Hant" typeface="新細明體"/>
+        <a:font script="Arab" typeface="Times New Roman"/>
+        <a:font script="Hebr" typeface="Times New Roman"/>
+        <a:font script="Thai" typeface="Angsana New"/>
+        <a:font script="Ethi" typeface="Nyala"/>
+        <a:font script="Beng" typeface="Vrinda"/>
+        <a:font script="Gujr" typeface="Shruti"/>
+        <a:font script="Khmr" typeface="MoolBoran"/>
+        <a:font script="Knda" typeface="Tunga"/>
+        <a:font script="Guru" typeface="Raavi"/>
+        <a:font script="Cans" typeface="Euphemia"/>
+        <a:font script="Cher" typeface="Plantagenet Cherokee"/>
+        <a:font script="Yiii" typeface="Microsoft Yi Baiti"/>
+        <a:font script="Tibt" typeface="Microsoft Himalaya"/>
+        <a:font script="Thaa" typeface="MV Boli"/>
+        <a:font script="Deva" typeface="Mangal"/>
+        <a:font script="Telu" typeface="Gautami"/>
+        <a:font script="Taml" typeface="Latha"/>
+        <a:font script="Syrc" typeface="Estrangelo Edessa"/>
+        <a:font script="Orya" typeface="Kalinga"/>
+        <a:font script="Mlym" typeface="Kartika"/>
+        <a:font script="Laoo" typeface="DokChampa"/>
+        <a:font script="Sinh" typeface="Iskoola Pota"/>
+        <a:font script="Mong" typeface="Mongolian Baiti"/>
+        <a:font script="Viet" typeface="Times New Roman"/>
+        <a:font script="Uigh" typeface="Microsoft Uighur"/>
+      </a:majorFont>
+      <a:minorFont>
+        <a:latin typeface="Calibri"/>
+        <a:ea typeface=""/>
+        <a:cs typeface=""/>
+        <a:font script="Jpan" typeface="ＭＳ Ｐゴシック"/>
+        <a:font script="Hang" typeface="맑은 고딕"/>
+        <a:font script="Hans" typeface="宋体"/>
+        <a:font script="Hant" typeface="新細明體"/>
+        <a:font script="Arab" typeface="Arial"/>
+        <a:font script="Hebr" typeface="Arial"/>
+        <a:font script="Thai" typeface="Cordia New"/>
+        <a:font script="Ethi" typeface="Nyala"/>
+        <a:font script="Beng" typeface="Vrinda"/>
+        <a:font script="Gujr" typeface="Shruti"/>
+        <a:font script="Khmr" typeface="DaunPenh"/>
+        <a:font script="Knda" typeface="Tunga"/>
+        <a:font script="Guru" typeface="Raavi"/>
+        <a:font script="Cans" typeface="Euphemia"/>
+        <a:font script="Cher" typeface="Plantagenet Cherokee"/>
+        <a:font script="Yiii" typeface="Microsoft Yi Baiti"/>
+        <a:font script="Tibt" typeface="Microsoft Himalaya"/>
+        <a:font script="Thaa" typeface="MV Boli"/>
+        <a:font script="Deva" typeface="Mangal"/>
+        <a:font script="Telu" typeface="Gautami"/>
+        <a:font script="Taml" typeface="Latha"/>
+        <a:font script="Syrc" typeface="Estrangelo Edessa"/>
+        <a:font script="Orya" typeface="Kalinga"/>
+        <a:font script="Mlym" typeface="Kartika"/>
+        <a:font script="Laoo" typeface="DokChampa"/>
+        <a:font script="Sinh" typeface="Iskoola Pota"/>
+        <a:font script="Mong" typeface="Mongolian Baiti"/>
+        <a:font script="Viet" typeface="Arial"/>
+        <a:font script="Uigh" typeface="Microsoft Uighur"/>
+      </a:minorFont>
+    </a:fontScheme>
+    <a:fmtScheme name="Office">
+      <a:fillStyleLst>
+        <a:solidFill>
+          <a:schemeClr val="phClr"/>
+        </a:solidFill>
+        <a:gradFill rotWithShape="1">
+          <a:gsLst>
+            <a:gs pos="0">
+              <a:schemeClr val="phClr">
+                <a:tint val="50000"/>
+                <a:satMod val="300000"/>
+              </a:schemeClr>
+            </a:gs>
+            <a:gs pos="35000">
+              <a:schemeClr val="phClr">
+                <a:tint val="37000"/>
+                <a:satMod val="300000"/>
+              </a:schemeClr>
+            </a:gs>
+            <a:gs pos="100000">
+              <a:schemeClr val="phClr">
+                <a:tint val="15000"/>
+                <a:satMod val="350000"/>
+              </a:schemeClr>
+            </a:gs>
+          </a:gsLst>
+          <a:lin ang="16200000" scaled="1"/>
+        </a:gradFill>
+        <a:gradFill rotWithShape="1">
+          <a:gsLst>
+            <a:gs pos="0">
+              <a:schemeClr val="phClr">
+                <a:shade val="51000"/>
+                <a:satMod val="130000"/>
+              </a:schemeClr>
+            </a:gs>
+            <a:gs pos="80000">
+              <a:schemeClr val="phClr">
+                <a:shade val="93000"/>
+                <a:satMod val="130000"/>
+              </a:schemeClr>
+            </a:gs>
+            <a:gs pos="100000">
+              <a:schemeClr val="phClr">
+                <a:shade val="94000"/>
+                <a:satMod val="135000"/>
+              </a:schemeClr>
+            </a:gs>
+          </a:gsLst>
+          <a:lin ang="16200000" scaled="0"/>
+        </a:gradFill>
+      </a:fillStyleLst>
+      <a:lnStyleLst>
+        <a:ln w="9525" cap="flat" cmpd="sng" algn="ctr">
+          <a:solidFill>
+            <a:schemeClr val="phClr">
+              <a:shade val="95000"/>
+              <a:satMod val="105000"/>
+            </a:schemeClr>
+          </a:solidFill>
+          <a:prstDash val="solid"/>
+        </a:ln>
+        <a:ln w="25400" cap="flat" cmpd="sng" algn="ctr">
+          <a:solidFill>
+            <a:schemeClr val="phClr"/>
+          </a:solidFill>
+          <a:prstDash val="solid"/>
+        </a:ln>
+        <a:ln w="38100" cap="flat" cmpd="sng" algn="ctr">
+          <a:solidFill>
+            <a:schemeClr val="phClr"/>
+          </a:solidFill>
+          <a:prstDash val="solid"/>
+        </a:ln>
+      </a:lnStyleLst>
+      <a:effectStyleLst>
+        <a:effectStyle>
+          <a:effectLst>
+            <a:outerShdw blurRad="40000" dist="20000" dir="5400000" rotWithShape="0">
+              <a:srgbClr val="000000">
+                <a:alpha val="38000"/>
+              </a:srgbClr>
+            </a:outerShdw>
+          </a:effectLst>
+        </a:effectStyle>
+        <a:effectStyle>
+          <a:effectLst>
+            <a:outerShdw blurRad="40000" dist="23000" dir="5400000" rotWithShape="0">
+              <a:srgbClr val="000000">
+                <a:alpha val="35000"/>
+              </a:srgbClr>
+            </a:outerShdw>
+          </a:effectLst>
+        </a:effectStyle>
+        <a:effectStyle>
+          <a:effectLst>
+            <a:outerShdw blurRad="40000" dist="23000" dir="5400000" rotWithShape="0">
+              <a:srgbClr val="000000">
+                <a:alpha val="35000"/>
+              </a:srgbClr>
+            </a:outerShdw>
+          </a:effectLst>
+          <a:scene3d>
+            <a:camera prst="orthographicFront">
+              <a:rot lat="0" lon="0" rev="0"/>
+            </a:camera>
+            <a:lightRig rig="threePt" dir="t">
+              <a:rot lat="0" lon="0" rev="1200000"/>
+            </a:lightRig>
+          </a:scene3d>
+          <a:sp3d>
+            <a:bevelT w="63500" h="25400"/>
+          </a:sp3d>
+        </a:effectStyle>
+      </a:effectStyleLst>
+      <a:bgFillStyleLst>
+        <a:solidFill>
+          <a:schemeClr val="phClr"/>
+        </a:solidFill>
+        <a:gradFill rotWithShape="1">
+          <a:gsLst>
+            <a:gs pos="0">
+              <a:schemeClr val="phClr">
+                <a:tint val="40000"/>
+                <a:satMod val="350000"/>
+              </a:schemeClr>
+            </a:gs>
+            <a:gs pos="40000">
+              <a:schemeClr val="phClr">
+                <a:tint val="45000"/>
+                <a:shade val="99000"/>
+                <a:satMod val="350000"/>
+              </a:schemeClr>
+            </a:gs>
+            <a:gs pos="100000">
+              <a:schemeClr val="phClr">
+                <a:shade val="20000"/>
+                <a:satMod val="255000"/>
+              </a:schemeClr>
+            </a:gs>
+          </a:gsLst>
+          <a:path path="circle">
+            <a:fillToRect l="50000" t="-80000" r="50000" b="180000"/>
+          </a:path>
+        </a:gradFill>
+        <a:gradFill rotWithShape="1">
+          <a:gsLst>
+            <a:gs pos="0">
+              <a:schemeClr val="phClr">
+                <a:tint val="80000"/>
+                <a:satMod val="300000"/>
+              </a:schemeClr>
+            </a:gs>
+            <a:gs pos="100000">
+              <a:schemeClr val="phClr">
+                <a:shade val="30000"/>
+                <a:satMod val="200000"/>
+              </a:schemeClr>
+            </a:gs>
+          </a:gsLst>
+          <a:path path="circle">
+            <a:fillToRect l="50000" t="50000" r="50000" b="50000"/>
+          </a:path>
+        </a:gradFill>
+      </a:bgFillStyleLst>
+    </a:fmtScheme>
+  </a:themeElements>
+  <a:objectDefaults>
+    <a:spDef>
+      <a:spPr>
+        <a:solidFill>
+          <a:srgbClr val="B83A55"/>
+        </a:solidFill>
+        <a:ln w="38100">
+          <a:solidFill>
+            <a:schemeClr val="tx1"/>
+          </a:solidFill>
+        </a:ln>
+        <a:effectLst>
+          <a:outerShdw blurRad="50800" dist="38100" dir="2700000" algn="tl" rotWithShape="0">
+            <a:prstClr val="black">
+              <a:alpha val="40000"/>
+            </a:prstClr>
+          </a:outerShdw>
+        </a:effectLst>
+      </a:spPr>
+      <a:bodyPr rtlCol="0" anchor="ctr"/>
+      <a:lstStyle>
+        <a:defPPr algn="ctr">
+          <a:defRPr sz="2400" dirty="0" smtClean="0">
+            <a:solidFill>
+              <a:schemeClr val="bg1"/>
+            </a:solidFill>
+          </a:defRPr>
+        </a:defPPr>
+      </a:lstStyle>
+      <a:style>
+        <a:lnRef idx="2">
+          <a:schemeClr val="accent4">
+            <a:shade val="50000"/>
+          </a:schemeClr>
+        </a:lnRef>
+        <a:fillRef idx="1">
+          <a:schemeClr val="accent4"/>
+        </a:fillRef>
+        <a:effectRef idx="0">
+          <a:schemeClr val="accent4"/>
+        </a:effectRef>
+        <a:fontRef idx="minor">
+          <a:schemeClr val="lt1"/>
+        </a:fontRef>
+      </a:style>
+    </a:spDef>
+  </a:objectDefaults>
+  <a:extraClrSchemeLst>
+    <a:extraClrScheme>
+      <a:clrScheme name="bme_ftsrg_hun_micskeiz_new_v6 1">
+        <a:dk1>
+          <a:srgbClr val="621E0F"/>
+        </a:dk1>
+        <a:lt1>
+          <a:srgbClr val="FFFFFF"/>
+        </a:lt1>
+        <a:dk2>
+          <a:srgbClr val="000000"/>
+        </a:dk2>
+        <a:lt2>
+          <a:srgbClr val="FFFFFF"/>
+        </a:lt2>
+        <a:accent1>
+          <a:srgbClr val="F9DD2F"/>
+        </a:accent1>
+        <a:accent2>
+          <a:srgbClr val="E67300"/>
+        </a:accent2>
+        <a:accent3>
+          <a:srgbClr val="AAAAAA"/>
+        </a:accent3>
+        <a:accent4>
+          <a:srgbClr val="DADADA"/>
+        </a:accent4>
+        <a:accent5>
+          <a:srgbClr val="FBEBAD"/>
+        </a:accent5>
+        <a:accent6>
+          <a:srgbClr val="D06800"/>
+        </a:accent6>
+        <a:hlink>
+          <a:srgbClr val="0038AE"/>
+        </a:hlink>
+        <a:folHlink>
+          <a:srgbClr val="0038AE"/>
+        </a:folHlink>
+      </a:clrScheme>
+      <a:clrMap bg1="dk2" tx1="lt1" bg2="dk1" tx2="lt2" accent1="accent1" accent2="accent2" accent3="accent3" accent4="accent4" accent5="accent5" accent6="accent6" hlink="hlink" folHlink="folHlink"/>
+    </a:extraClrScheme>
+    <a:extraClrScheme>
+      <a:clrScheme name="bme_ftsrg_hun_micskeiz_new_v6 2">
+        <a:dk1>
+          <a:srgbClr val="0099FF"/>
+        </a:dk1>
+        <a:lt1>
+          <a:srgbClr val="FFFFFF"/>
+        </a:lt1>
+        <a:dk2>
+          <a:srgbClr val="000000"/>
+        </a:dk2>
+        <a:lt2>
+          <a:srgbClr val="FFFF99"/>
+        </a:lt2>
+        <a:accent1>
+          <a:srgbClr val="762536"/>
+        </a:accent1>
+        <a:accent2>
+          <a:srgbClr val="81511D"/>
+        </a:accent2>
+        <a:accent3>
+          <a:srgbClr val="AAAAAA"/>
+        </a:accent3>
+        <a:accent4>
+          <a:srgbClr val="DADADA"/>
+        </a:accent4>
+        <a:accent5>
+          <a:srgbClr val="BDACAE"/>
+        </a:accent5>
+        <a:accent6>
+          <a:srgbClr val="744919"/>
+        </a:accent6>
+        <a:hlink>
+          <a:srgbClr val="002060"/>
+        </a:hlink>
+        <a:folHlink>
+          <a:srgbClr val="002060"/>
+        </a:folHlink>
+      </a:clrScheme>
+      <a:clrMap bg1="dk2" tx1="lt1" bg2="dk1" tx2="lt2" accent1="accent1" accent2="accent2" accent3="accent3" accent4="accent4" accent5="accent5" accent6="accent6" hlink="hlink" folHlink="folHlink"/>
+    </a:extraClrScheme>
+    <a:extraClrScheme>
+      <a:clrScheme name="bme_ftsrg_hun_micskeiz_new_v6 3">
+        <a:dk1>
+          <a:srgbClr val="000000"/>
+        </a:dk1>
+        <a:lt1>
+          <a:srgbClr val="FFFFFF"/>
+        </a:lt1>
+        <a:dk2>
+          <a:srgbClr val="000000"/>
+        </a:dk2>
+        <a:lt2>
+          <a:srgbClr val="FFFFFF"/>
+        </a:lt2>
+        <a:accent1>
+          <a:srgbClr val="FF3300"/>
+        </a:accent1>
+        <a:accent2>
+          <a:srgbClr val="00B686"/>
+        </a:accent2>
+        <a:accent3>
+          <a:srgbClr val="AAAAAA"/>
+        </a:accent3>
+        <a:accent4>
+          <a:srgbClr val="DADADA"/>
+        </a:accent4>
+        <a:accent5>
+          <a:srgbClr val="FFADAA"/>
+        </a:accent5>
+        <a:accent6>
+          <a:srgbClr val="00A579"/>
+        </a:accent6>
+        <a:hlink>
+          <a:srgbClr val="0098CE"/>
+        </a:hlink>
+        <a:folHlink>
+          <a:srgbClr val="FFCC00"/>
+        </a:folHlink>
+      </a:clrScheme>
+      <a:clrMap bg1="dk2" tx1="lt1" bg2="dk1" tx2="lt2" accent1="accent1" accent2="accent2" accent3="accent3" accent4="accent4" accent5="accent5" accent6="accent6" hlink="hlink" folHlink="folHlink"/>
+    </a:extraClrScheme>
+  </a:extraClrSchemeLst>
+</a:theme>
+</file>
+
+<file path=ppt/theme/theme3.xml><?xml version="1.0" encoding="utf-8"?>
 <a:theme xmlns:a="http://schemas.openxmlformats.org/drawingml/2006/main" name="Office Theme">
   <a:themeElements>
     <a:clrScheme name="Office">

</xml_diff>

<commit_message>
Update of colour scheme
</commit_message>
<xml_diff>
--- a/templates/ftsrg-presentation.pptx
+++ b/templates/ftsrg-presentation.pptx
@@ -221,7 +221,7 @@
             <a:fld id="{B9130191-0BE1-0142-AFC1-0297AE024A0E}" type="datetimeFigureOut">
               <a:rPr lang="en-US" smtClean="0"/>
               <a:pPr/>
-              <a:t>10/30/2014</a:t>
+              <a:t>11/4/2014</a:t>
             </a:fld>
             <a:endParaRPr lang="en-US"/>
           </a:p>
@@ -3222,7 +3222,7 @@
 </file>
 
 <file path=ppt/slideMasters/slideMaster1.xml><?xml version="1.0" encoding="utf-8"?>
-<p:sldMaster xmlns:a="http://schemas.openxmlformats.org/drawingml/2006/main" xmlns:r="http://schemas.openxmlformats.org/officeDocument/2006/relationships" xmlns:p="http://schemas.openxmlformats.org/presentationml/2006/main">
+<p:sldMaster xmlns:a="http://schemas.openxmlformats.org/drawingml/2006/main" xmlns:r="http://schemas.openxmlformats.org/officeDocument/2006/relationships" xmlns:p="http://schemas.openxmlformats.org/presentationml/2006/main" preserve="1">
   <p:cSld>
     <p:bg>
       <p:bgRef idx="1001">
@@ -4587,22 +4587,26 @@
           <a:lstStyle/>
           <a:p>
             <a:r>
-              <a:rPr lang="hu-HU" sz="3600" cap="small" dirty="0" err="1" smtClean="0"/>
+              <a:rPr lang="hu-HU" dirty="0" err="1" smtClean="0"/>
               <a:t>Power</a:t>
             </a:r>
             <a:r>
-              <a:rPr lang="en-US" sz="3600" cap="small" dirty="0" smtClean="0"/>
+              <a:rPr lang="en-US" dirty="0" smtClean="0"/>
               <a:t>P</a:t>
             </a:r>
             <a:r>
-              <a:rPr lang="hu-HU" sz="3600" cap="small" dirty="0" err="1" smtClean="0"/>
+              <a:rPr lang="hu-HU" dirty="0" err="1" smtClean="0"/>
               <a:t>oint</a:t>
             </a:r>
             <a:r>
-              <a:rPr lang="hu-HU" sz="3600" cap="small" dirty="0" smtClean="0"/>
-              <a:t> sablon</a:t>
-            </a:r>
-            <a:endParaRPr lang="en-US" sz="3600" cap="small" dirty="0"/>
+              <a:rPr lang="hu-HU" dirty="0" smtClean="0"/>
+              <a:t> </a:t>
+            </a:r>
+            <a:r>
+              <a:rPr lang="hu-HU" dirty="0" smtClean="0"/>
+              <a:t>sablon</a:t>
+            </a:r>
+            <a:endParaRPr lang="en-US" dirty="0"/>
           </a:p>
         </p:txBody>
       </p:sp>
@@ -4717,10 +4721,136 @@
           <a:lstStyle/>
           <a:p>
             <a:r>
-              <a:rPr lang="hu-HU" dirty="0" smtClean="0"/>
-              <a:t>Tartalom</a:t>
+              <a:rPr lang="en-US" dirty="0">
+                <a:hlinkClick r:id="rId2"/>
+              </a:rPr>
+              <a:t>http://xkcd.com/303</a:t>
+            </a:r>
+            <a:r>
+              <a:rPr lang="en-US" dirty="0" smtClean="0">
+                <a:hlinkClick r:id="rId2"/>
+              </a:rPr>
+              <a:t>/</a:t>
             </a:r>
             <a:endParaRPr lang="en-US" dirty="0"/>
+          </a:p>
+        </p:txBody>
+      </p:sp>
+      <p:pic>
+        <p:nvPicPr>
+          <p:cNvPr id="1026" name="Picture 2" descr="Compiling"/>
+          <p:cNvPicPr>
+            <a:picLocks noChangeAspect="1" noChangeArrowheads="1"/>
+          </p:cNvPicPr>
+          <p:nvPr/>
+        </p:nvPicPr>
+        <p:blipFill>
+          <a:blip r:embed="rId3">
+            <a:extLst>
+              <a:ext uri="{28A0092B-C50C-407E-A947-70E740481C1C}">
+                <a14:useLocalDpi xmlns:a14="http://schemas.microsoft.com/office/drawing/2010/main" val="0"/>
+              </a:ext>
+            </a:extLst>
+          </a:blip>
+          <a:srcRect/>
+          <a:stretch>
+            <a:fillRect/>
+          </a:stretch>
+        </p:blipFill>
+        <p:spPr bwMode="auto">
+          <a:xfrm>
+            <a:off x="3483892" y="1542165"/>
+            <a:ext cx="5557542" cy="4844348"/>
+          </a:xfrm>
+          <a:prstGeom prst="rect">
+            <a:avLst/>
+          </a:prstGeom>
+          <a:noFill/>
+          <a:extLst>
+            <a:ext uri="{909E8E84-426E-40DD-AFC4-6F175D3DCCD1}">
+              <a14:hiddenFill xmlns:a14="http://schemas.microsoft.com/office/drawing/2010/main">
+                <a:solidFill>
+                  <a:srgbClr val="FFFFFF"/>
+                </a:solidFill>
+              </a14:hiddenFill>
+            </a:ext>
+          </a:extLst>
+        </p:spPr>
+      </p:pic>
+      <p:sp>
+        <p:nvSpPr>
+          <p:cNvPr id="12" name="Lekerekített téglalapbuborék 11"/>
+          <p:cNvSpPr/>
+          <p:nvPr/>
+        </p:nvSpPr>
+        <p:spPr>
+          <a:xfrm>
+            <a:off x="877159" y="3067665"/>
+            <a:ext cx="2606733" cy="973393"/>
+          </a:xfrm>
+          <a:prstGeom prst="wedgeRoundRectCallout">
+            <a:avLst>
+              <a:gd name="adj1" fmla="val 64427"/>
+              <a:gd name="adj2" fmla="val -15299"/>
+              <a:gd name="adj3" fmla="val 16667"/>
+            </a:avLst>
+          </a:prstGeom>
+          <a:solidFill>
+            <a:schemeClr val="accent1"/>
+          </a:solidFill>
+          <a:ln w="28575">
+            <a:solidFill>
+              <a:schemeClr val="accent4"/>
+            </a:solidFill>
+          </a:ln>
+          <a:effectLst>
+            <a:outerShdw blurRad="127000" dist="38100" dir="5400000" sx="102000" sy="102000" algn="t" rotWithShape="0">
+              <a:prstClr val="black">
+                <a:alpha val="20000"/>
+              </a:prstClr>
+            </a:outerShdw>
+            <a:softEdge rad="0"/>
+          </a:effectLst>
+        </p:spPr>
+        <p:style>
+          <a:lnRef idx="2">
+            <a:schemeClr val="accent4">
+              <a:shade val="50000"/>
+            </a:schemeClr>
+          </a:lnRef>
+          <a:fillRef idx="1">
+            <a:schemeClr val="accent4"/>
+          </a:fillRef>
+          <a:effectRef idx="0">
+            <a:schemeClr val="accent4"/>
+          </a:effectRef>
+          <a:fontRef idx="minor">
+            <a:schemeClr val="lt1"/>
+          </a:fontRef>
+        </p:style>
+        <p:txBody>
+          <a:bodyPr rot="0" spcFirstLastPara="0" vertOverflow="overflow" horzOverflow="overflow" vert="horz" wrap="square" lIns="91440" tIns="45720" rIns="91440" bIns="45720" numCol="1" spcCol="0" rtlCol="0" fromWordArt="0" anchor="ctr" anchorCtr="0" forceAA="0" compatLnSpc="1">
+            <a:prstTxWarp prst="textNoShape">
+              <a:avLst/>
+            </a:prstTxWarp>
+            <a:noAutofit/>
+          </a:bodyPr>
+          <a:lstStyle/>
+          <a:p>
+            <a:pPr algn="ctr"/>
+            <a:r>
+              <a:rPr lang="hu-HU" sz="2400" dirty="0" err="1" smtClean="0">
+                <a:solidFill>
+                  <a:schemeClr val="accent2"/>
+                </a:solidFill>
+              </a:rPr>
+              <a:t>Compiling</a:t>
+            </a:r>
+            <a:endParaRPr lang="en-US" sz="2400" dirty="0" smtClean="0">
+              <a:solidFill>
+                <a:schemeClr val="accent2"/>
+              </a:solidFill>
+            </a:endParaRPr>
           </a:p>
         </p:txBody>
       </p:sp>
@@ -4734,13 +4864,20 @@
   <p:clrMapOvr>
     <a:masterClrMapping/>
   </p:clrMapOvr>
+  <p:timing>
+    <p:tnLst>
+      <p:par>
+        <p:cTn id="1" dur="indefinite" restart="never" nodeType="tmRoot"/>
+      </p:par>
+    </p:tnLst>
+  </p:timing>
 </p:sld>
 </file>
 
 <file path=ppt/theme/theme1.xml><?xml version="1.0" encoding="utf-8"?>
 <a:theme xmlns:a="http://schemas.openxmlformats.org/drawingml/2006/main" name="FTSRG">
   <a:themeElements>
-    <a:clrScheme name="ftsrg-scheme">
+    <a:clrScheme name="20. egyéni séma">
       <a:dk1>
         <a:srgbClr val="000000"/>
       </a:dk1>
@@ -4748,16 +4885,16 @@
         <a:srgbClr val="FFFFFF"/>
       </a:lt1>
       <a:dk2>
-        <a:srgbClr val="621E0F"/>
+        <a:srgbClr val="B83A55"/>
       </a:dk2>
       <a:lt2>
         <a:srgbClr val="FFFFFF"/>
       </a:lt2>
       <a:accent1>
-        <a:srgbClr val="F9DD2F"/>
+        <a:srgbClr val="B83A55"/>
       </a:accent1>
       <a:accent2>
-        <a:srgbClr val="E67300"/>
+        <a:srgbClr val="FFFFFF"/>
       </a:accent2>
       <a:accent3>
         <a:srgbClr val="007D00"/>
@@ -5019,27 +5156,33 @@
     <a:spDef>
       <a:spPr>
         <a:solidFill>
-          <a:srgbClr val="B83A55"/>
+          <a:schemeClr val="accent1"/>
         </a:solidFill>
-        <a:ln w="38100">
-          <a:solidFill>
-            <a:schemeClr val="tx1"/>
+        <a:ln w="28575">
+          <a:solidFill>
+            <a:schemeClr val="accent4"/>
           </a:solidFill>
         </a:ln>
         <a:effectLst>
-          <a:outerShdw blurRad="50800" dist="38100" dir="2700000" algn="tl" rotWithShape="0">
+          <a:outerShdw blurRad="127000" dist="38100" dir="5400000" sx="102000" sy="102000" algn="t" rotWithShape="0">
             <a:prstClr val="black">
-              <a:alpha val="40000"/>
+              <a:alpha val="20000"/>
             </a:prstClr>
           </a:outerShdw>
+          <a:softEdge rad="0"/>
         </a:effectLst>
       </a:spPr>
-      <a:bodyPr rtlCol="0" anchor="ctr"/>
+      <a:bodyPr rot="0" spcFirstLastPara="0" vertOverflow="overflow" horzOverflow="overflow" vert="horz" wrap="square" lIns="91440" tIns="45720" rIns="91440" bIns="45720" numCol="1" spcCol="0" rtlCol="0" fromWordArt="0" anchor="ctr" anchorCtr="0" forceAA="0" compatLnSpc="1">
+        <a:prstTxWarp prst="textNoShape">
+          <a:avLst/>
+        </a:prstTxWarp>
+        <a:noAutofit/>
+      </a:bodyPr>
       <a:lstStyle>
         <a:defPPr algn="ctr">
-          <a:defRPr sz="2400" dirty="0" smtClean="0">
+          <a:defRPr sz="2400" dirty="0" err="1" smtClean="0">
             <a:solidFill>
-              <a:schemeClr val="bg1"/>
+              <a:schemeClr val="accent2"/>
             </a:solidFill>
           </a:defRPr>
         </a:defPPr>
@@ -5193,7 +5336,7 @@
 <file path=ppt/theme/theme2.xml><?xml version="1.0" encoding="utf-8"?>
 <a:theme xmlns:a="http://schemas.openxmlformats.org/drawingml/2006/main" name="1_FTSRG">
   <a:themeElements>
-    <a:clrScheme name="ftsrg-scheme">
+    <a:clrScheme name="19. egyéni séma">
       <a:dk1>
         <a:srgbClr val="000000"/>
       </a:dk1>
@@ -5201,22 +5344,22 @@
         <a:srgbClr val="FFFFFF"/>
       </a:lt1>
       <a:dk2>
-        <a:srgbClr val="621E0F"/>
+        <a:srgbClr val="000000"/>
       </a:dk2>
       <a:lt2>
         <a:srgbClr val="FFFFFF"/>
       </a:lt2>
       <a:accent1>
-        <a:srgbClr val="F9DD2F"/>
+        <a:srgbClr val="FFFFFF"/>
       </a:accent1>
       <a:accent2>
-        <a:srgbClr val="E67300"/>
+        <a:srgbClr val="000000"/>
       </a:accent2>
       <a:accent3>
         <a:srgbClr val="007D00"/>
       </a:accent3>
       <a:accent4>
-        <a:srgbClr val="762536"/>
+        <a:srgbClr val="000000"/>
       </a:accent4>
       <a:accent5>
         <a:srgbClr val="2B56CF"/>
@@ -5472,20 +5615,14 @@
     <a:spDef>
       <a:spPr>
         <a:solidFill>
-          <a:srgbClr val="B83A55"/>
+          <a:srgbClr val="FFFFFF"/>
         </a:solidFill>
         <a:ln w="38100">
           <a:solidFill>
             <a:schemeClr val="tx1"/>
           </a:solidFill>
         </a:ln>
-        <a:effectLst>
-          <a:outerShdw blurRad="50800" dist="38100" dir="2700000" algn="tl" rotWithShape="0">
-            <a:prstClr val="black">
-              <a:alpha val="40000"/>
-            </a:prstClr>
-          </a:outerShdw>
-        </a:effectLst>
+        <a:effectLst/>
       </a:spPr>
       <a:bodyPr rtlCol="0" anchor="ctr"/>
       <a:lstStyle>

</xml_diff>

<commit_message>
Added slide for describing the printable version
</commit_message>
<xml_diff>
--- a/templates/ftsrg-presentation.pptx
+++ b/templates/ftsrg-presentation.pptx
@@ -6,11 +6,12 @@
     <p:sldMasterId id="2147483655" r:id="rId2"/>
   </p:sldMasterIdLst>
   <p:notesMasterIdLst>
-    <p:notesMasterId r:id="rId5"/>
+    <p:notesMasterId r:id="rId6"/>
   </p:notesMasterIdLst>
   <p:sldIdLst>
     <p:sldId id="304" r:id="rId3"/>
     <p:sldId id="305" r:id="rId4"/>
+    <p:sldId id="306" r:id="rId5"/>
   </p:sldIdLst>
   <p:sldSz cx="9144000" cy="6858000" type="screen4x3"/>
   <p:notesSz cx="6858000" cy="9144000"/>
@@ -116,6 +117,7 @@
           <p14:sldIdLst>
             <p14:sldId id="304"/>
             <p14:sldId id="305"/>
+            <p14:sldId id="306"/>
           </p14:sldIdLst>
         </p14:section>
       </p14:sectionLst>
@@ -221,7 +223,7 @@
             <a:fld id="{B9130191-0BE1-0142-AFC1-0297AE024A0E}" type="datetimeFigureOut">
               <a:rPr lang="en-US" smtClean="0"/>
               <a:pPr/>
-              <a:t>11/4/2014</a:t>
+              <a:t>11/16/2014</a:t>
             </a:fld>
             <a:endParaRPr lang="en-US"/>
           </a:p>
@@ -4600,11 +4602,7 @@
             </a:r>
             <a:r>
               <a:rPr lang="hu-HU" dirty="0" smtClean="0"/>
-              <a:t> </a:t>
-            </a:r>
-            <a:r>
-              <a:rPr lang="hu-HU" dirty="0" smtClean="0"/>
-              <a:t>sablon</a:t>
+              <a:t> sablon</a:t>
             </a:r>
             <a:endParaRPr lang="en-US" dirty="0"/>
           </a:p>
@@ -4871,6 +4869,239 @@
       </p:par>
     </p:tnLst>
   </p:timing>
+</p:sld>
+</file>
+
+<file path=ppt/slides/slide3.xml><?xml version="1.0" encoding="utf-8"?>
+<p:sld xmlns:a="http://schemas.openxmlformats.org/drawingml/2006/main" xmlns:r="http://schemas.openxmlformats.org/officeDocument/2006/relationships" xmlns:p="http://schemas.openxmlformats.org/presentationml/2006/main">
+  <p:cSld>
+    <p:spTree>
+      <p:nvGrpSpPr>
+        <p:cNvPr id="1" name=""/>
+        <p:cNvGrpSpPr/>
+        <p:nvPr/>
+      </p:nvGrpSpPr>
+      <p:grpSpPr>
+        <a:xfrm>
+          <a:off x="0" y="0"/>
+          <a:ext cx="0" cy="0"/>
+          <a:chOff x="0" y="0"/>
+          <a:chExt cx="0" cy="0"/>
+        </a:xfrm>
+      </p:grpSpPr>
+      <p:sp>
+        <p:nvSpPr>
+          <p:cNvPr id="2" name="Cím 1"/>
+          <p:cNvSpPr>
+            <a:spLocks noGrp="1"/>
+          </p:cNvSpPr>
+          <p:nvPr>
+            <p:ph type="title"/>
+          </p:nvPr>
+        </p:nvSpPr>
+        <p:spPr/>
+        <p:txBody>
+          <a:bodyPr/>
+          <a:lstStyle/>
+          <a:p>
+            <a:r>
+              <a:rPr lang="hu-HU" dirty="0" smtClean="0"/>
+              <a:t>Nyomtatható sablon alkalmazása</a:t>
+            </a:r>
+            <a:endParaRPr lang="en-US" dirty="0"/>
+          </a:p>
+        </p:txBody>
+      </p:sp>
+      <p:pic>
+        <p:nvPicPr>
+          <p:cNvPr id="6" name="Tartalom helye 5"/>
+          <p:cNvPicPr>
+            <a:picLocks noGrp="1" noChangeAspect="1"/>
+          </p:cNvPicPr>
+          <p:nvPr>
+            <p:ph idx="1"/>
+          </p:nvPr>
+        </p:nvPicPr>
+        <p:blipFill>
+          <a:blip r:embed="rId2"/>
+          <a:stretch>
+            <a:fillRect/>
+          </a:stretch>
+        </p:blipFill>
+        <p:spPr>
+          <a:xfrm>
+            <a:off x="0" y="938316"/>
+            <a:ext cx="9144000" cy="5367131"/>
+          </a:xfrm>
+          <a:prstGeom prst="rect">
+            <a:avLst/>
+          </a:prstGeom>
+        </p:spPr>
+      </p:pic>
+      <p:sp>
+        <p:nvSpPr>
+          <p:cNvPr id="8" name="Lekerekített téglalapbuborék 7"/>
+          <p:cNvSpPr/>
+          <p:nvPr/>
+        </p:nvSpPr>
+        <p:spPr>
+          <a:xfrm>
+            <a:off x="139606" y="1033658"/>
+            <a:ext cx="2020498" cy="595493"/>
+          </a:xfrm>
+          <a:prstGeom prst="wedgeRoundRectCallout">
+            <a:avLst>
+              <a:gd name="adj1" fmla="val -22506"/>
+              <a:gd name="adj2" fmla="val 88171"/>
+              <a:gd name="adj3" fmla="val 16667"/>
+            </a:avLst>
+          </a:prstGeom>
+          <a:solidFill>
+            <a:schemeClr val="accent1"/>
+          </a:solidFill>
+          <a:ln w="28575">
+            <a:solidFill>
+              <a:schemeClr val="accent4"/>
+            </a:solidFill>
+          </a:ln>
+          <a:effectLst>
+            <a:outerShdw blurRad="127000" dist="38100" dir="5400000" sx="102000" sy="102000" algn="t" rotWithShape="0">
+              <a:prstClr val="black">
+                <a:alpha val="20000"/>
+              </a:prstClr>
+            </a:outerShdw>
+            <a:softEdge rad="0"/>
+          </a:effectLst>
+        </p:spPr>
+        <p:style>
+          <a:lnRef idx="2">
+            <a:schemeClr val="accent4">
+              <a:shade val="50000"/>
+            </a:schemeClr>
+          </a:lnRef>
+          <a:fillRef idx="1">
+            <a:schemeClr val="accent4"/>
+          </a:fillRef>
+          <a:effectRef idx="0">
+            <a:schemeClr val="accent4"/>
+          </a:effectRef>
+          <a:fontRef idx="minor">
+            <a:schemeClr val="lt1"/>
+          </a:fontRef>
+        </p:style>
+        <p:txBody>
+          <a:bodyPr rot="0" spcFirstLastPara="0" vertOverflow="overflow" horzOverflow="overflow" vert="horz" wrap="square" lIns="91440" tIns="45720" rIns="91440" bIns="45720" numCol="1" spcCol="0" rtlCol="0" fromWordArt="0" anchor="ctr" anchorCtr="0" forceAA="0" compatLnSpc="1">
+            <a:prstTxWarp prst="textNoShape">
+              <a:avLst/>
+            </a:prstTxWarp>
+            <a:noAutofit/>
+          </a:bodyPr>
+          <a:lstStyle/>
+          <a:p>
+            <a:pPr algn="ctr"/>
+            <a:r>
+              <a:rPr lang="hu-HU" sz="2400" dirty="0" smtClean="0">
+                <a:solidFill>
+                  <a:schemeClr val="accent2"/>
+                </a:solidFill>
+              </a:rPr>
+              <a:t>Színes sablon</a:t>
+            </a:r>
+            <a:endParaRPr lang="en-US" sz="2400" dirty="0" smtClean="0">
+              <a:solidFill>
+                <a:schemeClr val="accent2"/>
+              </a:solidFill>
+            </a:endParaRPr>
+          </a:p>
+        </p:txBody>
+      </p:sp>
+      <p:sp>
+        <p:nvSpPr>
+          <p:cNvPr id="9" name="Lekerekített téglalapbuborék 8"/>
+          <p:cNvSpPr/>
+          <p:nvPr/>
+        </p:nvSpPr>
+        <p:spPr>
+          <a:xfrm>
+            <a:off x="910288" y="2451431"/>
+            <a:ext cx="2893086" cy="607442"/>
+          </a:xfrm>
+          <a:prstGeom prst="wedgeRoundRectCallout">
+            <a:avLst>
+              <a:gd name="adj1" fmla="val -23014"/>
+              <a:gd name="adj2" fmla="val -85411"/>
+              <a:gd name="adj3" fmla="val 16667"/>
+            </a:avLst>
+          </a:prstGeom>
+          <a:solidFill>
+            <a:schemeClr val="accent1"/>
+          </a:solidFill>
+          <a:ln w="28575">
+            <a:solidFill>
+              <a:schemeClr val="accent4"/>
+            </a:solidFill>
+          </a:ln>
+          <a:effectLst>
+            <a:outerShdw blurRad="127000" dist="38100" dir="5400000" sx="102000" sy="102000" algn="t" rotWithShape="0">
+              <a:prstClr val="black">
+                <a:alpha val="20000"/>
+              </a:prstClr>
+            </a:outerShdw>
+            <a:softEdge rad="0"/>
+          </a:effectLst>
+        </p:spPr>
+        <p:style>
+          <a:lnRef idx="2">
+            <a:schemeClr val="accent4">
+              <a:shade val="50000"/>
+            </a:schemeClr>
+          </a:lnRef>
+          <a:fillRef idx="1">
+            <a:schemeClr val="accent4"/>
+          </a:fillRef>
+          <a:effectRef idx="0">
+            <a:schemeClr val="accent4"/>
+          </a:effectRef>
+          <a:fontRef idx="minor">
+            <a:schemeClr val="lt1"/>
+          </a:fontRef>
+        </p:style>
+        <p:txBody>
+          <a:bodyPr rot="0" spcFirstLastPara="0" vertOverflow="overflow" horzOverflow="overflow" vert="horz" wrap="square" lIns="91440" tIns="45720" rIns="91440" bIns="45720" numCol="1" spcCol="0" rtlCol="0" fromWordArt="0" anchor="ctr" anchorCtr="0" forceAA="0" compatLnSpc="1">
+            <a:prstTxWarp prst="textNoShape">
+              <a:avLst/>
+            </a:prstTxWarp>
+            <a:noAutofit/>
+          </a:bodyPr>
+          <a:lstStyle/>
+          <a:p>
+            <a:pPr algn="ctr"/>
+            <a:r>
+              <a:rPr lang="hu-HU" sz="2400" dirty="0" smtClean="0">
+                <a:solidFill>
+                  <a:schemeClr val="accent2"/>
+                </a:solidFill>
+              </a:rPr>
+              <a:t>Nyomtatható sablon</a:t>
+            </a:r>
+            <a:endParaRPr lang="en-US" sz="2400" dirty="0" smtClean="0">
+              <a:solidFill>
+                <a:schemeClr val="accent2"/>
+              </a:solidFill>
+            </a:endParaRPr>
+          </a:p>
+        </p:txBody>
+      </p:sp>
+    </p:spTree>
+    <p:extLst>
+      <p:ext uri="{BB962C8B-B14F-4D97-AF65-F5344CB8AC3E}">
+        <p14:creationId xmlns:p14="http://schemas.microsoft.com/office/powerpoint/2010/main" val="3686697164"/>
+      </p:ext>
+    </p:extLst>
+  </p:cSld>
+  <p:clrMapOvr>
+    <a:masterClrMapping/>
+  </p:clrMapOvr>
 </p:sld>
 </file>
 

</xml_diff>

<commit_message>
Fixed some erros in the color scheme
</commit_message>
<xml_diff>
--- a/templates/ftsrg-presentation.pptx
+++ b/templates/ftsrg-presentation.pptx
@@ -225,7 +225,7 @@
             <a:fld id="{B9130191-0BE1-0142-AFC1-0297AE024A0E}" type="datetimeFigureOut">
               <a:rPr lang="en-US" smtClean="0"/>
               <a:pPr/>
-              <a:t>1/14/2015</a:t>
+              <a:t>1/26/2015</a:t>
             </a:fld>
             <a:endParaRPr lang="en-US"/>
           </a:p>
@@ -3076,13 +3076,6 @@
               </a:rPr>
               <a:t>Méréstechnika és Információs Rendszerek Tanszék</a:t>
             </a:r>
-            <a:endParaRPr lang="hu-HU" sz="1000" b="1" dirty="0" smtClean="0">
-              <a:solidFill>
-                <a:schemeClr val="tx1"/>
-              </a:solidFill>
-              <a:latin typeface="+mn-lt"/>
-              <a:cs typeface="+mn-cs"/>
-            </a:endParaRPr>
           </a:p>
         </p:txBody>
       </p:sp>
@@ -8729,7 +8722,7 @@
             </a:avLst>
           </a:prstGeom>
           <a:solidFill>
-            <a:schemeClr val="accent1"/>
+            <a:schemeClr val="bg2"/>
           </a:solidFill>
           <a:ln w="28575">
             <a:solidFill>
@@ -8774,14 +8767,14 @@
             <a:r>
               <a:rPr lang="hu-HU" sz="2400" dirty="0" err="1" smtClean="0">
                 <a:solidFill>
-                  <a:schemeClr val="accent2"/>
+                  <a:schemeClr val="tx2"/>
                 </a:solidFill>
               </a:rPr>
               <a:t>Compiling</a:t>
             </a:r>
             <a:endParaRPr lang="en-US" sz="2400" dirty="0" smtClean="0">
               <a:solidFill>
-                <a:schemeClr val="accent2"/>
+                <a:schemeClr val="tx2"/>
               </a:solidFill>
             </a:endParaRPr>
           </a:p>
@@ -8899,7 +8892,7 @@
             </a:avLst>
           </a:prstGeom>
           <a:solidFill>
-            <a:schemeClr val="accent1"/>
+            <a:schemeClr val="bg2"/>
           </a:solidFill>
           <a:ln w="28575">
             <a:solidFill>
@@ -8944,7 +8937,7 @@
             <a:r>
               <a:rPr lang="hu-HU" sz="2400" dirty="0" smtClean="0">
                 <a:solidFill>
-                  <a:schemeClr val="accent2"/>
+                  <a:schemeClr val="tx2"/>
                 </a:solidFill>
               </a:rPr>
               <a:t>English </a:t>
@@ -8952,7 +8945,7 @@
             <a:r>
               <a:rPr lang="hu-HU" sz="2400" dirty="0" err="1" smtClean="0">
                 <a:solidFill>
-                  <a:schemeClr val="accent2"/>
+                  <a:schemeClr val="tx2"/>
                 </a:solidFill>
               </a:rPr>
               <a:t>for</a:t>
@@ -8960,7 +8953,7 @@
             <a:r>
               <a:rPr lang="hu-HU" sz="2400" dirty="0" smtClean="0">
                 <a:solidFill>
-                  <a:schemeClr val="accent2"/>
+                  <a:schemeClr val="tx2"/>
                 </a:solidFill>
               </a:rPr>
               <a:t> </a:t>
@@ -8968,14 +8961,14 @@
             <a:r>
               <a:rPr lang="hu-HU" sz="2400" dirty="0" err="1" smtClean="0">
                 <a:solidFill>
-                  <a:schemeClr val="accent2"/>
+                  <a:schemeClr val="tx2"/>
                 </a:solidFill>
               </a:rPr>
               <a:t>presentations</a:t>
             </a:r>
             <a:endParaRPr lang="en-US" sz="2400" dirty="0" smtClean="0">
               <a:solidFill>
-                <a:schemeClr val="accent2"/>
+                <a:schemeClr val="tx2"/>
               </a:solidFill>
             </a:endParaRPr>
           </a:p>
@@ -9000,7 +8993,7 @@
             </a:avLst>
           </a:prstGeom>
           <a:solidFill>
-            <a:schemeClr val="accent1"/>
+            <a:schemeClr val="bg2"/>
           </a:solidFill>
           <a:ln w="28575">
             <a:solidFill>
@@ -9045,7 +9038,7 @@
             <a:r>
               <a:rPr lang="hu-HU" sz="2400" dirty="0" smtClean="0">
                 <a:solidFill>
-                  <a:schemeClr val="accent2"/>
+                  <a:schemeClr val="tx2"/>
                 </a:solidFill>
               </a:rPr>
               <a:t>English </a:t>
@@ -9053,7 +9046,7 @@
             <a:r>
               <a:rPr lang="hu-HU" sz="2400" dirty="0" err="1" smtClean="0">
                 <a:solidFill>
-                  <a:schemeClr val="accent2"/>
+                  <a:schemeClr val="tx2"/>
                 </a:solidFill>
               </a:rPr>
               <a:t>for</a:t>
@@ -9061,14 +9054,14 @@
             <a:r>
               <a:rPr lang="hu-HU" sz="2400" dirty="0" smtClean="0">
                 <a:solidFill>
-                  <a:schemeClr val="accent2"/>
+                  <a:schemeClr val="tx2"/>
                 </a:solidFill>
               </a:rPr>
               <a:t> printing</a:t>
             </a:r>
             <a:endParaRPr lang="en-US" sz="2400" dirty="0" smtClean="0">
               <a:solidFill>
-                <a:schemeClr val="accent2"/>
+                <a:schemeClr val="tx2"/>
               </a:solidFill>
             </a:endParaRPr>
           </a:p>
@@ -9093,7 +9086,7 @@
             </a:avLst>
           </a:prstGeom>
           <a:solidFill>
-            <a:schemeClr val="accent1"/>
+            <a:schemeClr val="bg2"/>
           </a:solidFill>
           <a:ln w="28575">
             <a:solidFill>
@@ -9138,7 +9131,7 @@
             <a:r>
               <a:rPr lang="hu-HU" sz="2400" dirty="0" err="1" smtClean="0">
                 <a:solidFill>
-                  <a:schemeClr val="accent2"/>
+                  <a:schemeClr val="tx2"/>
                 </a:solidFill>
               </a:rPr>
               <a:t>Hungarian</a:t>
@@ -9146,7 +9139,7 @@
             <a:r>
               <a:rPr lang="hu-HU" sz="2400" dirty="0" smtClean="0">
                 <a:solidFill>
-                  <a:schemeClr val="accent2"/>
+                  <a:schemeClr val="tx2"/>
                 </a:solidFill>
               </a:rPr>
               <a:t> </a:t>
@@ -9154,7 +9147,7 @@
             <a:r>
               <a:rPr lang="hu-HU" sz="2400" dirty="0" err="1" smtClean="0">
                 <a:solidFill>
-                  <a:schemeClr val="accent2"/>
+                  <a:schemeClr val="tx2"/>
                 </a:solidFill>
               </a:rPr>
               <a:t>for</a:t>
@@ -9162,7 +9155,7 @@
             <a:r>
               <a:rPr lang="hu-HU" sz="2400" dirty="0" smtClean="0">
                 <a:solidFill>
-                  <a:schemeClr val="accent2"/>
+                  <a:schemeClr val="tx2"/>
                 </a:solidFill>
               </a:rPr>
               <a:t> </a:t>
@@ -9170,14 +9163,14 @@
             <a:r>
               <a:rPr lang="hu-HU" sz="2400" dirty="0" err="1" smtClean="0">
                 <a:solidFill>
-                  <a:schemeClr val="accent2"/>
+                  <a:schemeClr val="tx2"/>
                 </a:solidFill>
               </a:rPr>
               <a:t>presentations</a:t>
             </a:r>
             <a:endParaRPr lang="en-US" sz="2400" dirty="0" smtClean="0">
               <a:solidFill>
-                <a:schemeClr val="accent2"/>
+                <a:schemeClr val="tx2"/>
               </a:solidFill>
             </a:endParaRPr>
           </a:p>
@@ -9202,7 +9195,7 @@
             </a:avLst>
           </a:prstGeom>
           <a:solidFill>
-            <a:schemeClr val="accent1"/>
+            <a:schemeClr val="bg2"/>
           </a:solidFill>
           <a:ln w="28575">
             <a:solidFill>
@@ -9247,7 +9240,7 @@
             <a:r>
               <a:rPr lang="hu-HU" sz="2400" dirty="0" err="1" smtClean="0">
                 <a:solidFill>
-                  <a:schemeClr val="accent2"/>
+                  <a:schemeClr val="tx2"/>
                 </a:solidFill>
               </a:rPr>
               <a:t>Hungarian</a:t>
@@ -9255,7 +9248,7 @@
             <a:r>
               <a:rPr lang="hu-HU" sz="2400" dirty="0" smtClean="0">
                 <a:solidFill>
-                  <a:schemeClr val="accent2"/>
+                  <a:schemeClr val="tx2"/>
                 </a:solidFill>
               </a:rPr>
               <a:t> </a:t>
@@ -9263,7 +9256,7 @@
             <a:r>
               <a:rPr lang="hu-HU" sz="2400" dirty="0" err="1" smtClean="0">
                 <a:solidFill>
-                  <a:schemeClr val="accent2"/>
+                  <a:schemeClr val="tx2"/>
                 </a:solidFill>
               </a:rPr>
               <a:t>for</a:t>
@@ -9271,14 +9264,14 @@
             <a:r>
               <a:rPr lang="hu-HU" sz="2400" dirty="0" smtClean="0">
                 <a:solidFill>
-                  <a:schemeClr val="accent2"/>
+                  <a:schemeClr val="tx2"/>
                 </a:solidFill>
               </a:rPr>
               <a:t> printing</a:t>
             </a:r>
             <a:endParaRPr lang="en-US" sz="2400" dirty="0" smtClean="0">
               <a:solidFill>
-                <a:schemeClr val="accent2"/>
+                <a:schemeClr val="tx2"/>
               </a:solidFill>
             </a:endParaRPr>
           </a:p>
@@ -9307,7 +9300,7 @@
 <file path=ppt/theme/theme1.xml><?xml version="1.0" encoding="utf-8"?>
 <a:theme xmlns:a="http://schemas.openxmlformats.org/drawingml/2006/main" name="FTSRG English (presentation)">
   <a:themeElements>
-    <a:clrScheme name="20. egyéni séma">
+    <a:clrScheme name="28. egyéni séma">
       <a:dk1>
         <a:srgbClr val="000000"/>
       </a:dk1>
@@ -9315,16 +9308,16 @@
         <a:srgbClr val="FFFFFF"/>
       </a:lt1>
       <a:dk2>
-        <a:srgbClr val="B83A55"/>
+        <a:srgbClr val="FFFFFF"/>
       </a:dk2>
       <a:lt2>
-        <a:srgbClr val="FFFFFF"/>
+        <a:srgbClr val="B83A55"/>
       </a:lt2>
       <a:accent1>
         <a:srgbClr val="B83A55"/>
       </a:accent1>
       <a:accent2>
-        <a:srgbClr val="FFFFFF"/>
+        <a:srgbClr val="00B0F0"/>
       </a:accent2>
       <a:accent3>
         <a:srgbClr val="007D00"/>
@@ -9766,7 +9759,7 @@
 <file path=ppt/theme/theme2.xml><?xml version="1.0" encoding="utf-8"?>
 <a:theme xmlns:a="http://schemas.openxmlformats.org/drawingml/2006/main" name="FTSRG magyar (prezentáció)">
   <a:themeElements>
-    <a:clrScheme name="20. egyéni séma">
+    <a:clrScheme name="29. egyéni séma">
       <a:dk1>
         <a:srgbClr val="000000"/>
       </a:dk1>
@@ -9774,16 +9767,16 @@
         <a:srgbClr val="FFFFFF"/>
       </a:lt1>
       <a:dk2>
-        <a:srgbClr val="B83A55"/>
+        <a:srgbClr val="FFFFFF"/>
       </a:dk2>
       <a:lt2>
-        <a:srgbClr val="FFFFFF"/>
+        <a:srgbClr val="B83A55"/>
       </a:lt2>
       <a:accent1>
         <a:srgbClr val="B83A55"/>
       </a:accent1>
       <a:accent2>
-        <a:srgbClr val="FFFFFF"/>
+        <a:srgbClr val="00B0F0"/>
       </a:accent2>
       <a:accent3>
         <a:srgbClr val="007D00"/>
@@ -10225,7 +10218,7 @@
 <file path=ppt/theme/theme3.xml><?xml version="1.0" encoding="utf-8"?>
 <a:theme xmlns:a="http://schemas.openxmlformats.org/drawingml/2006/main" name="FTSRG English (print)">
   <a:themeElements>
-    <a:clrScheme name="19. egyéni séma">
+    <a:clrScheme name="30. egyéni séma">
       <a:dk1>
         <a:srgbClr val="000000"/>
       </a:dk1>
@@ -10239,7 +10232,7 @@
         <a:srgbClr val="FFFFFF"/>
       </a:lt2>
       <a:accent1>
-        <a:srgbClr val="FFFFFF"/>
+        <a:srgbClr val="7F7F7F"/>
       </a:accent1>
       <a:accent2>
         <a:srgbClr val="000000"/>
@@ -10672,7 +10665,7 @@
 <file path=ppt/theme/theme4.xml><?xml version="1.0" encoding="utf-8"?>
 <a:theme xmlns:a="http://schemas.openxmlformats.org/drawingml/2006/main" name="FTSRG magyar (nyomtatható)">
   <a:themeElements>
-    <a:clrScheme name="19. egyéni séma">
+    <a:clrScheme name="31. egyéni séma">
       <a:dk1>
         <a:srgbClr val="000000"/>
       </a:dk1>
@@ -10686,7 +10679,7 @@
         <a:srgbClr val="FFFFFF"/>
       </a:lt2>
       <a:accent1>
-        <a:srgbClr val="FFFFFF"/>
+        <a:srgbClr val="7F7F7F"/>
       </a:accent1>
       <a:accent2>
         <a:srgbClr val="000000"/>

</xml_diff>

<commit_message>
Lots of corrections in the color scheme.
</commit_message>
<xml_diff>
--- a/templates/ftsrg-presentation.pptx
+++ b/templates/ftsrg-presentation.pptx
@@ -3,13 +3,16 @@
 <p:presentation xmlns:a="http://schemas.openxmlformats.org/drawingml/2006/main" xmlns:r="http://schemas.openxmlformats.org/officeDocument/2006/relationships" xmlns:p="http://schemas.openxmlformats.org/presentationml/2006/main" saveSubsetFonts="1" autoCompressPictures="0">
   <p:sldMasterIdLst>
     <p:sldMasterId id="2147483648" r:id="rId1"/>
-    <p:sldMasterId id="2147483662" r:id="rId2"/>
+    <p:sldMasterId id="2147483676" r:id="rId2"/>
     <p:sldMasterId id="2147483655" r:id="rId3"/>
-    <p:sldMasterId id="2147483669" r:id="rId4"/>
+    <p:sldMasterId id="2147483683" r:id="rId4"/>
   </p:sldMasterIdLst>
   <p:notesMasterIdLst>
     <p:notesMasterId r:id="rId8"/>
   </p:notesMasterIdLst>
+  <p:handoutMasterIdLst>
+    <p:handoutMasterId r:id="rId9"/>
+  </p:handoutMasterIdLst>
   <p:sldIdLst>
     <p:sldId id="304" r:id="rId5"/>
     <p:sldId id="305" r:id="rId6"/>
@@ -142,6 +145,171 @@
 </p:presentation>
 </file>
 
+<file path=ppt/handoutMasters/handoutMaster1.xml><?xml version="1.0" encoding="utf-8"?>
+<p:handoutMaster xmlns:a="http://schemas.openxmlformats.org/drawingml/2006/main" xmlns:r="http://schemas.openxmlformats.org/officeDocument/2006/relationships" xmlns:p="http://schemas.openxmlformats.org/presentationml/2006/main">
+  <p:cSld>
+    <p:bg>
+      <p:bgRef idx="1001">
+        <a:schemeClr val="bg1"/>
+      </p:bgRef>
+    </p:bg>
+    <p:spTree>
+      <p:nvGrpSpPr>
+        <p:cNvPr id="1" name=""/>
+        <p:cNvGrpSpPr/>
+        <p:nvPr/>
+      </p:nvGrpSpPr>
+      <p:grpSpPr>
+        <a:xfrm>
+          <a:off x="0" y="0"/>
+          <a:ext cx="0" cy="0"/>
+          <a:chOff x="0" y="0"/>
+          <a:chExt cx="0" cy="0"/>
+        </a:xfrm>
+      </p:grpSpPr>
+      <p:sp>
+        <p:nvSpPr>
+          <p:cNvPr id="2" name="Élőfej helye 1"/>
+          <p:cNvSpPr>
+            <a:spLocks noGrp="1"/>
+          </p:cNvSpPr>
+          <p:nvPr>
+            <p:ph type="hdr" sz="quarter"/>
+          </p:nvPr>
+        </p:nvSpPr>
+        <p:spPr>
+          <a:xfrm>
+            <a:off x="0" y="0"/>
+            <a:ext cx="2971800" cy="458788"/>
+          </a:xfrm>
+          <a:prstGeom prst="rect">
+            <a:avLst/>
+          </a:prstGeom>
+        </p:spPr>
+        <p:txBody>
+          <a:bodyPr vert="horz" lIns="91440" tIns="45720" rIns="91440" bIns="45720" rtlCol="0"/>
+          <a:lstStyle>
+            <a:lvl1pPr algn="l">
+              <a:defRPr sz="1200"/>
+            </a:lvl1pPr>
+          </a:lstStyle>
+          <a:p>
+            <a:endParaRPr lang="hu-HU"/>
+          </a:p>
+        </p:txBody>
+      </p:sp>
+      <p:sp>
+        <p:nvSpPr>
+          <p:cNvPr id="3" name="Dátum helye 2"/>
+          <p:cNvSpPr>
+            <a:spLocks noGrp="1"/>
+          </p:cNvSpPr>
+          <p:nvPr>
+            <p:ph type="dt" sz="quarter" idx="1"/>
+          </p:nvPr>
+        </p:nvSpPr>
+        <p:spPr>
+          <a:xfrm>
+            <a:off x="3884613" y="0"/>
+            <a:ext cx="2971800" cy="458788"/>
+          </a:xfrm>
+          <a:prstGeom prst="rect">
+            <a:avLst/>
+          </a:prstGeom>
+        </p:spPr>
+        <p:txBody>
+          <a:bodyPr vert="horz" lIns="91440" tIns="45720" rIns="91440" bIns="45720" rtlCol="0"/>
+          <a:lstStyle>
+            <a:lvl1pPr algn="r">
+              <a:defRPr sz="1200"/>
+            </a:lvl1pPr>
+          </a:lstStyle>
+          <a:p>
+            <a:fld id="{D320DF98-73A7-40A6-8A84-2EB5B4F2C4CC}" type="datetimeFigureOut">
+              <a:rPr lang="hu-HU" smtClean="0"/>
+              <a:t>2015.01.30.</a:t>
+            </a:fld>
+            <a:endParaRPr lang="hu-HU"/>
+          </a:p>
+        </p:txBody>
+      </p:sp>
+      <p:sp>
+        <p:nvSpPr>
+          <p:cNvPr id="4" name="Élőláb helye 3"/>
+          <p:cNvSpPr>
+            <a:spLocks noGrp="1"/>
+          </p:cNvSpPr>
+          <p:nvPr>
+            <p:ph type="ftr" sz="quarter" idx="2"/>
+          </p:nvPr>
+        </p:nvSpPr>
+        <p:spPr>
+          <a:xfrm>
+            <a:off x="0" y="8685213"/>
+            <a:ext cx="2971800" cy="458787"/>
+          </a:xfrm>
+          <a:prstGeom prst="rect">
+            <a:avLst/>
+          </a:prstGeom>
+        </p:spPr>
+        <p:txBody>
+          <a:bodyPr vert="horz" lIns="91440" tIns="45720" rIns="91440" bIns="45720" rtlCol="0" anchor="b"/>
+          <a:lstStyle>
+            <a:lvl1pPr algn="l">
+              <a:defRPr sz="1200"/>
+            </a:lvl1pPr>
+          </a:lstStyle>
+          <a:p>
+            <a:endParaRPr lang="hu-HU"/>
+          </a:p>
+        </p:txBody>
+      </p:sp>
+      <p:sp>
+        <p:nvSpPr>
+          <p:cNvPr id="5" name="Dia számának helye 4"/>
+          <p:cNvSpPr>
+            <a:spLocks noGrp="1"/>
+          </p:cNvSpPr>
+          <p:nvPr>
+            <p:ph type="sldNum" sz="quarter" idx="3"/>
+          </p:nvPr>
+        </p:nvSpPr>
+        <p:spPr>
+          <a:xfrm>
+            <a:off x="3884613" y="8685213"/>
+            <a:ext cx="2971800" cy="458787"/>
+          </a:xfrm>
+          <a:prstGeom prst="rect">
+            <a:avLst/>
+          </a:prstGeom>
+        </p:spPr>
+        <p:txBody>
+          <a:bodyPr vert="horz" lIns="91440" tIns="45720" rIns="91440" bIns="45720" rtlCol="0" anchor="b"/>
+          <a:lstStyle>
+            <a:lvl1pPr algn="r">
+              <a:defRPr sz="1200"/>
+            </a:lvl1pPr>
+          </a:lstStyle>
+          <a:p>
+            <a:fld id="{84ACCB88-D127-4977-BCAE-B3A8451B9035}" type="slidenum">
+              <a:rPr lang="hu-HU" smtClean="0"/>
+              <a:t>‹#›</a:t>
+            </a:fld>
+            <a:endParaRPr lang="hu-HU"/>
+          </a:p>
+        </p:txBody>
+      </p:sp>
+    </p:spTree>
+    <p:extLst>
+      <p:ext uri="{BB962C8B-B14F-4D97-AF65-F5344CB8AC3E}">
+        <p14:creationId xmlns:p14="http://schemas.microsoft.com/office/powerpoint/2010/main" val="4055352133"/>
+      </p:ext>
+    </p:extLst>
+  </p:cSld>
+  <p:clrMap bg1="lt1" tx1="dk1" bg2="lt2" tx2="dk2" accent1="accent1" accent2="accent2" accent3="accent3" accent4="accent4" accent5="accent5" accent6="accent6" hlink="hlink" folHlink="folHlink"/>
+</p:handoutMaster>
+</file>
+
 <file path=ppt/notesMasters/notesMaster1.xml><?xml version="1.0" encoding="utf-8"?>
 <p:notesMaster xmlns:a="http://schemas.openxmlformats.org/drawingml/2006/main" xmlns:r="http://schemas.openxmlformats.org/officeDocument/2006/relationships" xmlns:p="http://schemas.openxmlformats.org/presentationml/2006/main">
   <p:cSld>
@@ -225,7 +393,7 @@
             <a:fld id="{B9130191-0BE1-0142-AFC1-0297AE024A0E}" type="datetimeFigureOut">
               <a:rPr lang="en-US" smtClean="0"/>
               <a:pPr/>
-              <a:t>1/26/2015</a:t>
+              <a:t>1/30/2015</a:t>
             </a:fld>
             <a:endParaRPr lang="en-US"/>
           </a:p>
@@ -1318,7 +1486,7 @@
     </p:spTree>
     <p:extLst>
       <p:ext uri="{BB962C8B-B14F-4D97-AF65-F5344CB8AC3E}">
-        <p14:creationId xmlns:p14="http://schemas.microsoft.com/office/powerpoint/2010/main" val="3293009689"/>
+        <p14:creationId xmlns:p14="http://schemas.microsoft.com/office/powerpoint/2010/main" val="3821466596"/>
       </p:ext>
     </p:extLst>
   </p:cSld>
@@ -1352,10 +1520,78 @@
           <a:chExt cx="0" cy="0"/>
         </a:xfrm>
       </p:grpSpPr>
+      <p:sp>
+        <p:nvSpPr>
+          <p:cNvPr id="2" name="Téglalap 1"/>
+          <p:cNvSpPr/>
+          <p:nvPr userDrawn="1"/>
+        </p:nvSpPr>
+        <p:spPr>
+          <a:xfrm>
+            <a:off x="355600" y="368300"/>
+            <a:ext cx="1841500" cy="1016000"/>
+          </a:xfrm>
+          <a:prstGeom prst="rect">
+            <a:avLst/>
+          </a:prstGeom>
+          <a:solidFill>
+            <a:schemeClr val="bg2"/>
+          </a:solidFill>
+          <a:ln w="28575">
+            <a:solidFill>
+              <a:schemeClr val="accent4"/>
+            </a:solidFill>
+          </a:ln>
+          <a:effectLst>
+            <a:outerShdw blurRad="127000" dist="38100" dir="5400000" sx="102000" sy="102000" algn="t" rotWithShape="0">
+              <a:prstClr val="black">
+                <a:alpha val="20000"/>
+              </a:prstClr>
+            </a:outerShdw>
+            <a:softEdge rad="0"/>
+          </a:effectLst>
+        </p:spPr>
+        <p:style>
+          <a:lnRef idx="2">
+            <a:schemeClr val="accent4">
+              <a:shade val="50000"/>
+            </a:schemeClr>
+          </a:lnRef>
+          <a:fillRef idx="1">
+            <a:schemeClr val="accent4"/>
+          </a:fillRef>
+          <a:effectRef idx="0">
+            <a:schemeClr val="accent4"/>
+          </a:effectRef>
+          <a:fontRef idx="minor">
+            <a:schemeClr val="lt1"/>
+          </a:fontRef>
+        </p:style>
+        <p:txBody>
+          <a:bodyPr rot="0" spcFirstLastPara="0" vertOverflow="overflow" horzOverflow="overflow" vert="horz" wrap="square" lIns="91440" tIns="45720" rIns="91440" bIns="45720" numCol="1" spcCol="0" rtlCol="0" fromWordArt="0" anchor="ctr" anchorCtr="0" forceAA="0" compatLnSpc="1">
+            <a:prstTxWarp prst="textNoShape">
+              <a:avLst/>
+            </a:prstTxWarp>
+            <a:noAutofit/>
+          </a:bodyPr>
+          <a:lstStyle/>
+          <a:p>
+            <a:pPr algn="ctr"/>
+            <a:r>
+              <a:rPr lang="hu-HU" sz="2400" dirty="0" smtClean="0">
+                <a:solidFill>
+                  <a:schemeClr val="tx2"/>
+                </a:solidFill>
+              </a:rPr>
+              <a:t>hello</a:t>
+            </a:r>
+          </a:p>
+        </p:txBody>
+      </p:sp>
     </p:spTree>
     <p:extLst>
       <p:ext uri="{BB962C8B-B14F-4D97-AF65-F5344CB8AC3E}">
-        <p14:creationId xmlns:p14="http://schemas.microsoft.com/office/powerpoint/2010/main" val="827578058"/>
+        <p14:creationId xmlns:p14="http://schemas.microsoft.com/office/powerpoint/2010/main" val="2198059402"/>
       </p:ext>
     </p:extLst>
   </p:cSld>
@@ -1416,7 +1652,7 @@
           </a:lstStyle>
           <a:p>
             <a:r>
-              <a:rPr lang="hu-HU" smtClean="0"/>
+              <a:rPr lang="hu-HU" dirty="0" smtClean="0"/>
               <a:t>Mintacím szerkesztése</a:t>
             </a:r>
             <a:endParaRPr lang="hu-HU" dirty="0"/>
@@ -1583,7 +1819,7 @@
     </p:spTree>
     <p:extLst>
       <p:ext uri="{BB962C8B-B14F-4D97-AF65-F5344CB8AC3E}">
-        <p14:creationId xmlns:p14="http://schemas.microsoft.com/office/powerpoint/2010/main" val="1814695131"/>
+        <p14:creationId xmlns:p14="http://schemas.microsoft.com/office/powerpoint/2010/main" val="4167484441"/>
       </p:ext>
     </p:extLst>
   </p:cSld>
@@ -2691,6 +2927,67 @@
           <a:chExt cx="0" cy="0"/>
         </a:xfrm>
       </p:grpSpPr>
+      <p:sp>
+        <p:nvSpPr>
+          <p:cNvPr id="2" name="Téglalap 1"/>
+          <p:cNvSpPr/>
+          <p:nvPr userDrawn="1"/>
+        </p:nvSpPr>
+        <p:spPr>
+          <a:xfrm>
+            <a:off x="457200" y="393700"/>
+            <a:ext cx="1676400" cy="1130300"/>
+          </a:xfrm>
+          <a:prstGeom prst="rect">
+            <a:avLst/>
+          </a:prstGeom>
+          <a:solidFill>
+            <a:schemeClr val="bg2"/>
+          </a:solidFill>
+          <a:ln w="38100">
+            <a:solidFill>
+              <a:schemeClr val="tx2"/>
+            </a:solidFill>
+          </a:ln>
+          <a:effectLst/>
+        </p:spPr>
+        <p:style>
+          <a:lnRef idx="2">
+            <a:schemeClr val="accent4">
+              <a:shade val="50000"/>
+            </a:schemeClr>
+          </a:lnRef>
+          <a:fillRef idx="1">
+            <a:schemeClr val="accent4"/>
+          </a:fillRef>
+          <a:effectRef idx="0">
+            <a:schemeClr val="accent4"/>
+          </a:effectRef>
+          <a:fontRef idx="minor">
+            <a:schemeClr val="lt1"/>
+          </a:fontRef>
+        </p:style>
+        <p:txBody>
+          <a:bodyPr rot="0" spcFirstLastPara="0" vertOverflow="overflow" horzOverflow="overflow" vert="horz" wrap="square" lIns="91440" tIns="45720" rIns="91440" bIns="45720" numCol="1" spcCol="0" rtlCol="0" fromWordArt="0" anchor="ctr" anchorCtr="0" forceAA="0" compatLnSpc="1">
+            <a:prstTxWarp prst="textNoShape">
+              <a:avLst/>
+            </a:prstTxWarp>
+            <a:noAutofit/>
+          </a:bodyPr>
+          <a:lstStyle/>
+          <a:p>
+            <a:pPr algn="ctr"/>
+            <a:r>
+              <a:rPr lang="hu-HU" sz="2400" dirty="0" smtClean="0">
+                <a:solidFill>
+                  <a:schemeClr val="tx2"/>
+                </a:solidFill>
+              </a:rPr>
+              <a:t>hello</a:t>
+            </a:r>
+          </a:p>
+        </p:txBody>
+      </p:sp>
     </p:spTree>
     <p:extLst>
       <p:ext uri="{BB962C8B-B14F-4D97-AF65-F5344CB8AC3E}">
@@ -3076,6 +3373,13 @@
               </a:rPr>
               <a:t>Méréstechnika és Információs Rendszerek Tanszék</a:t>
             </a:r>
+            <a:endParaRPr lang="hu-HU" sz="1000" b="1" dirty="0" smtClean="0">
+              <a:solidFill>
+                <a:schemeClr val="tx1"/>
+              </a:solidFill>
+              <a:latin typeface="+mn-lt"/>
+              <a:cs typeface="+mn-cs"/>
+            </a:endParaRPr>
           </a:p>
         </p:txBody>
       </p:sp>
@@ -3410,7 +3714,7 @@
     </p:spTree>
     <p:extLst>
       <p:ext uri="{BB962C8B-B14F-4D97-AF65-F5344CB8AC3E}">
-        <p14:creationId xmlns:p14="http://schemas.microsoft.com/office/powerpoint/2010/main" val="366474087"/>
+        <p14:creationId xmlns:p14="http://schemas.microsoft.com/office/powerpoint/2010/main" val="1988693848"/>
       </p:ext>
     </p:extLst>
   </p:cSld>
@@ -3645,7 +3949,7 @@
     </p:spTree>
     <p:extLst>
       <p:ext uri="{BB962C8B-B14F-4D97-AF65-F5344CB8AC3E}">
-        <p14:creationId xmlns:p14="http://schemas.microsoft.com/office/powerpoint/2010/main" val="2121916538"/>
+        <p14:creationId xmlns:p14="http://schemas.microsoft.com/office/powerpoint/2010/main" val="2381415241"/>
       </p:ext>
     </p:extLst>
   </p:cSld>
@@ -3836,7 +4140,7 @@
     </p:spTree>
     <p:extLst>
       <p:ext uri="{BB962C8B-B14F-4D97-AF65-F5344CB8AC3E}">
-        <p14:creationId xmlns:p14="http://schemas.microsoft.com/office/powerpoint/2010/main" val="2324009716"/>
+        <p14:creationId xmlns:p14="http://schemas.microsoft.com/office/powerpoint/2010/main" val="1214061113"/>
       </p:ext>
     </p:extLst>
   </p:cSld>
@@ -4066,7 +4370,7 @@
     </p:spTree>
     <p:extLst>
       <p:ext uri="{BB962C8B-B14F-4D97-AF65-F5344CB8AC3E}">
-        <p14:creationId xmlns:p14="http://schemas.microsoft.com/office/powerpoint/2010/main" val="808889609"/>
+        <p14:creationId xmlns:p14="http://schemas.microsoft.com/office/powerpoint/2010/main" val="3478613091"/>
       </p:ext>
     </p:extLst>
   </p:cSld>
@@ -4100,10 +4404,71 @@
           <a:chExt cx="0" cy="0"/>
         </a:xfrm>
       </p:grpSpPr>
+      <p:sp>
+        <p:nvSpPr>
+          <p:cNvPr id="2" name="Téglalap 1"/>
+          <p:cNvSpPr/>
+          <p:nvPr userDrawn="1"/>
+        </p:nvSpPr>
+        <p:spPr>
+          <a:xfrm>
+            <a:off x="457200" y="393700"/>
+            <a:ext cx="1676400" cy="1130300"/>
+          </a:xfrm>
+          <a:prstGeom prst="rect">
+            <a:avLst/>
+          </a:prstGeom>
+          <a:solidFill>
+            <a:schemeClr val="bg2"/>
+          </a:solidFill>
+          <a:ln w="38100">
+            <a:solidFill>
+              <a:schemeClr val="tx2"/>
+            </a:solidFill>
+          </a:ln>
+          <a:effectLst/>
+        </p:spPr>
+        <p:style>
+          <a:lnRef idx="2">
+            <a:schemeClr val="accent4">
+              <a:shade val="50000"/>
+            </a:schemeClr>
+          </a:lnRef>
+          <a:fillRef idx="1">
+            <a:schemeClr val="accent4"/>
+          </a:fillRef>
+          <a:effectRef idx="0">
+            <a:schemeClr val="accent4"/>
+          </a:effectRef>
+          <a:fontRef idx="minor">
+            <a:schemeClr val="lt1"/>
+          </a:fontRef>
+        </p:style>
+        <p:txBody>
+          <a:bodyPr rot="0" spcFirstLastPara="0" vertOverflow="overflow" horzOverflow="overflow" vert="horz" wrap="square" lIns="91440" tIns="45720" rIns="91440" bIns="45720" numCol="1" spcCol="0" rtlCol="0" fromWordArt="0" anchor="ctr" anchorCtr="0" forceAA="0" compatLnSpc="1">
+            <a:prstTxWarp prst="textNoShape">
+              <a:avLst/>
+            </a:prstTxWarp>
+            <a:noAutofit/>
+          </a:bodyPr>
+          <a:lstStyle/>
+          <a:p>
+            <a:pPr algn="ctr"/>
+            <a:r>
+              <a:rPr lang="hu-HU" sz="2400" dirty="0" smtClean="0">
+                <a:solidFill>
+                  <a:schemeClr val="tx2"/>
+                </a:solidFill>
+              </a:rPr>
+              <a:t>hello</a:t>
+            </a:r>
+          </a:p>
+        </p:txBody>
+      </p:sp>
     </p:spTree>
     <p:extLst>
       <p:ext uri="{BB962C8B-B14F-4D97-AF65-F5344CB8AC3E}">
-        <p14:creationId xmlns:p14="http://schemas.microsoft.com/office/powerpoint/2010/main" val="2278598205"/>
+        <p14:creationId xmlns:p14="http://schemas.microsoft.com/office/powerpoint/2010/main" val="2367250444"/>
       </p:ext>
     </p:extLst>
   </p:cSld>
@@ -4331,7 +4696,7 @@
     </p:spTree>
     <p:extLst>
       <p:ext uri="{BB962C8B-B14F-4D97-AF65-F5344CB8AC3E}">
-        <p14:creationId xmlns:p14="http://schemas.microsoft.com/office/powerpoint/2010/main" val="1691781001"/>
+        <p14:creationId xmlns:p14="http://schemas.microsoft.com/office/powerpoint/2010/main" val="950233423"/>
       </p:ext>
     </p:extLst>
   </p:cSld>
@@ -4776,6 +5141,74 @@
           <a:chExt cx="0" cy="0"/>
         </a:xfrm>
       </p:grpSpPr>
+      <p:sp>
+        <p:nvSpPr>
+          <p:cNvPr id="2" name="Téglalap 1"/>
+          <p:cNvSpPr/>
+          <p:nvPr userDrawn="1"/>
+        </p:nvSpPr>
+        <p:spPr>
+          <a:xfrm>
+            <a:off x="355600" y="368300"/>
+            <a:ext cx="1841500" cy="1016000"/>
+          </a:xfrm>
+          <a:prstGeom prst="rect">
+            <a:avLst/>
+          </a:prstGeom>
+          <a:solidFill>
+            <a:schemeClr val="bg2"/>
+          </a:solidFill>
+          <a:ln w="28575">
+            <a:solidFill>
+              <a:schemeClr val="accent4"/>
+            </a:solidFill>
+          </a:ln>
+          <a:effectLst>
+            <a:outerShdw blurRad="127000" dist="38100" dir="5400000" sx="102000" sy="102000" algn="t" rotWithShape="0">
+              <a:prstClr val="black">
+                <a:alpha val="20000"/>
+              </a:prstClr>
+            </a:outerShdw>
+            <a:softEdge rad="0"/>
+          </a:effectLst>
+        </p:spPr>
+        <p:style>
+          <a:lnRef idx="2">
+            <a:schemeClr val="accent4">
+              <a:shade val="50000"/>
+            </a:schemeClr>
+          </a:lnRef>
+          <a:fillRef idx="1">
+            <a:schemeClr val="accent4"/>
+          </a:fillRef>
+          <a:effectRef idx="0">
+            <a:schemeClr val="accent4"/>
+          </a:effectRef>
+          <a:fontRef idx="minor">
+            <a:schemeClr val="lt1"/>
+          </a:fontRef>
+        </p:style>
+        <p:txBody>
+          <a:bodyPr rot="0" spcFirstLastPara="0" vertOverflow="overflow" horzOverflow="overflow" vert="horz" wrap="square" lIns="91440" tIns="45720" rIns="91440" bIns="45720" numCol="1" spcCol="0" rtlCol="0" fromWordArt="0" anchor="ctr" anchorCtr="0" forceAA="0" compatLnSpc="1">
+            <a:prstTxWarp prst="textNoShape">
+              <a:avLst/>
+            </a:prstTxWarp>
+            <a:noAutofit/>
+          </a:bodyPr>
+          <a:lstStyle/>
+          <a:p>
+            <a:pPr algn="ctr"/>
+            <a:r>
+              <a:rPr lang="hu-HU" sz="2400" dirty="0" smtClean="0">
+                <a:solidFill>
+                  <a:schemeClr val="tx2"/>
+                </a:solidFill>
+              </a:rPr>
+              <a:t>hello</a:t>
+            </a:r>
+          </a:p>
+        </p:txBody>
+      </p:sp>
     </p:spTree>
   </p:cSld>
   <p:clrMapOvr>
@@ -5149,6 +5582,13 @@
               </a:rPr>
               <a:t>Méréstechnika és Információs Rendszerek Tanszék</a:t>
             </a:r>
+            <a:endParaRPr lang="hu-HU" sz="1000" b="1" dirty="0" smtClean="0">
+              <a:solidFill>
+                <a:schemeClr val="bg1"/>
+              </a:solidFill>
+              <a:latin typeface="+mn-lt"/>
+              <a:cs typeface="+mn-cs"/>
+            </a:endParaRPr>
           </a:p>
         </p:txBody>
       </p:sp>
@@ -5481,7 +5921,7 @@
     </p:spTree>
     <p:extLst>
       <p:ext uri="{BB962C8B-B14F-4D97-AF65-F5344CB8AC3E}">
-        <p14:creationId xmlns:p14="http://schemas.microsoft.com/office/powerpoint/2010/main" val="3500034878"/>
+        <p14:creationId xmlns:p14="http://schemas.microsoft.com/office/powerpoint/2010/main" val="1153055109"/>
       </p:ext>
     </p:extLst>
   </p:cSld>
@@ -5601,7 +6041,7 @@
     </p:spTree>
     <p:extLst>
       <p:ext uri="{BB962C8B-B14F-4D97-AF65-F5344CB8AC3E}">
-        <p14:creationId xmlns:p14="http://schemas.microsoft.com/office/powerpoint/2010/main" val="1596991247"/>
+        <p14:creationId xmlns:p14="http://schemas.microsoft.com/office/powerpoint/2010/main" val="3201956104"/>
       </p:ext>
     </p:extLst>
   </p:cSld>
@@ -5792,7 +6232,7 @@
     </p:spTree>
     <p:extLst>
       <p:ext uri="{BB962C8B-B14F-4D97-AF65-F5344CB8AC3E}">
-        <p14:creationId xmlns:p14="http://schemas.microsoft.com/office/powerpoint/2010/main" val="411037591"/>
+        <p14:creationId xmlns:p14="http://schemas.microsoft.com/office/powerpoint/2010/main" val="2792767967"/>
       </p:ext>
     </p:extLst>
   </p:cSld>
@@ -6093,7 +6533,7 @@
         </a:spcAft>
         <a:defRPr sz="4000" kern="1200">
           <a:solidFill>
-            <a:srgbClr val="F8F8F8"/>
+            <a:schemeClr val="tx2"/>
           </a:solidFill>
           <a:latin typeface="+mj-lt"/>
           <a:ea typeface="+mj-ea"/>
@@ -6737,18 +7177,18 @@
     </p:spTree>
     <p:extLst>
       <p:ext uri="{BB962C8B-B14F-4D97-AF65-F5344CB8AC3E}">
-        <p14:creationId xmlns:p14="http://schemas.microsoft.com/office/powerpoint/2010/main" val="4163453231"/>
+        <p14:creationId xmlns:p14="http://schemas.microsoft.com/office/powerpoint/2010/main" val="1947953705"/>
       </p:ext>
     </p:extLst>
   </p:cSld>
   <p:clrMap bg1="lt1" tx1="dk1" bg2="lt2" tx2="dk2" accent1="accent1" accent2="accent2" accent3="accent3" accent4="accent4" accent5="accent5" accent6="accent6" hlink="hlink" folHlink="folHlink"/>
   <p:sldLayoutIdLst>
-    <p:sldLayoutId id="2147483663" r:id="rId1"/>
-    <p:sldLayoutId id="2147483664" r:id="rId2"/>
-    <p:sldLayoutId id="2147483665" r:id="rId3"/>
-    <p:sldLayoutId id="2147483666" r:id="rId4"/>
-    <p:sldLayoutId id="2147483667" r:id="rId5"/>
-    <p:sldLayoutId id="2147483668" r:id="rId6"/>
+    <p:sldLayoutId id="2147483677" r:id="rId1"/>
+    <p:sldLayoutId id="2147483678" r:id="rId2"/>
+    <p:sldLayoutId id="2147483679" r:id="rId3"/>
+    <p:sldLayoutId id="2147483680" r:id="rId4"/>
+    <p:sldLayoutId id="2147483681" r:id="rId5"/>
+    <p:sldLayoutId id="2147483682" r:id="rId6"/>
   </p:sldLayoutIdLst>
   <p:timing>
     <p:tnLst>
@@ -6768,7 +7208,7 @@
         </a:spcAft>
         <a:defRPr sz="4000" kern="1200">
           <a:solidFill>
-            <a:srgbClr val="F8F8F8"/>
+            <a:schemeClr val="tx2"/>
           </a:solidFill>
           <a:latin typeface="+mj-lt"/>
           <a:ea typeface="+mj-ea"/>
@@ -7431,7 +7871,7 @@
         </a:spcAft>
         <a:defRPr sz="4000" kern="1200">
           <a:solidFill>
-            <a:schemeClr val="tx1"/>
+            <a:schemeClr val="tx2"/>
           </a:solidFill>
           <a:latin typeface="+mj-lt"/>
           <a:ea typeface="+mj-ea"/>
@@ -8063,18 +8503,18 @@
     </p:spTree>
     <p:extLst>
       <p:ext uri="{BB962C8B-B14F-4D97-AF65-F5344CB8AC3E}">
-        <p14:creationId xmlns:p14="http://schemas.microsoft.com/office/powerpoint/2010/main" val="2664175619"/>
+        <p14:creationId xmlns:p14="http://schemas.microsoft.com/office/powerpoint/2010/main" val="3402030969"/>
       </p:ext>
     </p:extLst>
   </p:cSld>
   <p:clrMap bg1="lt1" tx1="dk1" bg2="lt2" tx2="dk2" accent1="accent1" accent2="accent2" accent3="accent3" accent4="accent4" accent5="accent5" accent6="accent6" hlink="hlink" folHlink="folHlink"/>
   <p:sldLayoutIdLst>
-    <p:sldLayoutId id="2147483670" r:id="rId1"/>
-    <p:sldLayoutId id="2147483671" r:id="rId2"/>
-    <p:sldLayoutId id="2147483672" r:id="rId3"/>
-    <p:sldLayoutId id="2147483673" r:id="rId4"/>
-    <p:sldLayoutId id="2147483674" r:id="rId5"/>
-    <p:sldLayoutId id="2147483675" r:id="rId6"/>
+    <p:sldLayoutId id="2147483684" r:id="rId1"/>
+    <p:sldLayoutId id="2147483685" r:id="rId2"/>
+    <p:sldLayoutId id="2147483686" r:id="rId3"/>
+    <p:sldLayoutId id="2147483687" r:id="rId4"/>
+    <p:sldLayoutId id="2147483688" r:id="rId5"/>
+    <p:sldLayoutId id="2147483689" r:id="rId6"/>
   </p:sldLayoutIdLst>
   <p:timing>
     <p:tnLst>
@@ -8094,7 +8534,7 @@
         </a:spcAft>
         <a:defRPr sz="4000" kern="1200">
           <a:solidFill>
-            <a:schemeClr val="tx1"/>
+            <a:schemeClr val="tx2"/>
           </a:solidFill>
           <a:latin typeface="+mj-lt"/>
           <a:ea typeface="+mj-ea"/>
@@ -8530,7 +8970,7 @@
             </a:r>
             <a:r>
               <a:rPr lang="hu-HU" dirty="0" err="1" smtClean="0"/>
-              <a:t>template</a:t>
+              <a:t>Template</a:t>
             </a:r>
             <a:endParaRPr lang="en-US" dirty="0"/>
           </a:p>
@@ -8624,8 +9064,16 @@
           <a:lstStyle/>
           <a:p>
             <a:r>
+              <a:rPr lang="hu-HU" dirty="0" err="1" smtClean="0"/>
+              <a:t>Example</a:t>
+            </a:r>
+            <a:r>
               <a:rPr lang="hu-HU" dirty="0" smtClean="0"/>
-              <a:t>Cím</a:t>
+              <a:t> </a:t>
+            </a:r>
+            <a:r>
+              <a:rPr lang="hu-HU" dirty="0" err="1" smtClean="0"/>
+              <a:t>Slide</a:t>
             </a:r>
             <a:endParaRPr lang="en-US" dirty="0"/>
           </a:p>
@@ -8657,6 +9105,17 @@
                 <a:hlinkClick r:id="rId2"/>
               </a:rPr>
               <a:t>/</a:t>
+            </a:r>
+            <a:endParaRPr lang="hu-HU" dirty="0" smtClean="0"/>
+          </a:p>
+          <a:p>
+            <a:r>
+              <a:rPr lang="hu-HU" dirty="0" smtClean="0"/>
+              <a:t>More </a:t>
+            </a:r>
+            <a:r>
+              <a:rPr lang="hu-HU" dirty="0" err="1" smtClean="0"/>
+              <a:t>items</a:t>
             </a:r>
             <a:endParaRPr lang="en-US" dirty="0"/>
           </a:p>
@@ -8705,37 +9164,36 @@
       </p:pic>
       <p:sp>
         <p:nvSpPr>
-          <p:cNvPr id="12" name="Lekerekített téglalapbuborék 11"/>
+          <p:cNvPr id="9" name="Lekerekített téglalapbuborék 8"/>
           <p:cNvSpPr/>
           <p:nvPr/>
         </p:nvSpPr>
         <p:spPr>
           <a:xfrm>
-            <a:off x="877159" y="3067665"/>
-            <a:ext cx="2606733" cy="973393"/>
+            <a:off x="1099275" y="2986351"/>
+            <a:ext cx="2035914" cy="809611"/>
           </a:xfrm>
           <a:prstGeom prst="wedgeRoundRectCallout">
             <a:avLst>
-              <a:gd name="adj1" fmla="val 64427"/>
-              <a:gd name="adj2" fmla="val -15299"/>
+              <a:gd name="adj1" fmla="val 73019"/>
+              <a:gd name="adj2" fmla="val -22686"/>
               <a:gd name="adj3" fmla="val 16667"/>
             </a:avLst>
           </a:prstGeom>
           <a:solidFill>
             <a:schemeClr val="bg2"/>
           </a:solidFill>
-          <a:ln w="28575">
+          <a:ln w="38100">
             <a:solidFill>
-              <a:schemeClr val="accent4"/>
+              <a:schemeClr val="accent1"/>
             </a:solidFill>
           </a:ln>
           <a:effectLst>
-            <a:outerShdw blurRad="127000" dist="38100" dir="5400000" sx="102000" sy="102000" algn="t" rotWithShape="0">
+            <a:outerShdw blurRad="50800" dist="38100" dir="5400000" algn="t" rotWithShape="0">
               <a:prstClr val="black">
-                <a:alpha val="20000"/>
+                <a:alpha val="40000"/>
               </a:prstClr>
             </a:outerShdw>
-            <a:softEdge rad="0"/>
           </a:effectLst>
         </p:spPr>
         <p:style>
@@ -8765,14 +9223,14 @@
           <a:p>
             <a:pPr algn="ctr"/>
             <a:r>
-              <a:rPr lang="hu-HU" sz="2400" dirty="0" err="1" smtClean="0">
+              <a:rPr lang="hu-HU" sz="2400" dirty="0" err="1">
                 <a:solidFill>
                   <a:schemeClr val="tx2"/>
                 </a:solidFill>
               </a:rPr>
               <a:t>Compiling</a:t>
             </a:r>
-            <a:endParaRPr lang="en-US" sz="2400" dirty="0" smtClean="0">
+            <a:endParaRPr lang="hu-HU" sz="2400" dirty="0">
               <a:solidFill>
                 <a:schemeClr val="tx2"/>
               </a:solidFill>
@@ -8865,7 +9323,7 @@
         </p:blipFill>
         <p:spPr>
           <a:xfrm>
-            <a:off x="84068" y="1454959"/>
+            <a:off x="84067" y="1479969"/>
             <a:ext cx="8975865" cy="3955241"/>
           </a:xfrm>
           <a:prstGeom prst="rect">
@@ -8875,37 +9333,36 @@
       </p:pic>
       <p:sp>
         <p:nvSpPr>
-          <p:cNvPr id="8" name="Lekerekített téglalapbuborék 7"/>
+          <p:cNvPr id="9" name="Lekerekített téglalapbuborék 8"/>
           <p:cNvSpPr/>
           <p:nvPr/>
         </p:nvSpPr>
         <p:spPr>
           <a:xfrm>
-            <a:off x="96768" y="1449418"/>
-            <a:ext cx="2020498" cy="805641"/>
+            <a:off x="2867026" y="3114688"/>
+            <a:ext cx="2035914" cy="809611"/>
           </a:xfrm>
           <a:prstGeom prst="wedgeRoundRectCallout">
             <a:avLst>
-              <a:gd name="adj1" fmla="val -22506"/>
-              <a:gd name="adj2" fmla="val 88171"/>
+              <a:gd name="adj1" fmla="val 28894"/>
+              <a:gd name="adj2" fmla="val -72222"/>
               <a:gd name="adj3" fmla="val 16667"/>
             </a:avLst>
           </a:prstGeom>
           <a:solidFill>
             <a:schemeClr val="bg2"/>
           </a:solidFill>
-          <a:ln w="28575">
+          <a:ln w="38100">
             <a:solidFill>
-              <a:schemeClr val="accent4"/>
+              <a:schemeClr val="accent1"/>
             </a:solidFill>
           </a:ln>
           <a:effectLst>
-            <a:outerShdw blurRad="127000" dist="38100" dir="5400000" sx="102000" sy="102000" algn="t" rotWithShape="0">
+            <a:outerShdw blurRad="50800" dist="38100" dir="5400000" algn="t" rotWithShape="0">
               <a:prstClr val="black">
-                <a:alpha val="20000"/>
+                <a:alpha val="40000"/>
               </a:prstClr>
             </a:outerShdw>
-            <a:softEdge rad="0"/>
           </a:effectLst>
         </p:spPr>
         <p:style>
@@ -8935,12 +9392,20 @@
           <a:p>
             <a:pPr algn="ctr"/>
             <a:r>
+              <a:rPr lang="hu-HU" sz="2400" dirty="0" err="1" smtClean="0">
+                <a:solidFill>
+                  <a:schemeClr val="tx2"/>
+                </a:solidFill>
+              </a:rPr>
+              <a:t>Hungarian</a:t>
+            </a:r>
+            <a:r>
               <a:rPr lang="hu-HU" sz="2400" dirty="0" smtClean="0">
                 <a:solidFill>
                   <a:schemeClr val="tx2"/>
                 </a:solidFill>
               </a:rPr>
-              <a:t>English </a:t>
+              <a:t> </a:t>
             </a:r>
             <a:r>
               <a:rPr lang="hu-HU" sz="2400" dirty="0" err="1" smtClean="0">
@@ -8956,57 +9421,43 @@
                   <a:schemeClr val="tx2"/>
                 </a:solidFill>
               </a:rPr>
-              <a:t> </a:t>
-            </a:r>
-            <a:r>
-              <a:rPr lang="hu-HU" sz="2400" dirty="0" err="1" smtClean="0">
-                <a:solidFill>
-                  <a:schemeClr val="tx2"/>
-                </a:solidFill>
-              </a:rPr>
-              <a:t>presentations</a:t>
-            </a:r>
-            <a:endParaRPr lang="en-US" sz="2400" dirty="0" smtClean="0">
-              <a:solidFill>
-                <a:schemeClr val="tx2"/>
-              </a:solidFill>
-            </a:endParaRPr>
+              <a:t> printing</a:t>
+            </a:r>
           </a:p>
         </p:txBody>
       </p:sp>
       <p:sp>
         <p:nvSpPr>
-          <p:cNvPr id="10" name="Lekerekített téglalapbuborék 9"/>
+          <p:cNvPr id="13" name="Lekerekített téglalapbuborék 12"/>
           <p:cNvSpPr/>
           <p:nvPr/>
         </p:nvSpPr>
         <p:spPr>
           <a:xfrm>
-            <a:off x="338068" y="3202376"/>
-            <a:ext cx="2020498" cy="805641"/>
+            <a:off x="457590" y="3114688"/>
+            <a:ext cx="2035914" cy="809611"/>
           </a:xfrm>
           <a:prstGeom prst="wedgeRoundRectCallout">
             <a:avLst>
-              <a:gd name="adj1" fmla="val 18979"/>
-              <a:gd name="adj2" fmla="val -85231"/>
+              <a:gd name="adj1" fmla="val 28894"/>
+              <a:gd name="adj2" fmla="val -72222"/>
               <a:gd name="adj3" fmla="val 16667"/>
             </a:avLst>
           </a:prstGeom>
           <a:solidFill>
             <a:schemeClr val="bg2"/>
           </a:solidFill>
-          <a:ln w="28575">
+          <a:ln w="38100">
             <a:solidFill>
-              <a:schemeClr val="accent4"/>
+              <a:schemeClr val="accent1"/>
             </a:solidFill>
           </a:ln>
           <a:effectLst>
-            <a:outerShdw blurRad="127000" dist="38100" dir="5400000" sx="102000" sy="102000" algn="t" rotWithShape="0">
+            <a:outerShdw blurRad="50800" dist="38100" dir="5400000" algn="t" rotWithShape="0">
               <a:prstClr val="black">
-                <a:alpha val="20000"/>
+                <a:alpha val="40000"/>
               </a:prstClr>
             </a:outerShdw>
-            <a:softEdge rad="0"/>
           </a:effectLst>
         </p:spPr>
         <p:style>
@@ -9036,7 +9487,7 @@
           <a:p>
             <a:pPr algn="ctr"/>
             <a:r>
-              <a:rPr lang="hu-HU" sz="2400" dirty="0" smtClean="0">
+              <a:rPr lang="hu-HU" sz="2400" dirty="0">
                 <a:solidFill>
                   <a:schemeClr val="tx2"/>
                 </a:solidFill>
@@ -9044,7 +9495,7 @@
               <a:t>English </a:t>
             </a:r>
             <a:r>
-              <a:rPr lang="hu-HU" sz="2400" dirty="0" err="1" smtClean="0">
+              <a:rPr lang="hu-HU" sz="2400" dirty="0" err="1">
                 <a:solidFill>
                   <a:schemeClr val="tx2"/>
                 </a:solidFill>
@@ -9052,54 +9503,48 @@
               <a:t>for</a:t>
             </a:r>
             <a:r>
-              <a:rPr lang="hu-HU" sz="2400" dirty="0" smtClean="0">
+              <a:rPr lang="hu-HU" sz="2400" dirty="0">
                 <a:solidFill>
                   <a:schemeClr val="tx2"/>
                 </a:solidFill>
               </a:rPr>
               <a:t> printing</a:t>
             </a:r>
-            <a:endParaRPr lang="en-US" sz="2400" dirty="0" smtClean="0">
-              <a:solidFill>
-                <a:schemeClr val="tx2"/>
-              </a:solidFill>
-            </a:endParaRPr>
           </a:p>
         </p:txBody>
       </p:sp>
       <p:sp>
         <p:nvSpPr>
-          <p:cNvPr id="11" name="Lekerekített téglalapbuborék 10"/>
+          <p:cNvPr id="14" name="Lekerekített téglalapbuborék 13"/>
           <p:cNvSpPr/>
           <p:nvPr/>
         </p:nvSpPr>
         <p:spPr>
           <a:xfrm>
-            <a:off x="2612566" y="1449418"/>
-            <a:ext cx="2020498" cy="805641"/>
+            <a:off x="2493504" y="1454988"/>
+            <a:ext cx="2035914" cy="809611"/>
           </a:xfrm>
           <a:prstGeom prst="wedgeRoundRectCallout">
             <a:avLst>
-              <a:gd name="adj1" fmla="val -22506"/>
-              <a:gd name="adj2" fmla="val 88171"/>
+              <a:gd name="adj1" fmla="val -28184"/>
+              <a:gd name="adj2" fmla="val 74839"/>
               <a:gd name="adj3" fmla="val 16667"/>
             </a:avLst>
           </a:prstGeom>
           <a:solidFill>
             <a:schemeClr val="bg2"/>
           </a:solidFill>
-          <a:ln w="28575">
+          <a:ln w="38100">
             <a:solidFill>
-              <a:schemeClr val="accent4"/>
+              <a:schemeClr val="accent1"/>
             </a:solidFill>
           </a:ln>
           <a:effectLst>
-            <a:outerShdw blurRad="127000" dist="38100" dir="5400000" sx="102000" sy="102000" algn="t" rotWithShape="0">
+            <a:outerShdw blurRad="50800" dist="38100" dir="5400000" algn="t" rotWithShape="0">
               <a:prstClr val="black">
-                <a:alpha val="20000"/>
+                <a:alpha val="40000"/>
               </a:prstClr>
             </a:outerShdw>
-            <a:softEdge rad="0"/>
           </a:effectLst>
         </p:spPr>
         <p:style>
@@ -9129,7 +9574,7 @@
           <a:p>
             <a:pPr algn="ctr"/>
             <a:r>
-              <a:rPr lang="hu-HU" sz="2400" dirty="0" err="1" smtClean="0">
+              <a:rPr lang="hu-HU" sz="2400" dirty="0" err="1">
                 <a:solidFill>
                   <a:schemeClr val="tx2"/>
                 </a:solidFill>
@@ -9137,7 +9582,7 @@
               <a:t>Hungarian</a:t>
             </a:r>
             <a:r>
-              <a:rPr lang="hu-HU" sz="2400" dirty="0" smtClean="0">
+              <a:rPr lang="hu-HU" sz="2400" dirty="0">
                 <a:solidFill>
                   <a:schemeClr val="tx2"/>
                 </a:solidFill>
@@ -9145,7 +9590,7 @@
               <a:t> </a:t>
             </a:r>
             <a:r>
-              <a:rPr lang="hu-HU" sz="2400" dirty="0" err="1" smtClean="0">
+              <a:rPr lang="hu-HU" sz="2400" dirty="0" err="1">
                 <a:solidFill>
                   <a:schemeClr val="tx2"/>
                 </a:solidFill>
@@ -9153,7 +9598,7 @@
               <a:t>for</a:t>
             </a:r>
             <a:r>
-              <a:rPr lang="hu-HU" sz="2400" dirty="0" smtClean="0">
+              <a:rPr lang="hu-HU" sz="2400" dirty="0">
                 <a:solidFill>
                   <a:schemeClr val="tx2"/>
                 </a:solidFill>
@@ -9161,14 +9606,14 @@
               <a:t> </a:t>
             </a:r>
             <a:r>
-              <a:rPr lang="hu-HU" sz="2400" dirty="0" err="1" smtClean="0">
+              <a:rPr lang="hu-HU" sz="2400" dirty="0" err="1">
                 <a:solidFill>
                   <a:schemeClr val="tx2"/>
                 </a:solidFill>
               </a:rPr>
               <a:t>presentations</a:t>
             </a:r>
-            <a:endParaRPr lang="en-US" sz="2400" dirty="0" smtClean="0">
+            <a:endParaRPr lang="hu-HU" sz="2400" dirty="0">
               <a:solidFill>
                 <a:schemeClr val="tx2"/>
               </a:solidFill>
@@ -9178,37 +9623,36 @@
       </p:sp>
       <p:sp>
         <p:nvSpPr>
-          <p:cNvPr id="12" name="Lekerekített téglalapbuborék 11"/>
+          <p:cNvPr id="15" name="Lekerekített téglalapbuborék 14"/>
           <p:cNvSpPr/>
           <p:nvPr/>
         </p:nvSpPr>
         <p:spPr>
           <a:xfrm>
-            <a:off x="2853866" y="3202376"/>
-            <a:ext cx="2020498" cy="805641"/>
+            <a:off x="84068" y="1454988"/>
+            <a:ext cx="2035914" cy="809611"/>
           </a:xfrm>
           <a:prstGeom prst="wedgeRoundRectCallout">
             <a:avLst>
-              <a:gd name="adj1" fmla="val 18979"/>
-              <a:gd name="adj2" fmla="val -85231"/>
+              <a:gd name="adj1" fmla="val -26780"/>
+              <a:gd name="adj2" fmla="val 74839"/>
               <a:gd name="adj3" fmla="val 16667"/>
             </a:avLst>
           </a:prstGeom>
           <a:solidFill>
             <a:schemeClr val="bg2"/>
           </a:solidFill>
-          <a:ln w="28575">
+          <a:ln w="38100">
             <a:solidFill>
-              <a:schemeClr val="accent4"/>
+              <a:schemeClr val="accent1"/>
             </a:solidFill>
           </a:ln>
           <a:effectLst>
-            <a:outerShdw blurRad="127000" dist="38100" dir="5400000" sx="102000" sy="102000" algn="t" rotWithShape="0">
+            <a:outerShdw blurRad="50800" dist="38100" dir="5400000" algn="t" rotWithShape="0">
               <a:prstClr val="black">
-                <a:alpha val="20000"/>
+                <a:alpha val="40000"/>
               </a:prstClr>
             </a:outerShdw>
-            <a:softEdge rad="0"/>
           </a:effectLst>
         </p:spPr>
         <p:style>
@@ -9238,15 +9682,23 @@
           <a:p>
             <a:pPr algn="ctr"/>
             <a:r>
-              <a:rPr lang="hu-HU" sz="2400" dirty="0" err="1" smtClean="0">
+              <a:rPr lang="hu-HU" sz="2400" dirty="0">
                 <a:solidFill>
                   <a:schemeClr val="tx2"/>
                 </a:solidFill>
               </a:rPr>
-              <a:t>Hungarian</a:t>
-            </a:r>
-            <a:r>
-              <a:rPr lang="hu-HU" sz="2400" dirty="0" smtClean="0">
+              <a:t>English </a:t>
+            </a:r>
+            <a:r>
+              <a:rPr lang="hu-HU" sz="2400" dirty="0" err="1">
+                <a:solidFill>
+                  <a:schemeClr val="tx2"/>
+                </a:solidFill>
+              </a:rPr>
+              <a:t>for</a:t>
+            </a:r>
+            <a:r>
+              <a:rPr lang="hu-HU" sz="2400" dirty="0">
                 <a:solidFill>
                   <a:schemeClr val="tx2"/>
                 </a:solidFill>
@@ -9254,22 +9706,14 @@
               <a:t> </a:t>
             </a:r>
             <a:r>
-              <a:rPr lang="hu-HU" sz="2400" dirty="0" err="1" smtClean="0">
+              <a:rPr lang="hu-HU" sz="2400" dirty="0" err="1">
                 <a:solidFill>
                   <a:schemeClr val="tx2"/>
                 </a:solidFill>
               </a:rPr>
-              <a:t>for</a:t>
-            </a:r>
-            <a:r>
-              <a:rPr lang="hu-HU" sz="2400" dirty="0" smtClean="0">
-                <a:solidFill>
-                  <a:schemeClr val="tx2"/>
-                </a:solidFill>
-              </a:rPr>
-              <a:t> printing</a:t>
-            </a:r>
-            <a:endParaRPr lang="en-US" sz="2400" dirty="0" smtClean="0">
+              <a:t>presentations</a:t>
+            </a:r>
+            <a:endParaRPr lang="hu-HU" sz="2400" dirty="0">
               <a:solidFill>
                 <a:schemeClr val="tx2"/>
               </a:solidFill>
@@ -9300,7 +9744,7 @@
 <file path=ppt/theme/theme1.xml><?xml version="1.0" encoding="utf-8"?>
 <a:theme xmlns:a="http://schemas.openxmlformats.org/drawingml/2006/main" name="FTSRG English (presentation)">
   <a:themeElements>
-    <a:clrScheme name="28. egyéni séma">
+    <a:clrScheme name="1. egyéni séma">
       <a:dk1>
         <a:srgbClr val="000000"/>
       </a:dk1>
@@ -9314,7 +9758,7 @@
         <a:srgbClr val="B83A55"/>
       </a:lt2>
       <a:accent1>
-        <a:srgbClr val="B83A55"/>
+        <a:srgbClr val="762536"/>
       </a:accent1>
       <a:accent2>
         <a:srgbClr val="00B0F0"/>
@@ -9323,10 +9767,10 @@
         <a:srgbClr val="007D00"/>
       </a:accent3>
       <a:accent4>
-        <a:srgbClr val="762536"/>
+        <a:srgbClr val="002060"/>
       </a:accent4>
       <a:accent5>
-        <a:srgbClr val="2B56CF"/>
+        <a:srgbClr val="FFC000"/>
       </a:accent5>
       <a:accent6>
         <a:srgbClr val="929598"/>
@@ -9579,20 +10023,19 @@
     <a:spDef>
       <a:spPr>
         <a:solidFill>
-          <a:schemeClr val="accent1"/>
+          <a:schemeClr val="bg2"/>
         </a:solidFill>
-        <a:ln w="28575">
-          <a:solidFill>
-            <a:schemeClr val="accent4"/>
+        <a:ln w="38100">
+          <a:solidFill>
+            <a:schemeClr val="accent1"/>
           </a:solidFill>
         </a:ln>
         <a:effectLst>
-          <a:outerShdw blurRad="127000" dist="38100" dir="5400000" sx="102000" sy="102000" algn="t" rotWithShape="0">
+          <a:outerShdw blurRad="50800" dist="38100" dir="5400000" algn="t" rotWithShape="0">
             <a:prstClr val="black">
-              <a:alpha val="20000"/>
+              <a:alpha val="40000"/>
             </a:prstClr>
           </a:outerShdw>
-          <a:softEdge rad="0"/>
         </a:effectLst>
       </a:spPr>
       <a:bodyPr rot="0" spcFirstLastPara="0" vertOverflow="overflow" horzOverflow="overflow" vert="horz" wrap="square" lIns="91440" tIns="45720" rIns="91440" bIns="45720" numCol="1" spcCol="0" rtlCol="0" fromWordArt="0" anchor="ctr" anchorCtr="0" forceAA="0" compatLnSpc="1">
@@ -9603,9 +10046,9 @@
       </a:bodyPr>
       <a:lstStyle>
         <a:defPPr algn="ctr">
-          <a:defRPr sz="2400" dirty="0" err="1" smtClean="0">
+          <a:defRPr sz="2400" dirty="0" err="1">
             <a:solidFill>
-              <a:schemeClr val="accent2"/>
+              <a:schemeClr val="tx2"/>
             </a:solidFill>
           </a:defRPr>
         </a:defPPr>
@@ -9759,7 +10202,7 @@
 <file path=ppt/theme/theme2.xml><?xml version="1.0" encoding="utf-8"?>
 <a:theme xmlns:a="http://schemas.openxmlformats.org/drawingml/2006/main" name="FTSRG magyar (prezentáció)">
   <a:themeElements>
-    <a:clrScheme name="29. egyéni séma">
+    <a:clrScheme name="1. egyéni séma">
       <a:dk1>
         <a:srgbClr val="000000"/>
       </a:dk1>
@@ -9773,7 +10216,7 @@
         <a:srgbClr val="B83A55"/>
       </a:lt2>
       <a:accent1>
-        <a:srgbClr val="B83A55"/>
+        <a:srgbClr val="762536"/>
       </a:accent1>
       <a:accent2>
         <a:srgbClr val="00B0F0"/>
@@ -9782,10 +10225,10 @@
         <a:srgbClr val="007D00"/>
       </a:accent3>
       <a:accent4>
-        <a:srgbClr val="762536"/>
+        <a:srgbClr val="002060"/>
       </a:accent4>
       <a:accent5>
-        <a:srgbClr val="2B56CF"/>
+        <a:srgbClr val="FFC000"/>
       </a:accent5>
       <a:accent6>
         <a:srgbClr val="929598"/>
@@ -10038,11 +10481,11 @@
     <a:spDef>
       <a:spPr>
         <a:solidFill>
-          <a:schemeClr val="accent1"/>
+          <a:schemeClr val="bg2"/>
         </a:solidFill>
         <a:ln w="28575">
           <a:solidFill>
-            <a:schemeClr val="accent4"/>
+            <a:schemeClr val="accent1"/>
           </a:solidFill>
         </a:ln>
         <a:effectLst>
@@ -10062,9 +10505,9 @@
       </a:bodyPr>
       <a:lstStyle>
         <a:defPPr algn="ctr">
-          <a:defRPr sz="2400" dirty="0" err="1" smtClean="0">
+          <a:defRPr sz="2400" dirty="0" smtClean="0">
             <a:solidFill>
-              <a:schemeClr val="accent2"/>
+              <a:schemeClr val="tx2"/>
             </a:solidFill>
           </a:defRPr>
         </a:defPPr>
@@ -10218,7 +10661,7 @@
 <file path=ppt/theme/theme3.xml><?xml version="1.0" encoding="utf-8"?>
 <a:theme xmlns:a="http://schemas.openxmlformats.org/drawingml/2006/main" name="FTSRG English (print)">
   <a:themeElements>
-    <a:clrScheme name="30. egyéni séma">
+    <a:clrScheme name="3. egyéni séma">
       <a:dk1>
         <a:srgbClr val="000000"/>
       </a:dk1>
@@ -10232,19 +10675,19 @@
         <a:srgbClr val="FFFFFF"/>
       </a:lt2>
       <a:accent1>
-        <a:srgbClr val="7F7F7F"/>
+        <a:srgbClr val="000000"/>
       </a:accent1>
       <a:accent2>
-        <a:srgbClr val="000000"/>
+        <a:srgbClr val="929598"/>
       </a:accent2>
       <a:accent3>
-        <a:srgbClr val="007D00"/>
+        <a:srgbClr val="929598"/>
       </a:accent3>
       <a:accent4>
-        <a:srgbClr val="000000"/>
+        <a:srgbClr val="929598"/>
       </a:accent4>
       <a:accent5>
-        <a:srgbClr val="2B56CF"/>
+        <a:srgbClr val="929598"/>
       </a:accent5>
       <a:accent6>
         <a:srgbClr val="929598"/>
@@ -10497,21 +10940,32 @@
     <a:spDef>
       <a:spPr>
         <a:solidFill>
-          <a:srgbClr val="FFFFFF"/>
+          <a:schemeClr val="bg2"/>
         </a:solidFill>
         <a:ln w="38100">
           <a:solidFill>
-            <a:schemeClr val="tx1"/>
+            <a:schemeClr val="accent1"/>
           </a:solidFill>
         </a:ln>
-        <a:effectLst/>
+        <a:effectLst>
+          <a:outerShdw blurRad="50800" dist="38100" dir="5400000" algn="t" rotWithShape="0">
+            <a:prstClr val="black">
+              <a:alpha val="40000"/>
+            </a:prstClr>
+          </a:outerShdw>
+        </a:effectLst>
       </a:spPr>
-      <a:bodyPr rtlCol="0" anchor="ctr"/>
+      <a:bodyPr rot="0" spcFirstLastPara="0" vertOverflow="overflow" horzOverflow="overflow" vert="horz" wrap="square" lIns="91440" tIns="45720" rIns="91440" bIns="45720" numCol="1" spcCol="0" rtlCol="0" fromWordArt="0" anchor="ctr" anchorCtr="0" forceAA="0" compatLnSpc="1">
+        <a:prstTxWarp prst="textNoShape">
+          <a:avLst/>
+        </a:prstTxWarp>
+        <a:noAutofit/>
+      </a:bodyPr>
       <a:lstStyle>
         <a:defPPr algn="ctr">
           <a:defRPr sz="2400" dirty="0" smtClean="0">
             <a:solidFill>
-              <a:schemeClr val="bg1"/>
+              <a:schemeClr val="tx2"/>
             </a:solidFill>
           </a:defRPr>
         </a:defPPr>
@@ -10665,7 +11119,7 @@
 <file path=ppt/theme/theme4.xml><?xml version="1.0" encoding="utf-8"?>
 <a:theme xmlns:a="http://schemas.openxmlformats.org/drawingml/2006/main" name="FTSRG magyar (nyomtatható)">
   <a:themeElements>
-    <a:clrScheme name="31. egyéni séma">
+    <a:clrScheme name="3. egyéni séma">
       <a:dk1>
         <a:srgbClr val="000000"/>
       </a:dk1>
@@ -10679,19 +11133,19 @@
         <a:srgbClr val="FFFFFF"/>
       </a:lt2>
       <a:accent1>
-        <a:srgbClr val="7F7F7F"/>
+        <a:srgbClr val="000000"/>
       </a:accent1>
       <a:accent2>
-        <a:srgbClr val="000000"/>
+        <a:srgbClr val="929598"/>
       </a:accent2>
       <a:accent3>
-        <a:srgbClr val="007D00"/>
+        <a:srgbClr val="929598"/>
       </a:accent3>
       <a:accent4>
-        <a:srgbClr val="000000"/>
+        <a:srgbClr val="929598"/>
       </a:accent4>
       <a:accent5>
-        <a:srgbClr val="2B56CF"/>
+        <a:srgbClr val="929598"/>
       </a:accent5>
       <a:accent6>
         <a:srgbClr val="929598"/>
@@ -10944,21 +11398,32 @@
     <a:spDef>
       <a:spPr>
         <a:solidFill>
-          <a:srgbClr val="FFFFFF"/>
+          <a:schemeClr val="bg2"/>
         </a:solidFill>
         <a:ln w="38100">
           <a:solidFill>
-            <a:schemeClr val="tx1"/>
+            <a:schemeClr val="accent1"/>
           </a:solidFill>
         </a:ln>
-        <a:effectLst/>
+        <a:effectLst>
+          <a:outerShdw blurRad="50800" dist="38100" dir="5400000" algn="t" rotWithShape="0">
+            <a:prstClr val="black">
+              <a:alpha val="40000"/>
+            </a:prstClr>
+          </a:outerShdw>
+        </a:effectLst>
       </a:spPr>
-      <a:bodyPr rtlCol="0" anchor="ctr"/>
+      <a:bodyPr rot="0" spcFirstLastPara="0" vertOverflow="overflow" horzOverflow="overflow" vert="horz" wrap="square" lIns="91440" tIns="45720" rIns="91440" bIns="45720" numCol="1" spcCol="0" rtlCol="0" fromWordArt="0" anchor="ctr" anchorCtr="0" forceAA="0" compatLnSpc="1">
+        <a:prstTxWarp prst="textNoShape">
+          <a:avLst/>
+        </a:prstTxWarp>
+        <a:noAutofit/>
+      </a:bodyPr>
       <a:lstStyle>
         <a:defPPr algn="ctr">
-          <a:defRPr sz="2400" dirty="0" smtClean="0">
+          <a:defRPr sz="2400" dirty="0" err="1" smtClean="0">
             <a:solidFill>
-              <a:schemeClr val="bg1"/>
+              <a:schemeClr val="tx2"/>
             </a:solidFill>
           </a:defRPr>
         </a:defPPr>
@@ -11425,4 +11890,265 @@
   </a:objectDefaults>
   <a:extraClrSchemeLst/>
 </a:theme>
+</file>
+
+<file path=ppt/theme/theme6.xml><?xml version="1.0" encoding="utf-8"?>
+<a:theme xmlns:a="http://schemas.openxmlformats.org/drawingml/2006/main" name="Office-téma">
+  <a:themeElements>
+    <a:clrScheme name="Office">
+      <a:dk1>
+        <a:sysClr val="windowText" lastClr="000000"/>
+      </a:dk1>
+      <a:lt1>
+        <a:sysClr val="window" lastClr="FFFFFF"/>
+      </a:lt1>
+      <a:dk2>
+        <a:srgbClr val="44546A"/>
+      </a:dk2>
+      <a:lt2>
+        <a:srgbClr val="E7E6E6"/>
+      </a:lt2>
+      <a:accent1>
+        <a:srgbClr val="5B9BD5"/>
+      </a:accent1>
+      <a:accent2>
+        <a:srgbClr val="ED7D31"/>
+      </a:accent2>
+      <a:accent3>
+        <a:srgbClr val="A5A5A5"/>
+      </a:accent3>
+      <a:accent4>
+        <a:srgbClr val="FFC000"/>
+      </a:accent4>
+      <a:accent5>
+        <a:srgbClr val="4472C4"/>
+      </a:accent5>
+      <a:accent6>
+        <a:srgbClr val="70AD47"/>
+      </a:accent6>
+      <a:hlink>
+        <a:srgbClr val="0563C1"/>
+      </a:hlink>
+      <a:folHlink>
+        <a:srgbClr val="954F72"/>
+      </a:folHlink>
+    </a:clrScheme>
+    <a:fontScheme name="Office">
+      <a:majorFont>
+        <a:latin typeface="Calibri Light" panose="020F0302020204030204"/>
+        <a:ea typeface=""/>
+        <a:cs typeface=""/>
+        <a:font script="Jpan" typeface="ＭＳ Ｐゴシック"/>
+        <a:font script="Hang" typeface="맑은 고딕"/>
+        <a:font script="Hans" typeface="宋体"/>
+        <a:font script="Hant" typeface="新細明體"/>
+        <a:font script="Arab" typeface="Times New Roman"/>
+        <a:font script="Hebr" typeface="Times New Roman"/>
+        <a:font script="Thai" typeface="Angsana New"/>
+        <a:font script="Ethi" typeface="Nyala"/>
+        <a:font script="Beng" typeface="Vrinda"/>
+        <a:font script="Gujr" typeface="Shruti"/>
+        <a:font script="Khmr" typeface="MoolBoran"/>
+        <a:font script="Knda" typeface="Tunga"/>
+        <a:font script="Guru" typeface="Raavi"/>
+        <a:font script="Cans" typeface="Euphemia"/>
+        <a:font script="Cher" typeface="Plantagenet Cherokee"/>
+        <a:font script="Yiii" typeface="Microsoft Yi Baiti"/>
+        <a:font script="Tibt" typeface="Microsoft Himalaya"/>
+        <a:font script="Thaa" typeface="MV Boli"/>
+        <a:font script="Deva" typeface="Mangal"/>
+        <a:font script="Telu" typeface="Gautami"/>
+        <a:font script="Taml" typeface="Latha"/>
+        <a:font script="Syrc" typeface="Estrangelo Edessa"/>
+        <a:font script="Orya" typeface="Kalinga"/>
+        <a:font script="Mlym" typeface="Kartika"/>
+        <a:font script="Laoo" typeface="DokChampa"/>
+        <a:font script="Sinh" typeface="Iskoola Pota"/>
+        <a:font script="Mong" typeface="Mongolian Baiti"/>
+        <a:font script="Viet" typeface="Times New Roman"/>
+        <a:font script="Uigh" typeface="Microsoft Uighur"/>
+        <a:font script="Geor" typeface="Sylfaen"/>
+      </a:majorFont>
+      <a:minorFont>
+        <a:latin typeface="Calibri" panose="020F0502020204030204"/>
+        <a:ea typeface=""/>
+        <a:cs typeface=""/>
+        <a:font script="Jpan" typeface="ＭＳ Ｐゴシック"/>
+        <a:font script="Hang" typeface="맑은 고딕"/>
+        <a:font script="Hans" typeface="宋体"/>
+        <a:font script="Hant" typeface="新細明體"/>
+        <a:font script="Arab" typeface="Arial"/>
+        <a:font script="Hebr" typeface="Arial"/>
+        <a:font script="Thai" typeface="Cordia New"/>
+        <a:font script="Ethi" typeface="Nyala"/>
+        <a:font script="Beng" typeface="Vrinda"/>
+        <a:font script="Gujr" typeface="Shruti"/>
+        <a:font script="Khmr" typeface="DaunPenh"/>
+        <a:font script="Knda" typeface="Tunga"/>
+        <a:font script="Guru" typeface="Raavi"/>
+        <a:font script="Cans" typeface="Euphemia"/>
+        <a:font script="Cher" typeface="Plantagenet Cherokee"/>
+        <a:font script="Yiii" typeface="Microsoft Yi Baiti"/>
+        <a:font script="Tibt" typeface="Microsoft Himalaya"/>
+        <a:font script="Thaa" typeface="MV Boli"/>
+        <a:font script="Deva" typeface="Mangal"/>
+        <a:font script="Telu" typeface="Gautami"/>
+        <a:font script="Taml" typeface="Latha"/>
+        <a:font script="Syrc" typeface="Estrangelo Edessa"/>
+        <a:font script="Orya" typeface="Kalinga"/>
+        <a:font script="Mlym" typeface="Kartika"/>
+        <a:font script="Laoo" typeface="DokChampa"/>
+        <a:font script="Sinh" typeface="Iskoola Pota"/>
+        <a:font script="Mong" typeface="Mongolian Baiti"/>
+        <a:font script="Viet" typeface="Arial"/>
+        <a:font script="Uigh" typeface="Microsoft Uighur"/>
+        <a:font script="Geor" typeface="Sylfaen"/>
+      </a:minorFont>
+    </a:fontScheme>
+    <a:fmtScheme name="Office">
+      <a:fillStyleLst>
+        <a:solidFill>
+          <a:schemeClr val="phClr"/>
+        </a:solidFill>
+        <a:gradFill rotWithShape="1">
+          <a:gsLst>
+            <a:gs pos="0">
+              <a:schemeClr val="phClr">
+                <a:lumMod val="110000"/>
+                <a:satMod val="105000"/>
+                <a:tint val="67000"/>
+              </a:schemeClr>
+            </a:gs>
+            <a:gs pos="50000">
+              <a:schemeClr val="phClr">
+                <a:lumMod val="105000"/>
+                <a:satMod val="103000"/>
+                <a:tint val="73000"/>
+              </a:schemeClr>
+            </a:gs>
+            <a:gs pos="100000">
+              <a:schemeClr val="phClr">
+                <a:lumMod val="105000"/>
+                <a:satMod val="109000"/>
+                <a:tint val="81000"/>
+              </a:schemeClr>
+            </a:gs>
+          </a:gsLst>
+          <a:lin ang="5400000" scaled="0"/>
+        </a:gradFill>
+        <a:gradFill rotWithShape="1">
+          <a:gsLst>
+            <a:gs pos="0">
+              <a:schemeClr val="phClr">
+                <a:satMod val="103000"/>
+                <a:lumMod val="102000"/>
+                <a:tint val="94000"/>
+              </a:schemeClr>
+            </a:gs>
+            <a:gs pos="50000">
+              <a:schemeClr val="phClr">
+                <a:satMod val="110000"/>
+                <a:lumMod val="100000"/>
+                <a:shade val="100000"/>
+              </a:schemeClr>
+            </a:gs>
+            <a:gs pos="100000">
+              <a:schemeClr val="phClr">
+                <a:lumMod val="99000"/>
+                <a:satMod val="120000"/>
+                <a:shade val="78000"/>
+              </a:schemeClr>
+            </a:gs>
+          </a:gsLst>
+          <a:lin ang="5400000" scaled="0"/>
+        </a:gradFill>
+      </a:fillStyleLst>
+      <a:lnStyleLst>
+        <a:ln w="6350" cap="flat" cmpd="sng" algn="ctr">
+          <a:solidFill>
+            <a:schemeClr val="phClr"/>
+          </a:solidFill>
+          <a:prstDash val="solid"/>
+          <a:miter lim="800000"/>
+        </a:ln>
+        <a:ln w="12700" cap="flat" cmpd="sng" algn="ctr">
+          <a:solidFill>
+            <a:schemeClr val="phClr"/>
+          </a:solidFill>
+          <a:prstDash val="solid"/>
+          <a:miter lim="800000"/>
+        </a:ln>
+        <a:ln w="19050" cap="flat" cmpd="sng" algn="ctr">
+          <a:solidFill>
+            <a:schemeClr val="phClr"/>
+          </a:solidFill>
+          <a:prstDash val="solid"/>
+          <a:miter lim="800000"/>
+        </a:ln>
+      </a:lnStyleLst>
+      <a:effectStyleLst>
+        <a:effectStyle>
+          <a:effectLst/>
+        </a:effectStyle>
+        <a:effectStyle>
+          <a:effectLst/>
+        </a:effectStyle>
+        <a:effectStyle>
+          <a:effectLst>
+            <a:outerShdw blurRad="57150" dist="19050" dir="5400000" algn="ctr" rotWithShape="0">
+              <a:srgbClr val="000000">
+                <a:alpha val="63000"/>
+              </a:srgbClr>
+            </a:outerShdw>
+          </a:effectLst>
+        </a:effectStyle>
+      </a:effectStyleLst>
+      <a:bgFillStyleLst>
+        <a:solidFill>
+          <a:schemeClr val="phClr"/>
+        </a:solidFill>
+        <a:solidFill>
+          <a:schemeClr val="phClr">
+            <a:tint val="95000"/>
+            <a:satMod val="170000"/>
+          </a:schemeClr>
+        </a:solidFill>
+        <a:gradFill rotWithShape="1">
+          <a:gsLst>
+            <a:gs pos="0">
+              <a:schemeClr val="phClr">
+                <a:tint val="93000"/>
+                <a:satMod val="150000"/>
+                <a:shade val="98000"/>
+                <a:lumMod val="102000"/>
+              </a:schemeClr>
+            </a:gs>
+            <a:gs pos="50000">
+              <a:schemeClr val="phClr">
+                <a:tint val="98000"/>
+                <a:satMod val="130000"/>
+                <a:shade val="90000"/>
+                <a:lumMod val="103000"/>
+              </a:schemeClr>
+            </a:gs>
+            <a:gs pos="100000">
+              <a:schemeClr val="phClr">
+                <a:shade val="63000"/>
+                <a:satMod val="120000"/>
+              </a:schemeClr>
+            </a:gs>
+          </a:gsLst>
+          <a:lin ang="5400000" scaled="0"/>
+        </a:gradFill>
+      </a:bgFillStyleLst>
+    </a:fmtScheme>
+  </a:themeElements>
+  <a:objectDefaults/>
+  <a:extraClrSchemeLst/>
+  <a:extLst>
+    <a:ext uri="{05A4C25C-085E-4340-85A3-A5531E510DB2}">
+      <thm15:themeFamily xmlns:thm15="http://schemas.microsoft.com/office/thememl/2012/main" name="Office Theme" id="{62F939B6-93AF-4DB8-9C6B-D6C7DFDC589F}" vid="{4A3C46E8-61CC-4603-A589-7422A47A8E4A}"/>
+    </a:ext>
+  </a:extLst>
+</a:theme>
 </file>
</xml_diff>

<commit_message>
add slide number to footer of the PowerPoint template
</commit_message>
<xml_diff>
--- a/templates/ftsrg-presentation.pptx
+++ b/templates/ftsrg-presentation.pptx
@@ -228,7 +228,7 @@
           <a:p>
             <a:fld id="{D320DF98-73A7-40A6-8A84-2EB5B4F2C4CC}" type="datetimeFigureOut">
               <a:rPr lang="hu-HU" smtClean="0"/>
-              <a:t>2015.03.27.</a:t>
+              <a:t>2015.11.13.</a:t>
             </a:fld>
             <a:endParaRPr lang="hu-HU"/>
           </a:p>
@@ -394,7 +394,7 @@
             <a:fld id="{B9130191-0BE1-0142-AFC1-0297AE024A0E}" type="datetimeFigureOut">
               <a:rPr lang="en-US" smtClean="0"/>
               <a:pPr/>
-              <a:t>3/27/2015</a:t>
+              <a:t>11/13/2015</a:t>
             </a:fld>
             <a:endParaRPr lang="en-US"/>
           </a:p>
@@ -1273,6 +1273,30 @@
           </a:p>
         </p:txBody>
       </p:sp>
+      <p:sp>
+        <p:nvSpPr>
+          <p:cNvPr id="6" name="Dia számának helye 5"/>
+          <p:cNvSpPr>
+            <a:spLocks noGrp="1"/>
+          </p:cNvSpPr>
+          <p:nvPr>
+            <p:ph type="sldNum" sz="quarter" idx="10"/>
+          </p:nvPr>
+        </p:nvSpPr>
+        <p:spPr/>
+        <p:txBody>
+          <a:bodyPr/>
+          <a:lstStyle/>
+          <a:p>
+            <a:fld id="{A7C85712-A09B-4560-9D1E-08050AA835BB}" type="slidenum">
+              <a:rPr lang="hu-HU" smtClean="0"/>
+              <a:pPr/>
+              <a:t>‹#›</a:t>
+            </a:fld>
+            <a:endParaRPr lang="hu-HU" dirty="0"/>
+          </a:p>
+        </p:txBody>
+      </p:sp>
     </p:spTree>
   </p:cSld>
   <p:clrMapOvr>
@@ -1495,6 +1519,30 @@
               <a:t>Ötödik szint</a:t>
             </a:r>
             <a:endParaRPr lang="hu-HU"/>
+          </a:p>
+        </p:txBody>
+      </p:sp>
+      <p:sp>
+        <p:nvSpPr>
+          <p:cNvPr id="5" name="Dia számának helye 4"/>
+          <p:cNvSpPr>
+            <a:spLocks noGrp="1"/>
+          </p:cNvSpPr>
+          <p:nvPr>
+            <p:ph type="sldNum" sz="quarter" idx="10"/>
+          </p:nvPr>
+        </p:nvSpPr>
+        <p:spPr/>
+        <p:txBody>
+          <a:bodyPr/>
+          <a:lstStyle/>
+          <a:p>
+            <a:fld id="{198CDE6E-C629-43CC-9290-30D2F1110D4C}" type="slidenum">
+              <a:rPr lang="hu-HU" smtClean="0"/>
+              <a:pPr/>
+              <a:t>‹#›</a:t>
+            </a:fld>
+            <a:endParaRPr lang="hu-HU" dirty="0"/>
           </a:p>
         </p:txBody>
       </p:sp>
@@ -1982,6 +2030,30 @@
           </a:p>
         </p:txBody>
       </p:sp>
+      <p:sp>
+        <p:nvSpPr>
+          <p:cNvPr id="6" name="Dia számának helye 5"/>
+          <p:cNvSpPr>
+            <a:spLocks noGrp="1"/>
+          </p:cNvSpPr>
+          <p:nvPr>
+            <p:ph type="sldNum" sz="quarter" idx="10"/>
+          </p:nvPr>
+        </p:nvSpPr>
+        <p:spPr/>
+        <p:txBody>
+          <a:bodyPr/>
+          <a:lstStyle/>
+          <a:p>
+            <a:fld id="{A7C85712-A09B-4560-9D1E-08050AA835BB}" type="slidenum">
+              <a:rPr lang="hu-HU" smtClean="0"/>
+              <a:pPr/>
+              <a:t>‹#›</a:t>
+            </a:fld>
+            <a:endParaRPr lang="hu-HU" dirty="0"/>
+          </a:p>
+        </p:txBody>
+      </p:sp>
     </p:spTree>
     <p:extLst>
       <p:ext uri="{BB962C8B-B14F-4D97-AF65-F5344CB8AC3E}">
@@ -2098,6 +2170,30 @@
               <a:rPr lang="hu-HU" dirty="0" smtClean="0"/>
               <a:t>Ötödik szint</a:t>
             </a:r>
+            <a:endParaRPr lang="hu-HU" dirty="0"/>
+          </a:p>
+        </p:txBody>
+      </p:sp>
+      <p:sp>
+        <p:nvSpPr>
+          <p:cNvPr id="4" name="Dia számának helye 3"/>
+          <p:cNvSpPr>
+            <a:spLocks noGrp="1"/>
+          </p:cNvSpPr>
+          <p:nvPr>
+            <p:ph type="sldNum" sz="quarter" idx="10"/>
+          </p:nvPr>
+        </p:nvSpPr>
+        <p:spPr/>
+        <p:txBody>
+          <a:bodyPr/>
+          <a:lstStyle/>
+          <a:p>
+            <a:fld id="{A7C85712-A09B-4560-9D1E-08050AA835BB}" type="slidenum">
+              <a:rPr lang="hu-HU" smtClean="0"/>
+              <a:pPr/>
+              <a:t>‹#›</a:t>
+            </a:fld>
             <a:endParaRPr lang="hu-HU" dirty="0"/>
           </a:p>
         </p:txBody>
@@ -2288,6 +2384,30 @@
           </a:p>
         </p:txBody>
       </p:sp>
+      <p:sp>
+        <p:nvSpPr>
+          <p:cNvPr id="4" name="Dia számának helye 3"/>
+          <p:cNvSpPr>
+            <a:spLocks noGrp="1"/>
+          </p:cNvSpPr>
+          <p:nvPr>
+            <p:ph type="sldNum" sz="quarter" idx="10"/>
+          </p:nvPr>
+        </p:nvSpPr>
+        <p:spPr/>
+        <p:txBody>
+          <a:bodyPr/>
+          <a:lstStyle/>
+          <a:p>
+            <a:fld id="{A7C85712-A09B-4560-9D1E-08050AA835BB}" type="slidenum">
+              <a:rPr lang="hu-HU" smtClean="0"/>
+              <a:pPr/>
+              <a:t>‹#›</a:t>
+            </a:fld>
+            <a:endParaRPr lang="hu-HU" dirty="0"/>
+          </a:p>
+        </p:txBody>
+      </p:sp>
     </p:spTree>
   </p:cSld>
   <p:clrMapOvr>
@@ -2510,6 +2630,30 @@
               <a:t>Ötödik szint</a:t>
             </a:r>
             <a:endParaRPr lang="hu-HU"/>
+          </a:p>
+        </p:txBody>
+      </p:sp>
+      <p:sp>
+        <p:nvSpPr>
+          <p:cNvPr id="5" name="Dia számának helye 4"/>
+          <p:cNvSpPr>
+            <a:spLocks noGrp="1"/>
+          </p:cNvSpPr>
+          <p:nvPr>
+            <p:ph type="sldNum" sz="quarter" idx="10"/>
+          </p:nvPr>
+        </p:nvSpPr>
+        <p:spPr/>
+        <p:txBody>
+          <a:bodyPr/>
+          <a:lstStyle/>
+          <a:p>
+            <a:fld id="{A7C85712-A09B-4560-9D1E-08050AA835BB}" type="slidenum">
+              <a:rPr lang="hu-HU" smtClean="0"/>
+              <a:pPr/>
+              <a:t>‹#›</a:t>
+            </a:fld>
+            <a:endParaRPr lang="hu-HU" dirty="0"/>
           </a:p>
         </p:txBody>
       </p:sp>
@@ -3026,6 +3170,30 @@
           </a:ln>
         </p:spPr>
       </p:pic>
+      <p:sp>
+        <p:nvSpPr>
+          <p:cNvPr id="6" name="Dia számának helye 5"/>
+          <p:cNvSpPr>
+            <a:spLocks noGrp="1"/>
+          </p:cNvSpPr>
+          <p:nvPr>
+            <p:ph type="sldNum" sz="quarter" idx="10"/>
+          </p:nvPr>
+        </p:nvSpPr>
+        <p:spPr/>
+        <p:txBody>
+          <a:bodyPr/>
+          <a:lstStyle/>
+          <a:p>
+            <a:fld id="{198CDE6E-C629-43CC-9290-30D2F1110D4C}" type="slidenum">
+              <a:rPr lang="hu-HU" smtClean="0"/>
+              <a:pPr/>
+              <a:t>‹#›</a:t>
+            </a:fld>
+            <a:endParaRPr lang="hu-HU" dirty="0"/>
+          </a:p>
+        </p:txBody>
+      </p:sp>
     </p:spTree>
     <p:extLst>
       <p:ext uri="{BB962C8B-B14F-4D97-AF65-F5344CB8AC3E}">
@@ -3529,6 +3697,30 @@
           </a:ln>
         </p:spPr>
       </p:pic>
+      <p:sp>
+        <p:nvSpPr>
+          <p:cNvPr id="6" name="Dia számának helye 5"/>
+          <p:cNvSpPr>
+            <a:spLocks noGrp="1"/>
+          </p:cNvSpPr>
+          <p:nvPr>
+            <p:ph type="sldNum" sz="quarter" idx="10"/>
+          </p:nvPr>
+        </p:nvSpPr>
+        <p:spPr/>
+        <p:txBody>
+          <a:bodyPr/>
+          <a:lstStyle/>
+          <a:p>
+            <a:fld id="{198CDE6E-C629-43CC-9290-30D2F1110D4C}" type="slidenum">
+              <a:rPr lang="hu-HU" smtClean="0"/>
+              <a:pPr/>
+              <a:t>‹#›</a:t>
+            </a:fld>
+            <a:endParaRPr lang="hu-HU" dirty="0"/>
+          </a:p>
+        </p:txBody>
+      </p:sp>
     </p:spTree>
     <p:extLst>
       <p:ext uri="{BB962C8B-B14F-4D97-AF65-F5344CB8AC3E}">
@@ -3645,6 +3837,30 @@
               <a:rPr lang="hu-HU" dirty="0" smtClean="0"/>
               <a:t>Ötödik szint</a:t>
             </a:r>
+            <a:endParaRPr lang="hu-HU" dirty="0"/>
+          </a:p>
+        </p:txBody>
+      </p:sp>
+      <p:sp>
+        <p:nvSpPr>
+          <p:cNvPr id="4" name="Dia számának helye 3"/>
+          <p:cNvSpPr>
+            <a:spLocks noGrp="1"/>
+          </p:cNvSpPr>
+          <p:nvPr>
+            <p:ph type="sldNum" sz="quarter" idx="10"/>
+          </p:nvPr>
+        </p:nvSpPr>
+        <p:spPr/>
+        <p:txBody>
+          <a:bodyPr/>
+          <a:lstStyle/>
+          <a:p>
+            <a:fld id="{198CDE6E-C629-43CC-9290-30D2F1110D4C}" type="slidenum">
+              <a:rPr lang="hu-HU" smtClean="0"/>
+              <a:pPr/>
+              <a:t>‹#›</a:t>
+            </a:fld>
             <a:endParaRPr lang="hu-HU" dirty="0"/>
           </a:p>
         </p:txBody>
@@ -3840,6 +4056,30 @@
           </a:p>
         </p:txBody>
       </p:sp>
+      <p:sp>
+        <p:nvSpPr>
+          <p:cNvPr id="4" name="Dia számának helye 3"/>
+          <p:cNvSpPr>
+            <a:spLocks noGrp="1"/>
+          </p:cNvSpPr>
+          <p:nvPr>
+            <p:ph type="sldNum" sz="quarter" idx="10"/>
+          </p:nvPr>
+        </p:nvSpPr>
+        <p:spPr/>
+        <p:txBody>
+          <a:bodyPr/>
+          <a:lstStyle/>
+          <a:p>
+            <a:fld id="{198CDE6E-C629-43CC-9290-30D2F1110D4C}" type="slidenum">
+              <a:rPr lang="hu-HU" smtClean="0"/>
+              <a:pPr/>
+              <a:t>‹#›</a:t>
+            </a:fld>
+            <a:endParaRPr lang="hu-HU" dirty="0"/>
+          </a:p>
+        </p:txBody>
+      </p:sp>
     </p:spTree>
     <p:extLst>
       <p:ext uri="{BB962C8B-B14F-4D97-AF65-F5344CB8AC3E}">
@@ -4115,6 +4355,46 @@
           </a:prstGeom>
         </p:spPr>
       </p:pic>
+      <p:sp>
+        <p:nvSpPr>
+          <p:cNvPr id="2" name="Dia számának helye 1"/>
+          <p:cNvSpPr>
+            <a:spLocks noGrp="1"/>
+          </p:cNvSpPr>
+          <p:nvPr>
+            <p:ph type="sldNum" sz="quarter" idx="4"/>
+          </p:nvPr>
+        </p:nvSpPr>
+        <p:spPr>
+          <a:xfrm>
+            <a:off x="3543300" y="6469695"/>
+            <a:ext cx="2057400" cy="365125"/>
+          </a:xfrm>
+          <a:prstGeom prst="rect">
+            <a:avLst/>
+          </a:prstGeom>
+        </p:spPr>
+        <p:txBody>
+          <a:bodyPr vert="horz" lIns="91440" tIns="45720" rIns="91440" bIns="45720" rtlCol="0" anchor="ctr"/>
+          <a:lstStyle>
+            <a:lvl1pPr algn="ctr">
+              <a:defRPr sz="1200">
+                <a:solidFill>
+                  <a:schemeClr val="tx2"/>
+                </a:solidFill>
+              </a:defRPr>
+            </a:lvl1pPr>
+          </a:lstStyle>
+          <a:p>
+            <a:fld id="{A7C85712-A09B-4560-9D1E-08050AA835BB}" type="slidenum">
+              <a:rPr lang="hu-HU" smtClean="0"/>
+              <a:pPr/>
+              <a:t>‹#›</a:t>
+            </a:fld>
+            <a:endParaRPr lang="hu-HU" dirty="0"/>
+          </a:p>
+        </p:txBody>
+      </p:sp>
     </p:spTree>
   </p:cSld>
   <p:clrMap bg1="lt1" tx1="dk1" bg2="lt2" tx2="dk2" accent1="accent1" accent2="accent2" accent3="accent3" accent4="accent4" accent5="accent5" accent6="accent6" hlink="hlink" folHlink="folHlink"/>
@@ -4132,6 +4412,7 @@
       </p:par>
     </p:tnLst>
   </p:timing>
+  <p:hf hdr="0" ftr="0" dt="0"/>
   <p:txStyles>
     <p:titleStyle>
       <a:lvl1pPr algn="ctr" rtl="0" eaLnBrk="1" fontAlgn="base" hangingPunct="1">
@@ -4772,6 +5053,46 @@
           </a:prstGeom>
         </p:spPr>
       </p:pic>
+      <p:sp>
+        <p:nvSpPr>
+          <p:cNvPr id="2" name="Dia számának helye 1"/>
+          <p:cNvSpPr>
+            <a:spLocks noGrp="1"/>
+          </p:cNvSpPr>
+          <p:nvPr>
+            <p:ph type="sldNum" sz="quarter" idx="4"/>
+          </p:nvPr>
+        </p:nvSpPr>
+        <p:spPr>
+          <a:xfrm>
+            <a:off x="3543300" y="6476539"/>
+            <a:ext cx="2057400" cy="365125"/>
+          </a:xfrm>
+          <a:prstGeom prst="rect">
+            <a:avLst/>
+          </a:prstGeom>
+        </p:spPr>
+        <p:txBody>
+          <a:bodyPr vert="horz" lIns="91440" tIns="45720" rIns="91440" bIns="45720" rtlCol="0" anchor="ctr"/>
+          <a:lstStyle>
+            <a:lvl1pPr algn="ctr">
+              <a:defRPr sz="1200">
+                <a:solidFill>
+                  <a:schemeClr val="tx2"/>
+                </a:solidFill>
+              </a:defRPr>
+            </a:lvl1pPr>
+          </a:lstStyle>
+          <a:p>
+            <a:fld id="{198CDE6E-C629-43CC-9290-30D2F1110D4C}" type="slidenum">
+              <a:rPr lang="hu-HU" smtClean="0"/>
+              <a:pPr/>
+              <a:t>‹#›</a:t>
+            </a:fld>
+            <a:endParaRPr lang="hu-HU" dirty="0"/>
+          </a:p>
+        </p:txBody>
+      </p:sp>
     </p:spTree>
     <p:extLst>
       <p:ext uri="{BB962C8B-B14F-4D97-AF65-F5344CB8AC3E}">
@@ -4794,6 +5115,7 @@
       </p:par>
     </p:tnLst>
   </p:timing>
+  <p:hf hdr="0" ftr="0" dt="0"/>
   <p:txStyles>
     <p:titleStyle>
       <a:lvl1pPr algn="ctr" rtl="0" eaLnBrk="1" fontAlgn="base" hangingPunct="1">
@@ -5279,6 +5601,30 @@
               <a:t>Társszerző Tamás</a:t>
             </a:r>
             <a:endParaRPr lang="en-US" b="1" dirty="0"/>
+          </a:p>
+        </p:txBody>
+      </p:sp>
+      <p:sp>
+        <p:nvSpPr>
+          <p:cNvPr id="3" name="Dia számának helye 2"/>
+          <p:cNvSpPr>
+            <a:spLocks noGrp="1"/>
+          </p:cNvSpPr>
+          <p:nvPr>
+            <p:ph type="sldNum" sz="quarter" idx="10"/>
+          </p:nvPr>
+        </p:nvSpPr>
+        <p:spPr/>
+        <p:txBody>
+          <a:bodyPr/>
+          <a:lstStyle/>
+          <a:p>
+            <a:fld id="{A7C85712-A09B-4560-9D1E-08050AA835BB}" type="slidenum">
+              <a:rPr lang="hu-HU" smtClean="0"/>
+              <a:pPr/>
+              <a:t>1</a:t>
+            </a:fld>
+            <a:endParaRPr lang="hu-HU" dirty="0"/>
           </a:p>
         </p:txBody>
       </p:sp>
@@ -5506,6 +5852,30 @@
                 <a:schemeClr val="tx2"/>
               </a:solidFill>
             </a:endParaRPr>
+          </a:p>
+        </p:txBody>
+      </p:sp>
+      <p:sp>
+        <p:nvSpPr>
+          <p:cNvPr id="4" name="Dia számának helye 3"/>
+          <p:cNvSpPr>
+            <a:spLocks noGrp="1"/>
+          </p:cNvSpPr>
+          <p:nvPr>
+            <p:ph type="sldNum" sz="quarter" idx="10"/>
+          </p:nvPr>
+        </p:nvSpPr>
+        <p:spPr/>
+        <p:txBody>
+          <a:bodyPr/>
+          <a:lstStyle/>
+          <a:p>
+            <a:fld id="{A7C85712-A09B-4560-9D1E-08050AA835BB}" type="slidenum">
+              <a:rPr lang="hu-HU" smtClean="0"/>
+              <a:pPr/>
+              <a:t>2</a:t>
+            </a:fld>
+            <a:endParaRPr lang="hu-HU" dirty="0"/>
           </a:p>
         </p:txBody>
       </p:sp>
@@ -5773,6 +6143,30 @@
                 <a:schemeClr val="tx2"/>
               </a:solidFill>
             </a:endParaRPr>
+          </a:p>
+        </p:txBody>
+      </p:sp>
+      <p:sp>
+        <p:nvSpPr>
+          <p:cNvPr id="4" name="Dia számának helye 3"/>
+          <p:cNvSpPr>
+            <a:spLocks noGrp="1"/>
+          </p:cNvSpPr>
+          <p:nvPr>
+            <p:ph type="sldNum" sz="quarter" idx="10"/>
+          </p:nvPr>
+        </p:nvSpPr>
+        <p:spPr/>
+        <p:txBody>
+          <a:bodyPr/>
+          <a:lstStyle/>
+          <a:p>
+            <a:fld id="{A7C85712-A09B-4560-9D1E-08050AA835BB}" type="slidenum">
+              <a:rPr lang="hu-HU" smtClean="0"/>
+              <a:pPr/>
+              <a:t>3</a:t>
+            </a:fld>
+            <a:endParaRPr lang="hu-HU" dirty="0"/>
           </a:p>
         </p:txBody>
       </p:sp>

</xml_diff>

<commit_message>
use higher resolution of BME logo on black-and-white template from http://www.bme.hu/sites/default/files/mediakit/bme_logo_nagy.jpg
</commit_message>
<xml_diff>
--- a/templates/ftsrg-presentation.pptx
+++ b/templates/ftsrg-presentation.pptx
@@ -228,7 +228,7 @@
           <a:p>
             <a:fld id="{D320DF98-73A7-40A6-8A84-2EB5B4F2C4CC}" type="datetimeFigureOut">
               <a:rPr lang="hu-HU" smtClean="0"/>
-              <a:t>2015.11.13.</a:t>
+              <a:t>2015.11.15.</a:t>
             </a:fld>
             <a:endParaRPr lang="hu-HU"/>
           </a:p>
@@ -394,7 +394,7 @@
             <a:fld id="{B9130191-0BE1-0142-AFC1-0297AE024A0E}" type="datetimeFigureOut">
               <a:rPr lang="en-US" smtClean="0"/>
               <a:pPr/>
-              <a:t>11/13/2015</a:t>
+              <a:t>11/15/2015</a:t>
             </a:fld>
             <a:endParaRPr lang="en-US"/>
           </a:p>
@@ -3108,7 +3108,7 @@
       </p:sp>
       <p:pic>
         <p:nvPicPr>
-          <p:cNvPr id="13" name="Kép 12"/>
+          <p:cNvPr id="18" name="Kép 17"/>
           <p:cNvPicPr>
             <a:picLocks noChangeAspect="1"/>
           </p:cNvPicPr>
@@ -3116,36 +3116,6 @@
         </p:nvPicPr>
         <p:blipFill>
           <a:blip r:embed="rId2">
-            <a:extLst>
-              <a:ext uri="{28A0092B-C50C-407E-A947-70E740481C1C}">
-                <a14:useLocalDpi xmlns:a14="http://schemas.microsoft.com/office/drawing/2010/main" val="0"/>
-              </a:ext>
-            </a:extLst>
-          </a:blip>
-          <a:stretch>
-            <a:fillRect/>
-          </a:stretch>
-        </p:blipFill>
-        <p:spPr>
-          <a:xfrm>
-            <a:off x="7506891" y="6380679"/>
-            <a:ext cx="1598400" cy="428173"/>
-          </a:xfrm>
-          <a:prstGeom prst="rect">
-            <a:avLst/>
-          </a:prstGeom>
-        </p:spPr>
-      </p:pic>
-      <p:pic>
-        <p:nvPicPr>
-          <p:cNvPr id="18" name="Kép 17"/>
-          <p:cNvPicPr>
-            <a:picLocks noChangeAspect="1"/>
-          </p:cNvPicPr>
-          <p:nvPr userDrawn="1"/>
-        </p:nvPicPr>
-        <p:blipFill>
-          <a:blip r:embed="rId3">
             <a:extLst>
               <a:ext uri="{28A0092B-C50C-407E-A947-70E740481C1C}">
                 <a14:useLocalDpi xmlns:a14="http://schemas.microsoft.com/office/drawing/2010/main" val="0"/>
@@ -3194,6 +3164,47 @@
           </a:p>
         </p:txBody>
       </p:sp>
+      <p:pic>
+        <p:nvPicPr>
+          <p:cNvPr id="1026" name="Picture 2" descr="http://www.bme.hu/sites/default/files/mediakit/bme_logo_nagy.jpg"/>
+          <p:cNvPicPr>
+            <a:picLocks noChangeAspect="1" noChangeArrowheads="1"/>
+          </p:cNvPicPr>
+          <p:nvPr userDrawn="1"/>
+        </p:nvPicPr>
+        <p:blipFill>
+          <a:blip r:embed="rId3">
+            <a:extLst>
+              <a:ext uri="{28A0092B-C50C-407E-A947-70E740481C1C}">
+                <a14:useLocalDpi xmlns:a14="http://schemas.microsoft.com/office/drawing/2010/main" val="0"/>
+              </a:ext>
+            </a:extLst>
+          </a:blip>
+          <a:srcRect/>
+          <a:stretch>
+            <a:fillRect/>
+          </a:stretch>
+        </p:blipFill>
+        <p:spPr bwMode="auto">
+          <a:xfrm>
+            <a:off x="7506000" y="6364800"/>
+            <a:ext cx="1604967" cy="450000"/>
+          </a:xfrm>
+          <a:prstGeom prst="rect">
+            <a:avLst/>
+          </a:prstGeom>
+          <a:noFill/>
+          <a:extLst>
+            <a:ext uri="{909E8E84-426E-40DD-AFC4-6F175D3DCCD1}">
+              <a14:hiddenFill xmlns:a14="http://schemas.microsoft.com/office/drawing/2010/main">
+                <a:solidFill>
+                  <a:srgbClr val="FFFFFF"/>
+                </a:solidFill>
+              </a14:hiddenFill>
+            </a:ext>
+          </a:extLst>
+        </p:spPr>
+      </p:pic>
     </p:spTree>
     <p:extLst>
       <p:ext uri="{BB962C8B-B14F-4D97-AF65-F5344CB8AC3E}">
@@ -3635,7 +3646,7 @@
       </p:sp>
       <p:pic>
         <p:nvPicPr>
-          <p:cNvPr id="13" name="Kép 12"/>
+          <p:cNvPr id="18" name="Kép 17"/>
           <p:cNvPicPr>
             <a:picLocks noChangeAspect="1"/>
           </p:cNvPicPr>
@@ -3643,36 +3654,6 @@
         </p:nvPicPr>
         <p:blipFill>
           <a:blip r:embed="rId2">
-            <a:extLst>
-              <a:ext uri="{28A0092B-C50C-407E-A947-70E740481C1C}">
-                <a14:useLocalDpi xmlns:a14="http://schemas.microsoft.com/office/drawing/2010/main" val="0"/>
-              </a:ext>
-            </a:extLst>
-          </a:blip>
-          <a:stretch>
-            <a:fillRect/>
-          </a:stretch>
-        </p:blipFill>
-        <p:spPr>
-          <a:xfrm>
-            <a:off x="7506891" y="6380679"/>
-            <a:ext cx="1598400" cy="428173"/>
-          </a:xfrm>
-          <a:prstGeom prst="rect">
-            <a:avLst/>
-          </a:prstGeom>
-        </p:spPr>
-      </p:pic>
-      <p:pic>
-        <p:nvPicPr>
-          <p:cNvPr id="18" name="Kép 17"/>
-          <p:cNvPicPr>
-            <a:picLocks noChangeAspect="1"/>
-          </p:cNvPicPr>
-          <p:nvPr userDrawn="1"/>
-        </p:nvPicPr>
-        <p:blipFill>
-          <a:blip r:embed="rId3">
             <a:extLst>
               <a:ext uri="{28A0092B-C50C-407E-A947-70E740481C1C}">
                 <a14:useLocalDpi xmlns:a14="http://schemas.microsoft.com/office/drawing/2010/main" val="0"/>
@@ -3721,6 +3702,47 @@
           </a:p>
         </p:txBody>
       </p:sp>
+      <p:pic>
+        <p:nvPicPr>
+          <p:cNvPr id="11" name="Picture 2" descr="http://www.bme.hu/sites/default/files/mediakit/bme_logo_nagy.jpg"/>
+          <p:cNvPicPr>
+            <a:picLocks noChangeAspect="1" noChangeArrowheads="1"/>
+          </p:cNvPicPr>
+          <p:nvPr userDrawn="1"/>
+        </p:nvPicPr>
+        <p:blipFill>
+          <a:blip r:embed="rId3">
+            <a:extLst>
+              <a:ext uri="{28A0092B-C50C-407E-A947-70E740481C1C}">
+                <a14:useLocalDpi xmlns:a14="http://schemas.microsoft.com/office/drawing/2010/main" val="0"/>
+              </a:ext>
+            </a:extLst>
+          </a:blip>
+          <a:srcRect/>
+          <a:stretch>
+            <a:fillRect/>
+          </a:stretch>
+        </p:blipFill>
+        <p:spPr bwMode="auto">
+          <a:xfrm>
+            <a:off x="7506000" y="6364800"/>
+            <a:ext cx="1604966" cy="450000"/>
+          </a:xfrm>
+          <a:prstGeom prst="rect">
+            <a:avLst/>
+          </a:prstGeom>
+          <a:noFill/>
+          <a:extLst>
+            <a:ext uri="{909E8E84-426E-40DD-AFC4-6F175D3DCCD1}">
+              <a14:hiddenFill xmlns:a14="http://schemas.microsoft.com/office/drawing/2010/main">
+                <a:solidFill>
+                  <a:srgbClr val="FFFFFF"/>
+                </a:solidFill>
+              </a14:hiddenFill>
+            </a:ext>
+          </a:extLst>
+        </p:spPr>
+      </p:pic>
     </p:spTree>
     <p:extLst>
       <p:ext uri="{BB962C8B-B14F-4D97-AF65-F5344CB8AC3E}">
@@ -4995,7 +5017,7 @@
       </p:sp>
       <p:pic>
         <p:nvPicPr>
-          <p:cNvPr id="11" name="Kép 10"/>
+          <p:cNvPr id="14" name="Kép 13"/>
           <p:cNvPicPr>
             <a:picLocks noChangeAspect="1"/>
           </p:cNvPicPr>
@@ -5003,36 +5025,6 @@
         </p:nvPicPr>
         <p:blipFill>
           <a:blip r:embed="rId7">
-            <a:extLst>
-              <a:ext uri="{28A0092B-C50C-407E-A947-70E740481C1C}">
-                <a14:useLocalDpi xmlns:a14="http://schemas.microsoft.com/office/drawing/2010/main" val="0"/>
-              </a:ext>
-            </a:extLst>
-          </a:blip>
-          <a:stretch>
-            <a:fillRect/>
-          </a:stretch>
-        </p:blipFill>
-        <p:spPr>
-          <a:xfrm>
-            <a:off x="22185" y="6500811"/>
-            <a:ext cx="1227600" cy="328845"/>
-          </a:xfrm>
-          <a:prstGeom prst="rect">
-            <a:avLst/>
-          </a:prstGeom>
-        </p:spPr>
-      </p:pic>
-      <p:pic>
-        <p:nvPicPr>
-          <p:cNvPr id="14" name="Kép 13"/>
-          <p:cNvPicPr>
-            <a:picLocks noChangeAspect="1"/>
-          </p:cNvPicPr>
-          <p:nvPr userDrawn="1"/>
-        </p:nvPicPr>
-        <p:blipFill>
-          <a:blip r:embed="rId8">
             <a:extLst>
               <a:ext uri="{28A0092B-C50C-407E-A947-70E740481C1C}">
                 <a14:useLocalDpi xmlns:a14="http://schemas.microsoft.com/office/drawing/2010/main" val="0"/>
@@ -5093,6 +5085,47 @@
           </a:p>
         </p:txBody>
       </p:sp>
+      <p:pic>
+        <p:nvPicPr>
+          <p:cNvPr id="8" name="Picture 2" descr="http://www.bme.hu/sites/default/files/mediakit/bme_logo_nagy.jpg"/>
+          <p:cNvPicPr>
+            <a:picLocks noChangeAspect="1" noChangeArrowheads="1"/>
+          </p:cNvPicPr>
+          <p:nvPr userDrawn="1"/>
+        </p:nvPicPr>
+        <p:blipFill>
+          <a:blip r:embed="rId8">
+            <a:extLst>
+              <a:ext uri="{28A0092B-C50C-407E-A947-70E740481C1C}">
+                <a14:useLocalDpi xmlns:a14="http://schemas.microsoft.com/office/drawing/2010/main" val="0"/>
+              </a:ext>
+            </a:extLst>
+          </a:blip>
+          <a:srcRect/>
+          <a:stretch>
+            <a:fillRect/>
+          </a:stretch>
+        </p:blipFill>
+        <p:spPr bwMode="auto">
+          <a:xfrm>
+            <a:off x="21600" y="6491534"/>
+            <a:ext cx="1232612" cy="345600"/>
+          </a:xfrm>
+          <a:prstGeom prst="rect">
+            <a:avLst/>
+          </a:prstGeom>
+          <a:noFill/>
+          <a:extLst>
+            <a:ext uri="{909E8E84-426E-40DD-AFC4-6F175D3DCCD1}">
+              <a14:hiddenFill xmlns:a14="http://schemas.microsoft.com/office/drawing/2010/main">
+                <a:solidFill>
+                  <a:srgbClr val="FFFFFF"/>
+                </a:solidFill>
+              </a14:hiddenFill>
+            </a:ext>
+          </a:extLst>
+        </p:spPr>
+      </p:pic>
     </p:spTree>
     <p:extLst>
       <p:ext uri="{BB962C8B-B14F-4D97-AF65-F5344CB8AC3E}">
@@ -5738,6 +5771,30 @@
           </a:p>
         </p:txBody>
       </p:sp>
+      <p:sp>
+        <p:nvSpPr>
+          <p:cNvPr id="4" name="Dia számának helye 3"/>
+          <p:cNvSpPr>
+            <a:spLocks noGrp="1"/>
+          </p:cNvSpPr>
+          <p:nvPr>
+            <p:ph type="sldNum" sz="quarter" idx="10"/>
+          </p:nvPr>
+        </p:nvSpPr>
+        <p:spPr/>
+        <p:txBody>
+          <a:bodyPr/>
+          <a:lstStyle/>
+          <a:p>
+            <a:fld id="{A7C85712-A09B-4560-9D1E-08050AA835BB}" type="slidenum">
+              <a:rPr lang="hu-HU" smtClean="0"/>
+              <a:pPr/>
+              <a:t>2</a:t>
+            </a:fld>
+            <a:endParaRPr lang="hu-HU" dirty="0"/>
+          </a:p>
+        </p:txBody>
+      </p:sp>
       <p:pic>
         <p:nvPicPr>
           <p:cNvPr id="1026" name="Picture 2" descr="Compiling"/>
@@ -5852,30 +5909,6 @@
                 <a:schemeClr val="tx2"/>
               </a:solidFill>
             </a:endParaRPr>
-          </a:p>
-        </p:txBody>
-      </p:sp>
-      <p:sp>
-        <p:nvSpPr>
-          <p:cNvPr id="4" name="Dia számának helye 3"/>
-          <p:cNvSpPr>
-            <a:spLocks noGrp="1"/>
-          </p:cNvSpPr>
-          <p:nvPr>
-            <p:ph type="sldNum" sz="quarter" idx="10"/>
-          </p:nvPr>
-        </p:nvSpPr>
-        <p:spPr/>
-        <p:txBody>
-          <a:bodyPr/>
-          <a:lstStyle/>
-          <a:p>
-            <a:fld id="{A7C85712-A09B-4560-9D1E-08050AA835BB}" type="slidenum">
-              <a:rPr lang="hu-HU" smtClean="0"/>
-              <a:pPr/>
-              <a:t>2</a:t>
-            </a:fld>
-            <a:endParaRPr lang="hu-HU" dirty="0"/>
           </a:p>
         </p:txBody>
       </p:sp>
@@ -5972,6 +6005,30 @@
       </p:sp>
       <p:sp>
         <p:nvSpPr>
+          <p:cNvPr id="4" name="Dia számának helye 3"/>
+          <p:cNvSpPr>
+            <a:spLocks noGrp="1"/>
+          </p:cNvSpPr>
+          <p:nvPr>
+            <p:ph type="sldNum" sz="quarter" idx="10"/>
+          </p:nvPr>
+        </p:nvSpPr>
+        <p:spPr/>
+        <p:txBody>
+          <a:bodyPr/>
+          <a:lstStyle/>
+          <a:p>
+            <a:fld id="{A7C85712-A09B-4560-9D1E-08050AA835BB}" type="slidenum">
+              <a:rPr lang="hu-HU" smtClean="0"/>
+              <a:pPr/>
+              <a:t>3</a:t>
+            </a:fld>
+            <a:endParaRPr lang="hu-HU" dirty="0"/>
+          </a:p>
+        </p:txBody>
+      </p:sp>
+      <p:sp>
+        <p:nvSpPr>
           <p:cNvPr id="14" name="Lekerekített téglalapbuborék 13"/>
           <p:cNvSpPr/>
           <p:nvPr/>
@@ -6143,30 +6200,6 @@
                 <a:schemeClr val="tx2"/>
               </a:solidFill>
             </a:endParaRPr>
-          </a:p>
-        </p:txBody>
-      </p:sp>
-      <p:sp>
-        <p:nvSpPr>
-          <p:cNvPr id="4" name="Dia számának helye 3"/>
-          <p:cNvSpPr>
-            <a:spLocks noGrp="1"/>
-          </p:cNvSpPr>
-          <p:nvPr>
-            <p:ph type="sldNum" sz="quarter" idx="10"/>
-          </p:nvPr>
-        </p:nvSpPr>
-        <p:spPr/>
-        <p:txBody>
-          <a:bodyPr/>
-          <a:lstStyle/>
-          <a:p>
-            <a:fld id="{A7C85712-A09B-4560-9D1E-08050AA835BB}" type="slidenum">
-              <a:rPr lang="hu-HU" smtClean="0"/>
-              <a:pPr/>
-              <a:t>3</a:t>
-            </a:fld>
-            <a:endParaRPr lang="hu-HU" dirty="0"/>
           </a:p>
         </p:txBody>
       </p:sp>

</xml_diff>

<commit_message>
compress logos to 220 dpi, minor corrections to placement
</commit_message>
<xml_diff>
--- a/templates/ftsrg-presentation.pptx
+++ b/templates/ftsrg-presentation.pptx
@@ -3173,10 +3173,10 @@
           <p:nvPr userDrawn="1"/>
         </p:nvPicPr>
         <p:blipFill>
-          <a:blip r:embed="rId3">
+          <a:blip r:embed="rId3" cstate="print">
             <a:extLst>
               <a:ext uri="{28A0092B-C50C-407E-A947-70E740481C1C}">
-                <a14:useLocalDpi xmlns:a14="http://schemas.microsoft.com/office/drawing/2010/main" val="0"/>
+                <a14:useLocalDpi xmlns:a14="http://schemas.microsoft.com/office/drawing/2010/main"/>
               </a:ext>
             </a:extLst>
           </a:blip>
@@ -3187,7 +3187,7 @@
         </p:blipFill>
         <p:spPr bwMode="auto">
           <a:xfrm>
-            <a:off x="7506000" y="6364800"/>
+            <a:off x="7506000" y="6391304"/>
             <a:ext cx="1604967" cy="450000"/>
           </a:xfrm>
           <a:prstGeom prst="rect">
@@ -3711,10 +3711,10 @@
           <p:nvPr userDrawn="1"/>
         </p:nvPicPr>
         <p:blipFill>
-          <a:blip r:embed="rId3">
+          <a:blip r:embed="rId3" cstate="print">
             <a:extLst>
               <a:ext uri="{28A0092B-C50C-407E-A947-70E740481C1C}">
-                <a14:useLocalDpi xmlns:a14="http://schemas.microsoft.com/office/drawing/2010/main" val="0"/>
+                <a14:useLocalDpi xmlns:a14="http://schemas.microsoft.com/office/drawing/2010/main"/>
               </a:ext>
             </a:extLst>
           </a:blip>
@@ -3725,7 +3725,7 @@
         </p:blipFill>
         <p:spPr bwMode="auto">
           <a:xfrm>
-            <a:off x="7506000" y="6364800"/>
+            <a:off x="7506000" y="6390000"/>
             <a:ext cx="1604966" cy="450000"/>
           </a:xfrm>
           <a:prstGeom prst="rect">
@@ -5094,10 +5094,10 @@
           <p:nvPr userDrawn="1"/>
         </p:nvPicPr>
         <p:blipFill>
-          <a:blip r:embed="rId8">
+          <a:blip r:embed="rId8" cstate="print">
             <a:extLst>
               <a:ext uri="{28A0092B-C50C-407E-A947-70E740481C1C}">
-                <a14:useLocalDpi xmlns:a14="http://schemas.microsoft.com/office/drawing/2010/main" val="0"/>
+                <a14:useLocalDpi xmlns:a14="http://schemas.microsoft.com/office/drawing/2010/main"/>
               </a:ext>
             </a:extLst>
           </a:blip>
@@ -5108,7 +5108,7 @@
         </p:blipFill>
         <p:spPr bwMode="auto">
           <a:xfrm>
-            <a:off x="21600" y="6491534"/>
+            <a:off x="21600" y="6494709"/>
             <a:ext cx="1232612" cy="345600"/>
           </a:xfrm>
           <a:prstGeom prst="rect">

</xml_diff>

<commit_message>
change BME logo to PNG exported from SVG in logos folder
</commit_message>
<xml_diff>
--- a/templates/ftsrg-presentation.pptx
+++ b/templates/ftsrg-presentation.pptx
@@ -3166,29 +3166,28 @@
       </p:sp>
       <p:pic>
         <p:nvPicPr>
-          <p:cNvPr id="1026" name="Picture 2" descr="http://www.bme.hu/sites/default/files/mediakit/bme_logo_nagy.jpg"/>
+          <p:cNvPr id="1026" name="Picture 2"/>
           <p:cNvPicPr>
             <a:picLocks noChangeAspect="1" noChangeArrowheads="1"/>
           </p:cNvPicPr>
           <p:nvPr userDrawn="1"/>
         </p:nvPicPr>
         <p:blipFill>
-          <a:blip r:embed="rId3" cstate="print">
+          <a:blip r:embed="rId3">
             <a:extLst>
               <a:ext uri="{28A0092B-C50C-407E-A947-70E740481C1C}">
-                <a14:useLocalDpi xmlns:a14="http://schemas.microsoft.com/office/drawing/2010/main"/>
+                <a14:useLocalDpi xmlns:a14="http://schemas.microsoft.com/office/drawing/2010/main" val="0"/>
               </a:ext>
             </a:extLst>
           </a:blip>
-          <a:srcRect/>
           <a:stretch>
             <a:fillRect/>
           </a:stretch>
         </p:blipFill>
         <p:spPr bwMode="auto">
           <a:xfrm>
-            <a:off x="7506000" y="6391304"/>
-            <a:ext cx="1604967" cy="450000"/>
+            <a:off x="7506000" y="6401934"/>
+            <a:ext cx="1604967" cy="428739"/>
           </a:xfrm>
           <a:prstGeom prst="rect">
             <a:avLst/>
@@ -3704,29 +3703,28 @@
       </p:sp>
       <p:pic>
         <p:nvPicPr>
-          <p:cNvPr id="11" name="Picture 2" descr="http://www.bme.hu/sites/default/files/mediakit/bme_logo_nagy.jpg"/>
+          <p:cNvPr id="11" name="Picture 2"/>
           <p:cNvPicPr>
             <a:picLocks noChangeAspect="1" noChangeArrowheads="1"/>
           </p:cNvPicPr>
           <p:nvPr userDrawn="1"/>
         </p:nvPicPr>
         <p:blipFill>
-          <a:blip r:embed="rId3" cstate="print">
+          <a:blip r:embed="rId3">
             <a:extLst>
               <a:ext uri="{28A0092B-C50C-407E-A947-70E740481C1C}">
-                <a14:useLocalDpi xmlns:a14="http://schemas.microsoft.com/office/drawing/2010/main"/>
+                <a14:useLocalDpi xmlns:a14="http://schemas.microsoft.com/office/drawing/2010/main" val="0"/>
               </a:ext>
             </a:extLst>
           </a:blip>
-          <a:srcRect/>
           <a:stretch>
             <a:fillRect/>
           </a:stretch>
         </p:blipFill>
         <p:spPr bwMode="auto">
           <a:xfrm>
-            <a:off x="7506000" y="6390000"/>
-            <a:ext cx="1604966" cy="450000"/>
+            <a:off x="7506000" y="6400630"/>
+            <a:ext cx="1604966" cy="428739"/>
           </a:xfrm>
           <a:prstGeom prst="rect">
             <a:avLst/>
@@ -5087,29 +5085,28 @@
       </p:sp>
       <p:pic>
         <p:nvPicPr>
-          <p:cNvPr id="8" name="Picture 2" descr="http://www.bme.hu/sites/default/files/mediakit/bme_logo_nagy.jpg"/>
+          <p:cNvPr id="8" name="Picture 2"/>
           <p:cNvPicPr>
             <a:picLocks noChangeAspect="1" noChangeArrowheads="1"/>
           </p:cNvPicPr>
           <p:nvPr userDrawn="1"/>
         </p:nvPicPr>
         <p:blipFill>
-          <a:blip r:embed="rId8" cstate="print">
+          <a:blip r:embed="rId8">
             <a:extLst>
               <a:ext uri="{28A0092B-C50C-407E-A947-70E740481C1C}">
-                <a14:useLocalDpi xmlns:a14="http://schemas.microsoft.com/office/drawing/2010/main"/>
+                <a14:useLocalDpi xmlns:a14="http://schemas.microsoft.com/office/drawing/2010/main" val="0"/>
               </a:ext>
             </a:extLst>
           </a:blip>
-          <a:srcRect/>
           <a:stretch>
             <a:fillRect/>
           </a:stretch>
         </p:blipFill>
         <p:spPr bwMode="auto">
           <a:xfrm>
-            <a:off x="21600" y="6494709"/>
-            <a:ext cx="1232612" cy="345600"/>
+            <a:off x="21600" y="6502873"/>
+            <a:ext cx="1232612" cy="329271"/>
           </a:xfrm>
           <a:prstGeom prst="rect">
             <a:avLst/>

</xml_diff>

<commit_message>
Update presentation template with new logo
</commit_message>
<xml_diff>
--- a/templates/ftsrg-presentation.pptx
+++ b/templates/ftsrg-presentation.pptx
@@ -228,7 +228,7 @@
           <a:p>
             <a:fld id="{D320DF98-73A7-40A6-8A84-2EB5B4F2C4CC}" type="datetimeFigureOut">
               <a:rPr lang="hu-HU" smtClean="0"/>
-              <a:t>2015.11.15.</a:t>
+              <a:t>2020. 04. 16.</a:t>
             </a:fld>
             <a:endParaRPr lang="hu-HU"/>
           </a:p>
@@ -394,7 +394,7 @@
             <a:fld id="{B9130191-0BE1-0142-AFC1-0297AE024A0E}" type="datetimeFigureOut">
               <a:rPr lang="en-US" smtClean="0"/>
               <a:pPr/>
-              <a:t>11/15/2015</a:t>
+              <a:t>4/16/2020</a:t>
             </a:fld>
             <a:endParaRPr lang="en-US"/>
           </a:p>
@@ -460,35 +460,35 @@
           <a:p>
             <a:pPr lvl="0"/>
             <a:r>
-              <a:rPr lang="hu-HU" smtClean="0"/>
+              <a:rPr lang="hu-HU"/>
               <a:t>Click to edit Master text styles</a:t>
             </a:r>
           </a:p>
           <a:p>
             <a:pPr lvl="1"/>
             <a:r>
-              <a:rPr lang="hu-HU" smtClean="0"/>
+              <a:rPr lang="hu-HU"/>
               <a:t>Second level</a:t>
             </a:r>
           </a:p>
           <a:p>
             <a:pPr lvl="2"/>
             <a:r>
-              <a:rPr lang="hu-HU" smtClean="0"/>
+              <a:rPr lang="hu-HU"/>
               <a:t>Third level</a:t>
             </a:r>
           </a:p>
           <a:p>
             <a:pPr lvl="3"/>
             <a:r>
-              <a:rPr lang="hu-HU" smtClean="0"/>
+              <a:rPr lang="hu-HU"/>
               <a:t>Fourth level</a:t>
             </a:r>
           </a:p>
           <a:p>
             <a:pPr lvl="4"/>
             <a:r>
-              <a:rPr lang="hu-HU" smtClean="0"/>
+              <a:rPr lang="hu-HU"/>
               <a:t>Fifth level</a:t>
             </a:r>
             <a:endParaRPr lang="en-US"/>
@@ -773,7 +773,7 @@
           <p:cNvSpPr>
             <a:spLocks noChangeArrowheads="1"/>
           </p:cNvSpPr>
-          <p:nvPr/>
+          <p:nvPr userDrawn="1"/>
         </p:nvSpPr>
         <p:spPr bwMode="auto">
           <a:xfrm>
@@ -855,7 +855,7 @@
               <a:defRPr/>
             </a:pPr>
             <a:r>
-              <a:rPr lang="en-US" sz="1000" b="1" dirty="0" smtClean="0">
+              <a:rPr lang="en-US" sz="1000" b="1" dirty="0">
                 <a:solidFill>
                   <a:schemeClr val="bg1"/>
                 </a:solidFill>
@@ -864,18 +864,8 @@
               </a:rPr>
               <a:t>Budapest University of Technology and Economics</a:t>
             </a:r>
-            <a:r>
-              <a:rPr lang="hu-HU" sz="1000" b="1" dirty="0" smtClean="0">
-                <a:solidFill>
-                  <a:schemeClr val="bg1"/>
-                </a:solidFill>
-                <a:latin typeface="+mn-lt"/>
-                <a:cs typeface="+mn-cs"/>
-              </a:rPr>
-              <a:t/>
-            </a:r>
             <a:br>
-              <a:rPr lang="hu-HU" sz="1000" b="1" dirty="0" smtClean="0">
+              <a:rPr lang="hu-HU" sz="1000" b="1" dirty="0">
                 <a:solidFill>
                   <a:schemeClr val="bg1"/>
                 </a:solidFill>
@@ -884,7 +874,7 @@
               </a:rPr>
             </a:br>
             <a:r>
-              <a:rPr lang="en-US" sz="1000" b="1" dirty="0" smtClean="0">
+              <a:rPr lang="en-US" sz="1000" b="1" dirty="0">
                 <a:solidFill>
                   <a:schemeClr val="bg1"/>
                 </a:solidFill>
@@ -893,48 +883,9 @@
               </a:rPr>
               <a:t>Department of Measurement and Information Systems</a:t>
             </a:r>
-            <a:endParaRPr lang="en-US" sz="1000" b="1" dirty="0">
-              <a:solidFill>
-                <a:schemeClr val="bg1"/>
-              </a:solidFill>
-              <a:latin typeface="+mn-lt"/>
-              <a:cs typeface="+mn-cs"/>
-            </a:endParaRPr>
           </a:p>
         </p:txBody>
       </p:sp>
-      <p:pic>
-        <p:nvPicPr>
-          <p:cNvPr id="7" name="Picture 2"/>
-          <p:cNvPicPr>
-            <a:picLocks noChangeAspect="1" noChangeArrowheads="1"/>
-          </p:cNvPicPr>
-          <p:nvPr/>
-        </p:nvPicPr>
-        <p:blipFill>
-          <a:blip r:embed="rId2"/>
-          <a:srcRect/>
-          <a:stretch>
-            <a:fillRect/>
-          </a:stretch>
-        </p:blipFill>
-        <p:spPr bwMode="auto">
-          <a:xfrm>
-            <a:off x="3571875" y="5572125"/>
-            <a:ext cx="1889125" cy="636588"/>
-          </a:xfrm>
-          <a:prstGeom prst="rect">
-            <a:avLst/>
-          </a:prstGeom>
-          <a:noFill/>
-          <a:ln w="9525">
-            <a:noFill/>
-            <a:miter lim="800000"/>
-            <a:headEnd/>
-            <a:tailEnd/>
-          </a:ln>
-        </p:spPr>
-      </p:pic>
       <p:sp>
         <p:nvSpPr>
           <p:cNvPr id="8" name="Rectangle 20"/>
@@ -1003,7 +954,7 @@
           <a:lstStyle/>
           <a:p>
             <a:r>
-              <a:rPr lang="hu-HU" smtClean="0"/>
+              <a:rPr lang="hu-HU"/>
               <a:t>Mintacím szerkesztése</a:t>
             </a:r>
             <a:endParaRPr lang="hu-HU" dirty="0"/>
@@ -1120,7 +1071,7 @@
           </a:lstStyle>
           <a:p>
             <a:r>
-              <a:rPr lang="hu-HU" smtClean="0"/>
+              <a:rPr lang="hu-HU"/>
               <a:t>Alcím mintájának szerkesztése</a:t>
             </a:r>
             <a:endParaRPr lang="hu-HU" dirty="0"/>
@@ -1136,7 +1087,7 @@
           <p:nvPr userDrawn="1"/>
         </p:nvPicPr>
         <p:blipFill>
-          <a:blip r:embed="rId3">
+          <a:blip r:embed="rId2">
             <a:extLst>
               <a:ext uri="{28A0092B-C50C-407E-A947-70E740481C1C}">
                 <a14:useLocalDpi xmlns:a14="http://schemas.microsoft.com/office/drawing/2010/main" val="0"/>
@@ -1198,69 +1149,62 @@
               <a:defRPr/>
             </a:pPr>
             <a:r>
-              <a:rPr lang="hu-HU" sz="2400" b="1" dirty="0" smtClean="0">
+              <a:rPr lang="hu-HU" sz="2400" b="1" dirty="0">
                 <a:latin typeface="+mn-lt"/>
                 <a:cs typeface="+mn-cs"/>
               </a:rPr>
               <a:t>Budapest University of </a:t>
             </a:r>
             <a:r>
-              <a:rPr lang="en-US" sz="2400" b="1" dirty="0" smtClean="0">
+              <a:rPr lang="en-US" sz="2400" b="1" dirty="0">
                 <a:latin typeface="+mn-lt"/>
                 <a:cs typeface="+mn-cs"/>
               </a:rPr>
               <a:t>Technology</a:t>
             </a:r>
             <a:r>
-              <a:rPr lang="hu-HU" sz="2400" b="1" dirty="0" smtClean="0">
+              <a:rPr lang="hu-HU" sz="2400" b="1" dirty="0">
                 <a:latin typeface="+mn-lt"/>
                 <a:cs typeface="+mn-cs"/>
               </a:rPr>
               <a:t> and </a:t>
             </a:r>
             <a:r>
-              <a:rPr lang="en-US" sz="2400" b="1" dirty="0" smtClean="0">
+              <a:rPr lang="en-US" sz="2400" b="1" dirty="0">
                 <a:latin typeface="+mn-lt"/>
                 <a:cs typeface="+mn-cs"/>
               </a:rPr>
               <a:t>Economics</a:t>
             </a:r>
-            <a:r>
-              <a:rPr lang="hu-HU" sz="2400" b="1" dirty="0" smtClean="0">
-                <a:latin typeface="+mn-lt"/>
-                <a:cs typeface="+mn-cs"/>
-              </a:rPr>
-              <a:t/>
-            </a:r>
             <a:br>
-              <a:rPr lang="hu-HU" sz="2400" b="1" dirty="0" smtClean="0">
+              <a:rPr lang="hu-HU" sz="2400" b="1" dirty="0">
                 <a:latin typeface="+mn-lt"/>
                 <a:cs typeface="+mn-cs"/>
               </a:rPr>
             </a:br>
             <a:r>
-              <a:rPr lang="hu-HU" sz="2400" b="1" dirty="0" smtClean="0">
+              <a:rPr lang="hu-HU" sz="2400" b="1" dirty="0">
                 <a:latin typeface="+mn-lt"/>
                 <a:cs typeface="+mn-cs"/>
               </a:rPr>
               <a:t>Fault</a:t>
             </a:r>
             <a:r>
-              <a:rPr lang="hu-HU" sz="2400" b="1" baseline="0" dirty="0" smtClean="0">
+              <a:rPr lang="hu-HU" sz="2400" b="1" baseline="0" dirty="0">
                 <a:latin typeface="+mn-lt"/>
                 <a:cs typeface="+mn-cs"/>
               </a:rPr>
               <a:t> </a:t>
             </a:r>
             <a:r>
-              <a:rPr lang="hu-HU" sz="2400" b="1" baseline="0" dirty="0" err="1" smtClean="0">
+              <a:rPr lang="hu-HU" sz="2400" b="1" baseline="0" dirty="0" err="1">
                 <a:latin typeface="+mn-lt"/>
                 <a:cs typeface="+mn-cs"/>
               </a:rPr>
               <a:t>Tolerant</a:t>
             </a:r>
             <a:r>
-              <a:rPr lang="hu-HU" sz="2400" b="1" baseline="0" dirty="0" smtClean="0">
+              <a:rPr lang="hu-HU" sz="2400" b="1" baseline="0" dirty="0">
                 <a:latin typeface="+mn-lt"/>
                 <a:cs typeface="+mn-cs"/>
               </a:rPr>
@@ -1273,42 +1217,58 @@
           </a:p>
         </p:txBody>
       </p:sp>
-      <p:sp>
-        <p:nvSpPr>
-          <p:cNvPr id="6" name="Dia számának helye 5"/>
-          <p:cNvSpPr>
-            <a:spLocks noGrp="1"/>
-          </p:cNvSpPr>
-          <p:nvPr>
-            <p:ph type="sldNum" sz="quarter" idx="10"/>
-          </p:nvPr>
-        </p:nvSpPr>
-        <p:spPr/>
-        <p:txBody>
-          <a:bodyPr/>
-          <a:lstStyle/>
-          <a:p>
-            <a:fld id="{A7C85712-A09B-4560-9D1E-08050AA835BB}" type="slidenum">
-              <a:rPr lang="hu-HU" smtClean="0"/>
-              <a:pPr/>
-              <a:t>‹#›</a:t>
-            </a:fld>
-            <a:endParaRPr lang="hu-HU" dirty="0"/>
-          </a:p>
-        </p:txBody>
-      </p:sp>
+      <p:pic>
+        <p:nvPicPr>
+          <p:cNvPr id="9" name="Picture 4">
+            <a:extLst>
+              <a:ext uri="{FF2B5EF4-FFF2-40B4-BE49-F238E27FC236}">
+                <a16:creationId xmlns:a16="http://schemas.microsoft.com/office/drawing/2014/main" id="{4A9F9C74-19D0-4E53-A93C-52B23E318E44}"/>
+              </a:ext>
+            </a:extLst>
+          </p:cNvPr>
+          <p:cNvPicPr>
+            <a:picLocks noChangeAspect="1" noChangeArrowheads="1"/>
+          </p:cNvPicPr>
+          <p:nvPr userDrawn="1"/>
+        </p:nvPicPr>
+        <p:blipFill>
+          <a:blip r:embed="rId3">
+            <a:extLst>
+              <a:ext uri="{28A0092B-C50C-407E-A947-70E740481C1C}">
+                <a14:useLocalDpi xmlns:a14="http://schemas.microsoft.com/office/drawing/2010/main" val="0"/>
+              </a:ext>
+            </a:extLst>
+          </a:blip>
+          <a:srcRect/>
+          <a:stretch>
+            <a:fillRect/>
+          </a:stretch>
+        </p:blipFill>
+        <p:spPr bwMode="auto">
+          <a:xfrm>
+            <a:off x="3773090" y="5447590"/>
+            <a:ext cx="1597820" cy="908760"/>
+          </a:xfrm>
+          <a:prstGeom prst="rect">
+            <a:avLst/>
+          </a:prstGeom>
+          <a:noFill/>
+          <a:extLst>
+            <a:ext uri="{909E8E84-426E-40DD-AFC4-6F175D3DCCD1}">
+              <a14:hiddenFill xmlns:a14="http://schemas.microsoft.com/office/drawing/2010/main">
+                <a:solidFill>
+                  <a:srgbClr val="FFFFFF"/>
+                </a:solidFill>
+              </a14:hiddenFill>
+            </a:ext>
+          </a:extLst>
+        </p:spPr>
+      </p:pic>
     </p:spTree>
   </p:cSld>
   <p:clrMapOvr>
     <a:masterClrMapping/>
   </p:clrMapOvr>
-  <p:timing>
-    <p:tnLst>
-      <p:par>
-        <p:cTn id="1" dur="indefinite" restart="never" nodeType="tmRoot"/>
-      </p:par>
-    </p:tnLst>
-  </p:timing>
 </p:sldLayout>
 </file>
 
@@ -1345,10 +1305,9 @@
           <a:lstStyle/>
           <a:p>
             <a:r>
-              <a:rPr lang="hu-HU" smtClean="0"/>
+              <a:rPr lang="hu-HU"/>
               <a:t>Mintacím szerkesztése</a:t>
             </a:r>
-            <a:endParaRPr lang="hu-HU"/>
           </a:p>
         </p:txBody>
       </p:sp>
@@ -1402,35 +1361,35 @@
           <a:p>
             <a:pPr lvl="0"/>
             <a:r>
-              <a:rPr lang="hu-HU" smtClean="0"/>
+              <a:rPr lang="hu-HU"/>
               <a:t>Mintaszöveg szerkesztése</a:t>
             </a:r>
           </a:p>
           <a:p>
             <a:pPr lvl="1"/>
             <a:r>
-              <a:rPr lang="hu-HU" smtClean="0"/>
+              <a:rPr lang="hu-HU"/>
               <a:t>Második szint</a:t>
             </a:r>
           </a:p>
           <a:p>
             <a:pPr lvl="2"/>
             <a:r>
-              <a:rPr lang="hu-HU" smtClean="0"/>
+              <a:rPr lang="hu-HU"/>
               <a:t>Harmadik szint</a:t>
             </a:r>
           </a:p>
           <a:p>
             <a:pPr lvl="3"/>
             <a:r>
-              <a:rPr lang="hu-HU" smtClean="0"/>
+              <a:rPr lang="hu-HU"/>
               <a:t>Negyedik szint</a:t>
             </a:r>
           </a:p>
           <a:p>
             <a:pPr lvl="4"/>
             <a:r>
-              <a:rPr lang="hu-HU" smtClean="0"/>
+              <a:rPr lang="hu-HU"/>
               <a:t>Ötödik szint</a:t>
             </a:r>
             <a:endParaRPr lang="hu-HU" dirty="0"/>
@@ -1487,38 +1446,37 @@
           <a:p>
             <a:pPr lvl="0"/>
             <a:r>
-              <a:rPr lang="hu-HU" smtClean="0"/>
+              <a:rPr lang="hu-HU"/>
               <a:t>Mintaszöveg szerkesztése</a:t>
             </a:r>
           </a:p>
           <a:p>
             <a:pPr lvl="1"/>
             <a:r>
-              <a:rPr lang="hu-HU" smtClean="0"/>
+              <a:rPr lang="hu-HU"/>
               <a:t>Második szint</a:t>
             </a:r>
           </a:p>
           <a:p>
             <a:pPr lvl="2"/>
             <a:r>
-              <a:rPr lang="hu-HU" smtClean="0"/>
+              <a:rPr lang="hu-HU"/>
               <a:t>Harmadik szint</a:t>
             </a:r>
           </a:p>
           <a:p>
             <a:pPr lvl="3"/>
             <a:r>
-              <a:rPr lang="hu-HU" smtClean="0"/>
+              <a:rPr lang="hu-HU"/>
               <a:t>Negyedik szint</a:t>
             </a:r>
           </a:p>
           <a:p>
             <a:pPr lvl="4"/>
             <a:r>
-              <a:rPr lang="hu-HU" smtClean="0"/>
+              <a:rPr lang="hu-HU"/>
               <a:t>Ötödik szint</a:t>
             </a:r>
-            <a:endParaRPr lang="hu-HU"/>
           </a:p>
         </p:txBody>
       </p:sp>
@@ -1556,13 +1514,6 @@
   <p:clrMapOvr>
     <a:masterClrMapping/>
   </p:clrMapOvr>
-  <p:timing>
-    <p:tnLst>
-      <p:par>
-        <p:cTn id="1" dur="indefinite" restart="never" nodeType="tmRoot"/>
-      </p:par>
-    </p:tnLst>
-  </p:timing>
 </p:sldLayout>
 </file>
 
@@ -1671,7 +1622,7 @@
               <a:defRPr/>
             </a:pPr>
             <a:r>
-              <a:rPr lang="hu-HU" sz="1000" b="1" dirty="0" smtClean="0">
+              <a:rPr lang="hu-HU" sz="1000" b="1" dirty="0">
                 <a:solidFill>
                   <a:schemeClr val="bg1"/>
                 </a:solidFill>
@@ -1692,7 +1643,7 @@
               <a:defRPr/>
             </a:pPr>
             <a:r>
-              <a:rPr lang="hu-HU" sz="1000" b="1" dirty="0" smtClean="0">
+              <a:rPr lang="hu-HU" sz="1000" b="1" dirty="0">
                 <a:solidFill>
                   <a:schemeClr val="bg1"/>
                 </a:solidFill>
@@ -1704,38 +1655,6 @@
           </a:p>
         </p:txBody>
       </p:sp>
-      <p:pic>
-        <p:nvPicPr>
-          <p:cNvPr id="7" name="Picture 2"/>
-          <p:cNvPicPr>
-            <a:picLocks noChangeAspect="1" noChangeArrowheads="1"/>
-          </p:cNvPicPr>
-          <p:nvPr/>
-        </p:nvPicPr>
-        <p:blipFill>
-          <a:blip r:embed="rId2"/>
-          <a:srcRect/>
-          <a:stretch>
-            <a:fillRect/>
-          </a:stretch>
-        </p:blipFill>
-        <p:spPr bwMode="auto">
-          <a:xfrm>
-            <a:off x="3571875" y="5572125"/>
-            <a:ext cx="1889125" cy="636588"/>
-          </a:xfrm>
-          <a:prstGeom prst="rect">
-            <a:avLst/>
-          </a:prstGeom>
-          <a:noFill/>
-          <a:ln w="9525">
-            <a:noFill/>
-            <a:miter lim="800000"/>
-            <a:headEnd/>
-            <a:tailEnd/>
-          </a:ln>
-        </p:spPr>
-      </p:pic>
       <p:sp>
         <p:nvSpPr>
           <p:cNvPr id="8" name="Rectangle 20"/>
@@ -1804,7 +1723,7 @@
           <a:lstStyle/>
           <a:p>
             <a:r>
-              <a:rPr lang="hu-HU" smtClean="0"/>
+              <a:rPr lang="hu-HU"/>
               <a:t>Mintacím szerkesztése</a:t>
             </a:r>
             <a:endParaRPr lang="hu-HU" dirty="0"/>
@@ -1921,7 +1840,7 @@
           </a:lstStyle>
           <a:p>
             <a:r>
-              <a:rPr lang="hu-HU" smtClean="0"/>
+              <a:rPr lang="hu-HU"/>
               <a:t>Alcím mintájának szerkesztése</a:t>
             </a:r>
             <a:endParaRPr lang="hu-HU" dirty="0"/>
@@ -1937,7 +1856,7 @@
           <p:nvPr userDrawn="1"/>
         </p:nvPicPr>
         <p:blipFill>
-          <a:blip r:embed="rId3">
+          <a:blip r:embed="rId2">
             <a:extLst>
               <a:ext uri="{28A0092B-C50C-407E-A947-70E740481C1C}">
                 <a14:useLocalDpi xmlns:a14="http://schemas.microsoft.com/office/drawing/2010/main" val="0"/>
@@ -1999,7 +1918,7 @@
               <a:defRPr/>
             </a:pPr>
             <a:r>
-              <a:rPr lang="hu-HU" sz="2400" b="1" dirty="0" smtClean="0">
+              <a:rPr lang="hu-HU" sz="2400" b="1" dirty="0">
                 <a:latin typeface="+mn-lt"/>
                 <a:cs typeface="+mn-cs"/>
               </a:rPr>
@@ -2017,7 +1936,7 @@
               <a:defRPr/>
             </a:pPr>
             <a:r>
-              <a:rPr lang="hu-HU" sz="2400" b="1" dirty="0" smtClean="0">
+              <a:rPr lang="hu-HU" sz="2400" b="1" dirty="0">
                 <a:latin typeface="+mn-lt"/>
                 <a:cs typeface="+mn-cs"/>
               </a:rPr>
@@ -2030,30 +1949,53 @@
           </a:p>
         </p:txBody>
       </p:sp>
-      <p:sp>
-        <p:nvSpPr>
-          <p:cNvPr id="6" name="Dia számának helye 5"/>
-          <p:cNvSpPr>
-            <a:spLocks noGrp="1"/>
-          </p:cNvSpPr>
-          <p:nvPr>
-            <p:ph type="sldNum" sz="quarter" idx="10"/>
-          </p:nvPr>
-        </p:nvSpPr>
-        <p:spPr/>
-        <p:txBody>
-          <a:bodyPr/>
-          <a:lstStyle/>
-          <a:p>
-            <a:fld id="{A7C85712-A09B-4560-9D1E-08050AA835BB}" type="slidenum">
-              <a:rPr lang="hu-HU" smtClean="0"/>
-              <a:pPr/>
-              <a:t>‹#›</a:t>
-            </a:fld>
-            <a:endParaRPr lang="hu-HU" dirty="0"/>
-          </a:p>
-        </p:txBody>
-      </p:sp>
+      <p:pic>
+        <p:nvPicPr>
+          <p:cNvPr id="9" name="Picture 4">
+            <a:extLst>
+              <a:ext uri="{FF2B5EF4-FFF2-40B4-BE49-F238E27FC236}">
+                <a16:creationId xmlns:a16="http://schemas.microsoft.com/office/drawing/2014/main" id="{22B9A6D2-CC79-4B91-9BB4-3F40B4B69408}"/>
+              </a:ext>
+            </a:extLst>
+          </p:cNvPr>
+          <p:cNvPicPr>
+            <a:picLocks noChangeAspect="1" noChangeArrowheads="1"/>
+          </p:cNvPicPr>
+          <p:nvPr userDrawn="1"/>
+        </p:nvPicPr>
+        <p:blipFill>
+          <a:blip r:embed="rId3">
+            <a:extLst>
+              <a:ext uri="{28A0092B-C50C-407E-A947-70E740481C1C}">
+                <a14:useLocalDpi xmlns:a14="http://schemas.microsoft.com/office/drawing/2010/main" val="0"/>
+              </a:ext>
+            </a:extLst>
+          </a:blip>
+          <a:srcRect/>
+          <a:stretch>
+            <a:fillRect/>
+          </a:stretch>
+        </p:blipFill>
+        <p:spPr bwMode="auto">
+          <a:xfrm>
+            <a:off x="3773090" y="5447590"/>
+            <a:ext cx="1597820" cy="908760"/>
+          </a:xfrm>
+          <a:prstGeom prst="rect">
+            <a:avLst/>
+          </a:prstGeom>
+          <a:noFill/>
+          <a:extLst>
+            <a:ext uri="{909E8E84-426E-40DD-AFC4-6F175D3DCCD1}">
+              <a14:hiddenFill xmlns:a14="http://schemas.microsoft.com/office/drawing/2010/main">
+                <a:solidFill>
+                  <a:srgbClr val="FFFFFF"/>
+                </a:solidFill>
+              </a14:hiddenFill>
+            </a:ext>
+          </a:extLst>
+        </p:spPr>
+      </p:pic>
     </p:spTree>
     <p:extLst>
       <p:ext uri="{BB962C8B-B14F-4D97-AF65-F5344CB8AC3E}">
@@ -2064,13 +2006,6 @@
   <p:clrMapOvr>
     <a:masterClrMapping/>
   </p:clrMapOvr>
-  <p:timing>
-    <p:tnLst>
-      <p:par>
-        <p:cTn id="1" dur="indefinite" restart="never" nodeType="tmRoot"/>
-      </p:par>
-    </p:tnLst>
-  </p:timing>
 </p:sldLayout>
 </file>
 
@@ -2115,10 +2050,9 @@
           <a:lstStyle/>
           <a:p>
             <a:r>
-              <a:rPr lang="hu-HU" smtClean="0"/>
+              <a:rPr lang="hu-HU"/>
               <a:t>Mintacím szerkesztése</a:t>
             </a:r>
-            <a:endParaRPr lang="hu-HU"/>
           </a:p>
         </p:txBody>
       </p:sp>
@@ -2139,38 +2073,37 @@
           <a:p>
             <a:pPr lvl="0"/>
             <a:r>
-              <a:rPr lang="hu-HU" dirty="0" smtClean="0"/>
+              <a:rPr lang="hu-HU" dirty="0"/>
               <a:t>Mintaszöveg szerkesztése</a:t>
             </a:r>
           </a:p>
           <a:p>
             <a:pPr lvl="1"/>
             <a:r>
-              <a:rPr lang="hu-HU" dirty="0" smtClean="0"/>
+              <a:rPr lang="hu-HU" dirty="0"/>
               <a:t>Második szint</a:t>
             </a:r>
           </a:p>
           <a:p>
             <a:pPr lvl="2"/>
             <a:r>
-              <a:rPr lang="hu-HU" dirty="0" smtClean="0"/>
+              <a:rPr lang="hu-HU" dirty="0"/>
               <a:t>Harmadik szint</a:t>
             </a:r>
           </a:p>
           <a:p>
             <a:pPr lvl="3"/>
             <a:r>
-              <a:rPr lang="hu-HU" dirty="0" smtClean="0"/>
+              <a:rPr lang="hu-HU" dirty="0"/>
               <a:t>Negyedik szint</a:t>
             </a:r>
           </a:p>
           <a:p>
             <a:pPr lvl="4"/>
             <a:r>
-              <a:rPr lang="hu-HU" dirty="0" smtClean="0"/>
+              <a:rPr lang="hu-HU" dirty="0"/>
               <a:t>Ötödik szint</a:t>
             </a:r>
-            <a:endParaRPr lang="hu-HU" dirty="0"/>
           </a:p>
         </p:txBody>
       </p:sp>
@@ -2203,13 +2136,6 @@
   <p:clrMapOvr>
     <a:masterClrMapping/>
   </p:clrMapOvr>
-  <p:timing>
-    <p:tnLst>
-      <p:par>
-        <p:cTn id="1" dur="indefinite" restart="never" nodeType="tmRoot"/>
-      </p:par>
-    </p:tnLst>
-  </p:timing>
 </p:sldLayout>
 </file>
 
@@ -2255,7 +2181,7 @@
           </a:lstStyle>
           <a:p>
             <a:r>
-              <a:rPr lang="hu-HU" smtClean="0"/>
+              <a:rPr lang="hu-HU"/>
               <a:t>Mintacím szerkesztése</a:t>
             </a:r>
             <a:endParaRPr lang="hu-HU" dirty="0"/>
@@ -2378,7 +2304,7 @@
           <a:p>
             <a:pPr lvl="0"/>
             <a:r>
-              <a:rPr lang="hu-HU" smtClean="0"/>
+              <a:rPr lang="hu-HU"/>
               <a:t>Mintaszöveg szerkesztése</a:t>
             </a:r>
           </a:p>
@@ -2413,13 +2339,6 @@
   <p:clrMapOvr>
     <a:masterClrMapping/>
   </p:clrMapOvr>
-  <p:timing>
-    <p:tnLst>
-      <p:par>
-        <p:cTn id="1" dur="indefinite" restart="never" nodeType="tmRoot"/>
-      </p:par>
-    </p:tnLst>
-  </p:timing>
 </p:sldLayout>
 </file>
 
@@ -2456,10 +2375,9 @@
           <a:lstStyle/>
           <a:p>
             <a:r>
-              <a:rPr lang="hu-HU" smtClean="0"/>
+              <a:rPr lang="hu-HU"/>
               <a:t>Mintacím szerkesztése</a:t>
             </a:r>
-            <a:endParaRPr lang="hu-HU"/>
           </a:p>
         </p:txBody>
       </p:sp>
@@ -2513,35 +2431,35 @@
           <a:p>
             <a:pPr lvl="0"/>
             <a:r>
-              <a:rPr lang="hu-HU" smtClean="0"/>
+              <a:rPr lang="hu-HU"/>
               <a:t>Mintaszöveg szerkesztése</a:t>
             </a:r>
           </a:p>
           <a:p>
             <a:pPr lvl="1"/>
             <a:r>
-              <a:rPr lang="hu-HU" smtClean="0"/>
+              <a:rPr lang="hu-HU"/>
               <a:t>Második szint</a:t>
             </a:r>
           </a:p>
           <a:p>
             <a:pPr lvl="2"/>
             <a:r>
-              <a:rPr lang="hu-HU" smtClean="0"/>
+              <a:rPr lang="hu-HU"/>
               <a:t>Harmadik szint</a:t>
             </a:r>
           </a:p>
           <a:p>
             <a:pPr lvl="3"/>
             <a:r>
-              <a:rPr lang="hu-HU" smtClean="0"/>
+              <a:rPr lang="hu-HU"/>
               <a:t>Negyedik szint</a:t>
             </a:r>
           </a:p>
           <a:p>
             <a:pPr lvl="4"/>
             <a:r>
-              <a:rPr lang="hu-HU" smtClean="0"/>
+              <a:rPr lang="hu-HU"/>
               <a:t>Ötödik szint</a:t>
             </a:r>
             <a:endParaRPr lang="hu-HU" dirty="0"/>
@@ -2598,38 +2516,37 @@
           <a:p>
             <a:pPr lvl="0"/>
             <a:r>
-              <a:rPr lang="hu-HU" smtClean="0"/>
+              <a:rPr lang="hu-HU"/>
               <a:t>Mintaszöveg szerkesztése</a:t>
             </a:r>
           </a:p>
           <a:p>
             <a:pPr lvl="1"/>
             <a:r>
-              <a:rPr lang="hu-HU" smtClean="0"/>
+              <a:rPr lang="hu-HU"/>
               <a:t>Második szint</a:t>
             </a:r>
           </a:p>
           <a:p>
             <a:pPr lvl="2"/>
             <a:r>
-              <a:rPr lang="hu-HU" smtClean="0"/>
+              <a:rPr lang="hu-HU"/>
               <a:t>Harmadik szint</a:t>
             </a:r>
           </a:p>
           <a:p>
             <a:pPr lvl="3"/>
             <a:r>
-              <a:rPr lang="hu-HU" smtClean="0"/>
+              <a:rPr lang="hu-HU"/>
               <a:t>Negyedik szint</a:t>
             </a:r>
           </a:p>
           <a:p>
             <a:pPr lvl="4"/>
             <a:r>
-              <a:rPr lang="hu-HU" smtClean="0"/>
+              <a:rPr lang="hu-HU"/>
               <a:t>Ötödik szint</a:t>
             </a:r>
-            <a:endParaRPr lang="hu-HU"/>
           </a:p>
         </p:txBody>
       </p:sp>
@@ -2662,13 +2579,6 @@
   <p:clrMapOvr>
     <a:masterClrMapping/>
   </p:clrMapOvr>
-  <p:timing>
-    <p:tnLst>
-      <p:par>
-        <p:cTn id="1" dur="indefinite" restart="never" nodeType="tmRoot"/>
-      </p:par>
-    </p:tnLst>
-  </p:timing>
 </p:sldLayout>
 </file>
 
@@ -2779,7 +2689,7 @@
               <a:defRPr/>
             </a:pPr>
             <a:r>
-              <a:rPr lang="hu-HU" sz="1000" b="1" dirty="0" smtClean="0">
+              <a:rPr lang="hu-HU" sz="1000" b="1" dirty="0">
                 <a:solidFill>
                   <a:schemeClr val="tx1"/>
                 </a:solidFill>
@@ -2800,7 +2710,7 @@
               <a:defRPr/>
             </a:pPr>
             <a:r>
-              <a:rPr lang="hu-HU" sz="1000" b="1" dirty="0" smtClean="0">
+              <a:rPr lang="hu-HU" sz="1000" b="1" dirty="0">
                 <a:solidFill>
                   <a:schemeClr val="tx1"/>
                 </a:solidFill>
@@ -2880,7 +2790,7 @@
           <a:lstStyle/>
           <a:p>
             <a:r>
-              <a:rPr lang="hu-HU" smtClean="0"/>
+              <a:rPr lang="hu-HU"/>
               <a:t>Mintacím szerkesztése</a:t>
             </a:r>
             <a:endParaRPr lang="hu-HU" dirty="0"/>
@@ -2997,7 +2907,7 @@
           </a:lstStyle>
           <a:p>
             <a:r>
-              <a:rPr lang="hu-HU" smtClean="0"/>
+              <a:rPr lang="hu-HU"/>
               <a:t>Alcím mintájának szerkesztése</a:t>
             </a:r>
             <a:endParaRPr lang="hu-HU" dirty="0"/>
@@ -3066,34 +2976,27 @@
               <a:t> and </a:t>
             </a:r>
             <a:r>
-              <a:rPr lang="en-US" sz="2400" b="1" dirty="0" smtClean="0">
+              <a:rPr lang="en-US" sz="2400" b="1" dirty="0">
                 <a:latin typeface="+mn-lt"/>
                 <a:cs typeface="+mn-cs"/>
               </a:rPr>
               <a:t>Economics</a:t>
             </a:r>
-            <a:r>
-              <a:rPr lang="hu-HU" sz="2400" b="1" dirty="0" smtClean="0">
-                <a:latin typeface="+mn-lt"/>
-                <a:cs typeface="+mn-cs"/>
-              </a:rPr>
-              <a:t/>
-            </a:r>
             <a:br>
-              <a:rPr lang="hu-HU" sz="2400" b="1" dirty="0" smtClean="0">
+              <a:rPr lang="hu-HU" sz="2400" b="1" dirty="0">
                 <a:latin typeface="+mn-lt"/>
                 <a:cs typeface="+mn-cs"/>
               </a:rPr>
             </a:br>
             <a:r>
-              <a:rPr lang="hu-HU" sz="2400" b="1" dirty="0" smtClean="0">
+              <a:rPr lang="hu-HU" sz="2400" b="1" dirty="0">
                 <a:latin typeface="+mn-lt"/>
                 <a:cs typeface="+mn-cs"/>
               </a:rPr>
               <a:t>Fault</a:t>
             </a:r>
             <a:r>
-              <a:rPr lang="hu-HU" sz="2400" b="1" baseline="0" dirty="0" smtClean="0">
+              <a:rPr lang="hu-HU" sz="2400" b="1" baseline="0" dirty="0">
                 <a:latin typeface="+mn-lt"/>
                 <a:cs typeface="+mn-cs"/>
               </a:rPr>
@@ -3103,64 +3006,6 @@
               <a:latin typeface="+mn-lt"/>
               <a:cs typeface="+mn-cs"/>
             </a:endParaRPr>
-          </a:p>
-        </p:txBody>
-      </p:sp>
-      <p:pic>
-        <p:nvPicPr>
-          <p:cNvPr id="18" name="Kép 17"/>
-          <p:cNvPicPr>
-            <a:picLocks noChangeAspect="1"/>
-          </p:cNvPicPr>
-          <p:nvPr userDrawn="1"/>
-        </p:nvPicPr>
-        <p:blipFill>
-          <a:blip r:embed="rId2">
-            <a:extLst>
-              <a:ext uri="{28A0092B-C50C-407E-A947-70E740481C1C}">
-                <a14:useLocalDpi xmlns:a14="http://schemas.microsoft.com/office/drawing/2010/main" val="0"/>
-              </a:ext>
-            </a:extLst>
-          </a:blip>
-          <a:stretch>
-            <a:fillRect/>
-          </a:stretch>
-        </p:blipFill>
-        <p:spPr>
-          <a:xfrm>
-            <a:off x="3576997" y="5572835"/>
-            <a:ext cx="1890000" cy="632812"/>
-          </a:xfrm>
-          <a:prstGeom prst="rect">
-            <a:avLst/>
-          </a:prstGeom>
-          <a:noFill/>
-          <a:ln>
-            <a:noFill/>
-          </a:ln>
-        </p:spPr>
-      </p:pic>
-      <p:sp>
-        <p:nvSpPr>
-          <p:cNvPr id="6" name="Dia számának helye 5"/>
-          <p:cNvSpPr>
-            <a:spLocks noGrp="1"/>
-          </p:cNvSpPr>
-          <p:nvPr>
-            <p:ph type="sldNum" sz="quarter" idx="10"/>
-          </p:nvPr>
-        </p:nvSpPr>
-        <p:spPr/>
-        <p:txBody>
-          <a:bodyPr/>
-          <a:lstStyle/>
-          <a:p>
-            <a:fld id="{198CDE6E-C629-43CC-9290-30D2F1110D4C}" type="slidenum">
-              <a:rPr lang="hu-HU" smtClean="0"/>
-              <a:pPr/>
-              <a:t>‹#›</a:t>
-            </a:fld>
-            <a:endParaRPr lang="hu-HU" dirty="0"/>
           </a:p>
         </p:txBody>
       </p:sp>
@@ -3173,7 +3018,7 @@
           <p:nvPr userDrawn="1"/>
         </p:nvPicPr>
         <p:blipFill>
-          <a:blip r:embed="rId3">
+          <a:blip r:embed="rId2">
             <a:extLst>
               <a:ext uri="{28A0092B-C50C-407E-A947-70E740481C1C}">
                 <a14:useLocalDpi xmlns:a14="http://schemas.microsoft.com/office/drawing/2010/main" val="0"/>
@@ -3204,6 +3049,54 @@
           </a:extLst>
         </p:spPr>
       </p:pic>
+      <p:pic>
+        <p:nvPicPr>
+          <p:cNvPr id="7" name="Picture 4">
+            <a:extLst>
+              <a:ext uri="{FF2B5EF4-FFF2-40B4-BE49-F238E27FC236}">
+                <a16:creationId xmlns:a16="http://schemas.microsoft.com/office/drawing/2014/main" id="{023B0DE8-D8F6-4A4B-988D-35A9CC7CACA2}"/>
+              </a:ext>
+            </a:extLst>
+          </p:cNvPr>
+          <p:cNvPicPr>
+            <a:picLocks noChangeAspect="1" noChangeArrowheads="1"/>
+          </p:cNvPicPr>
+          <p:nvPr userDrawn="1"/>
+        </p:nvPicPr>
+        <p:blipFill>
+          <a:blip r:embed="rId3">
+            <a:biLevel thresh="50000"/>
+            <a:extLst>
+              <a:ext uri="{28A0092B-C50C-407E-A947-70E740481C1C}">
+                <a14:useLocalDpi xmlns:a14="http://schemas.microsoft.com/office/drawing/2010/main" val="0"/>
+              </a:ext>
+            </a:extLst>
+          </a:blip>
+          <a:srcRect/>
+          <a:stretch>
+            <a:fillRect/>
+          </a:stretch>
+        </p:blipFill>
+        <p:spPr bwMode="auto">
+          <a:xfrm>
+            <a:off x="3773090" y="5447590"/>
+            <a:ext cx="1597820" cy="908760"/>
+          </a:xfrm>
+          <a:prstGeom prst="rect">
+            <a:avLst/>
+          </a:prstGeom>
+          <a:noFill/>
+          <a:extLst>
+            <a:ext uri="{909E8E84-426E-40DD-AFC4-6F175D3DCCD1}">
+              <a14:hiddenFill xmlns:a14="http://schemas.microsoft.com/office/drawing/2010/main">
+                <a:solidFill>
+                  <a:srgbClr val="FFFFFF"/>
+                </a:solidFill>
+              </a14:hiddenFill>
+            </a:ext>
+          </a:extLst>
+        </p:spPr>
+      </p:pic>
     </p:spTree>
     <p:extLst>
       <p:ext uri="{BB962C8B-B14F-4D97-AF65-F5344CB8AC3E}">
@@ -3214,13 +3107,6 @@
   <p:clrMapOvr>
     <a:masterClrMapping/>
   </p:clrMapOvr>
-  <p:timing>
-    <p:tnLst>
-      <p:par>
-        <p:cTn id="1" dur="indefinite" restart="never" nodeType="tmRoot"/>
-      </p:par>
-    </p:tnLst>
-  </p:timing>
 </p:sldLayout>
 </file>
 
@@ -3331,7 +3217,7 @@
               <a:defRPr/>
             </a:pPr>
             <a:r>
-              <a:rPr lang="en-US" sz="1000" b="1" dirty="0" smtClean="0">
+              <a:rPr lang="en-US" sz="1000" b="1" dirty="0">
                 <a:solidFill>
                   <a:schemeClr val="tx1"/>
                 </a:solidFill>
@@ -3340,18 +3226,8 @@
               </a:rPr>
               <a:t>Budapest University of Technology and Economics</a:t>
             </a:r>
-            <a:r>
-              <a:rPr lang="hu-HU" sz="1000" b="1" dirty="0" smtClean="0">
-                <a:solidFill>
-                  <a:schemeClr val="tx1"/>
-                </a:solidFill>
-                <a:latin typeface="+mn-lt"/>
-                <a:cs typeface="+mn-cs"/>
-              </a:rPr>
-              <a:t/>
-            </a:r>
             <a:br>
-              <a:rPr lang="hu-HU" sz="1000" b="1" dirty="0" smtClean="0">
+              <a:rPr lang="hu-HU" sz="1000" b="1" dirty="0">
                 <a:solidFill>
                   <a:schemeClr val="tx1"/>
                 </a:solidFill>
@@ -3360,7 +3236,7 @@
               </a:rPr>
             </a:br>
             <a:r>
-              <a:rPr lang="en-US" sz="1000" b="1" dirty="0" smtClean="0">
+              <a:rPr lang="en-US" sz="1000" b="1" dirty="0">
                 <a:solidFill>
                   <a:schemeClr val="tx1"/>
                 </a:solidFill>
@@ -3369,13 +3245,6 @@
               </a:rPr>
               <a:t>Department of Measurement and Information Systems</a:t>
             </a:r>
-            <a:endParaRPr lang="en-US" sz="1000" b="1" dirty="0">
-              <a:solidFill>
-                <a:schemeClr val="tx1"/>
-              </a:solidFill>
-              <a:latin typeface="+mn-lt"/>
-              <a:cs typeface="+mn-cs"/>
-            </a:endParaRPr>
           </a:p>
         </p:txBody>
       </p:sp>
@@ -3447,7 +3316,7 @@
           <a:lstStyle/>
           <a:p>
             <a:r>
-              <a:rPr lang="hu-HU" smtClean="0"/>
+              <a:rPr lang="hu-HU"/>
               <a:t>Mintacím szerkesztése</a:t>
             </a:r>
             <a:endParaRPr lang="hu-HU" dirty="0"/>
@@ -3564,7 +3433,7 @@
           </a:lstStyle>
           <a:p>
             <a:r>
-              <a:rPr lang="hu-HU" smtClean="0"/>
+              <a:rPr lang="hu-HU"/>
               <a:t>Alcím mintájának szerkesztése</a:t>
             </a:r>
             <a:endParaRPr lang="hu-HU" dirty="0"/>
@@ -3612,7 +3481,7 @@
               <a:defRPr/>
             </a:pPr>
             <a:r>
-              <a:rPr lang="hu-HU" sz="2400" b="1" dirty="0" smtClean="0">
+              <a:rPr lang="hu-HU" sz="2400" b="1" dirty="0">
                 <a:latin typeface="+mn-lt"/>
                 <a:cs typeface="+mn-cs"/>
               </a:rPr>
@@ -3630,7 +3499,7 @@
               <a:defRPr/>
             </a:pPr>
             <a:r>
-              <a:rPr lang="hu-HU" sz="2400" b="1" dirty="0" smtClean="0">
+              <a:rPr lang="hu-HU" sz="2400" b="1" dirty="0">
                 <a:latin typeface="+mn-lt"/>
                 <a:cs typeface="+mn-cs"/>
               </a:rPr>
@@ -3640,64 +3509,6 @@
               <a:latin typeface="+mn-lt"/>
               <a:cs typeface="+mn-cs"/>
             </a:endParaRPr>
-          </a:p>
-        </p:txBody>
-      </p:sp>
-      <p:pic>
-        <p:nvPicPr>
-          <p:cNvPr id="18" name="Kép 17"/>
-          <p:cNvPicPr>
-            <a:picLocks noChangeAspect="1"/>
-          </p:cNvPicPr>
-          <p:nvPr userDrawn="1"/>
-        </p:nvPicPr>
-        <p:blipFill>
-          <a:blip r:embed="rId2">
-            <a:extLst>
-              <a:ext uri="{28A0092B-C50C-407E-A947-70E740481C1C}">
-                <a14:useLocalDpi xmlns:a14="http://schemas.microsoft.com/office/drawing/2010/main" val="0"/>
-              </a:ext>
-            </a:extLst>
-          </a:blip>
-          <a:stretch>
-            <a:fillRect/>
-          </a:stretch>
-        </p:blipFill>
-        <p:spPr>
-          <a:xfrm>
-            <a:off x="3576997" y="5572835"/>
-            <a:ext cx="1890000" cy="632812"/>
-          </a:xfrm>
-          <a:prstGeom prst="rect">
-            <a:avLst/>
-          </a:prstGeom>
-          <a:noFill/>
-          <a:ln>
-            <a:noFill/>
-          </a:ln>
-        </p:spPr>
-      </p:pic>
-      <p:sp>
-        <p:nvSpPr>
-          <p:cNvPr id="6" name="Dia számának helye 5"/>
-          <p:cNvSpPr>
-            <a:spLocks noGrp="1"/>
-          </p:cNvSpPr>
-          <p:nvPr>
-            <p:ph type="sldNum" sz="quarter" idx="10"/>
-          </p:nvPr>
-        </p:nvSpPr>
-        <p:spPr/>
-        <p:txBody>
-          <a:bodyPr/>
-          <a:lstStyle/>
-          <a:p>
-            <a:fld id="{198CDE6E-C629-43CC-9290-30D2F1110D4C}" type="slidenum">
-              <a:rPr lang="hu-HU" smtClean="0"/>
-              <a:pPr/>
-              <a:t>‹#›</a:t>
-            </a:fld>
-            <a:endParaRPr lang="hu-HU" dirty="0"/>
           </a:p>
         </p:txBody>
       </p:sp>
@@ -3710,7 +3521,7 @@
           <p:nvPr userDrawn="1"/>
         </p:nvPicPr>
         <p:blipFill>
-          <a:blip r:embed="rId3">
+          <a:blip r:embed="rId2">
             <a:extLst>
               <a:ext uri="{28A0092B-C50C-407E-A947-70E740481C1C}">
                 <a14:useLocalDpi xmlns:a14="http://schemas.microsoft.com/office/drawing/2010/main" val="0"/>
@@ -3741,6 +3552,54 @@
           </a:extLst>
         </p:spPr>
       </p:pic>
+      <p:pic>
+        <p:nvPicPr>
+          <p:cNvPr id="7" name="Picture 4">
+            <a:extLst>
+              <a:ext uri="{FF2B5EF4-FFF2-40B4-BE49-F238E27FC236}">
+                <a16:creationId xmlns:a16="http://schemas.microsoft.com/office/drawing/2014/main" id="{6884A591-392F-4666-AEA6-CCD37479F32D}"/>
+              </a:ext>
+            </a:extLst>
+          </p:cNvPr>
+          <p:cNvPicPr>
+            <a:picLocks noChangeAspect="1" noChangeArrowheads="1"/>
+          </p:cNvPicPr>
+          <p:nvPr userDrawn="1"/>
+        </p:nvPicPr>
+        <p:blipFill>
+          <a:blip r:embed="rId3">
+            <a:biLevel thresh="50000"/>
+            <a:extLst>
+              <a:ext uri="{28A0092B-C50C-407E-A947-70E740481C1C}">
+                <a14:useLocalDpi xmlns:a14="http://schemas.microsoft.com/office/drawing/2010/main" val="0"/>
+              </a:ext>
+            </a:extLst>
+          </a:blip>
+          <a:srcRect/>
+          <a:stretch>
+            <a:fillRect/>
+          </a:stretch>
+        </p:blipFill>
+        <p:spPr bwMode="auto">
+          <a:xfrm>
+            <a:off x="3773090" y="5447590"/>
+            <a:ext cx="1597820" cy="908760"/>
+          </a:xfrm>
+          <a:prstGeom prst="rect">
+            <a:avLst/>
+          </a:prstGeom>
+          <a:noFill/>
+          <a:extLst>
+            <a:ext uri="{909E8E84-426E-40DD-AFC4-6F175D3DCCD1}">
+              <a14:hiddenFill xmlns:a14="http://schemas.microsoft.com/office/drawing/2010/main">
+                <a:solidFill>
+                  <a:srgbClr val="FFFFFF"/>
+                </a:solidFill>
+              </a14:hiddenFill>
+            </a:ext>
+          </a:extLst>
+        </p:spPr>
+      </p:pic>
     </p:spTree>
     <p:extLst>
       <p:ext uri="{BB962C8B-B14F-4D97-AF65-F5344CB8AC3E}">
@@ -3751,13 +3610,6 @@
   <p:clrMapOvr>
     <a:masterClrMapping/>
   </p:clrMapOvr>
-  <p:timing>
-    <p:tnLst>
-      <p:par>
-        <p:cTn id="1" dur="indefinite" restart="never" nodeType="tmRoot"/>
-      </p:par>
-    </p:tnLst>
-  </p:timing>
 </p:sldLayout>
 </file>
 
@@ -3802,10 +3654,9 @@
           <a:lstStyle/>
           <a:p>
             <a:r>
-              <a:rPr lang="hu-HU" smtClean="0"/>
+              <a:rPr lang="hu-HU"/>
               <a:t>Mintacím szerkesztése</a:t>
             </a:r>
-            <a:endParaRPr lang="hu-HU"/>
           </a:p>
         </p:txBody>
       </p:sp>
@@ -3826,38 +3677,37 @@
           <a:p>
             <a:pPr lvl="0"/>
             <a:r>
-              <a:rPr lang="hu-HU" dirty="0" smtClean="0"/>
+              <a:rPr lang="hu-HU" dirty="0"/>
               <a:t>Mintaszöveg szerkesztése</a:t>
             </a:r>
           </a:p>
           <a:p>
             <a:pPr lvl="1"/>
             <a:r>
-              <a:rPr lang="hu-HU" dirty="0" smtClean="0"/>
+              <a:rPr lang="hu-HU" dirty="0"/>
               <a:t>Második szint</a:t>
             </a:r>
           </a:p>
           <a:p>
             <a:pPr lvl="2"/>
             <a:r>
-              <a:rPr lang="hu-HU" dirty="0" smtClean="0"/>
+              <a:rPr lang="hu-HU" dirty="0"/>
               <a:t>Harmadik szint</a:t>
             </a:r>
           </a:p>
           <a:p>
             <a:pPr lvl="3"/>
             <a:r>
-              <a:rPr lang="hu-HU" dirty="0" smtClean="0"/>
+              <a:rPr lang="hu-HU" dirty="0"/>
               <a:t>Negyedik szint</a:t>
             </a:r>
           </a:p>
           <a:p>
             <a:pPr lvl="4"/>
             <a:r>
-              <a:rPr lang="hu-HU" dirty="0" smtClean="0"/>
+              <a:rPr lang="hu-HU" dirty="0"/>
               <a:t>Ötödik szint</a:t>
             </a:r>
-            <a:endParaRPr lang="hu-HU" dirty="0"/>
           </a:p>
         </p:txBody>
       </p:sp>
@@ -3895,13 +3745,6 @@
   <p:clrMapOvr>
     <a:masterClrMapping/>
   </p:clrMapOvr>
-  <p:timing>
-    <p:tnLst>
-      <p:par>
-        <p:cTn id="1" dur="indefinite" restart="never" nodeType="tmRoot"/>
-      </p:par>
-    </p:tnLst>
-  </p:timing>
 </p:sldLayout>
 </file>
 
@@ -3947,7 +3790,7 @@
           </a:lstStyle>
           <a:p>
             <a:r>
-              <a:rPr lang="hu-HU" smtClean="0"/>
+              <a:rPr lang="hu-HU"/>
               <a:t>Mintacím szerkesztése</a:t>
             </a:r>
             <a:endParaRPr lang="hu-HU" dirty="0"/>
@@ -4070,7 +3913,7 @@
           <a:p>
             <a:pPr lvl="0"/>
             <a:r>
-              <a:rPr lang="hu-HU" smtClean="0"/>
+              <a:rPr lang="hu-HU"/>
               <a:t>Mintaszöveg szerkesztése</a:t>
             </a:r>
           </a:p>
@@ -4110,13 +3953,6 @@
   <p:clrMapOvr>
     <a:masterClrMapping/>
   </p:clrMapOvr>
-  <p:timing>
-    <p:tnLst>
-      <p:par>
-        <p:cTn id="1" dur="indefinite" restart="never" nodeType="tmRoot"/>
-      </p:par>
-    </p:tnLst>
-  </p:timing>
 </p:sldLayout>
 </file>
 
@@ -4269,7 +4105,7 @@
           <a:p>
             <a:pPr lvl="0"/>
             <a:r>
-              <a:rPr lang="hu-HU" smtClean="0"/>
+              <a:rPr lang="hu-HU"/>
               <a:t>Mintacím szerkesztése</a:t>
             </a:r>
           </a:p>
@@ -4311,70 +4147,40 @@
           <a:p>
             <a:pPr lvl="0"/>
             <a:r>
-              <a:rPr lang="hu-HU" dirty="0" smtClean="0"/>
+              <a:rPr lang="hu-HU" dirty="0"/>
               <a:t>Mintaszöveg szerkesztése</a:t>
             </a:r>
           </a:p>
           <a:p>
             <a:pPr lvl="1"/>
             <a:r>
-              <a:rPr lang="hu-HU" dirty="0" smtClean="0"/>
+              <a:rPr lang="hu-HU" dirty="0"/>
               <a:t>Második szint</a:t>
             </a:r>
           </a:p>
           <a:p>
             <a:pPr lvl="2"/>
             <a:r>
-              <a:rPr lang="hu-HU" dirty="0" smtClean="0"/>
+              <a:rPr lang="hu-HU" dirty="0"/>
               <a:t>Harmadik szint</a:t>
             </a:r>
           </a:p>
           <a:p>
             <a:pPr lvl="3"/>
             <a:r>
-              <a:rPr lang="hu-HU" dirty="0" smtClean="0"/>
+              <a:rPr lang="hu-HU" dirty="0"/>
               <a:t>Negyedik szint</a:t>
             </a:r>
           </a:p>
           <a:p>
             <a:pPr lvl="4"/>
             <a:r>
-              <a:rPr lang="hu-HU" dirty="0" smtClean="0"/>
+              <a:rPr lang="hu-HU" dirty="0"/>
               <a:t>Ötödik szint</a:t>
             </a:r>
           </a:p>
         </p:txBody>
       </p:sp>
-      <p:pic>
-        <p:nvPicPr>
-          <p:cNvPr id="3" name="Kép 2"/>
-          <p:cNvPicPr>
-            <a:picLocks noChangeAspect="1"/>
-          </p:cNvPicPr>
-          <p:nvPr userDrawn="1"/>
-        </p:nvPicPr>
-        <p:blipFill>
-          <a:blip r:embed="rId8">
-            <a:extLst>
-              <a:ext uri="{28A0092B-C50C-407E-A947-70E740481C1C}">
-                <a14:useLocalDpi xmlns:a14="http://schemas.microsoft.com/office/drawing/2010/main" val="0"/>
-              </a:ext>
-            </a:extLst>
-          </a:blip>
-          <a:stretch>
-            <a:fillRect/>
-          </a:stretch>
-        </p:blipFill>
-        <p:spPr>
-          <a:xfrm>
-            <a:off x="8071953" y="6500180"/>
-            <a:ext cx="1049893" cy="334640"/>
-          </a:xfrm>
-          <a:prstGeom prst="rect">
-            <a:avLst/>
-          </a:prstGeom>
-        </p:spPr>
-      </p:pic>
       <p:sp>
         <p:nvSpPr>
           <p:cNvPr id="2" name="Dia számának helye 1"/>
@@ -4415,6 +4221,35 @@
           </a:p>
         </p:txBody>
       </p:sp>
+      <p:pic>
+        <p:nvPicPr>
+          <p:cNvPr id="4" name="Kép 3">
+            <a:extLst>
+              <a:ext uri="{FF2B5EF4-FFF2-40B4-BE49-F238E27FC236}">
+                <a16:creationId xmlns:a16="http://schemas.microsoft.com/office/drawing/2014/main" id="{153E1F4F-63D0-415F-8E0A-D634681BFC71}"/>
+              </a:ext>
+            </a:extLst>
+          </p:cNvPr>
+          <p:cNvPicPr>
+            <a:picLocks noChangeAspect="1"/>
+          </p:cNvPicPr>
+          <p:nvPr userDrawn="1"/>
+        </p:nvPicPr>
+        <p:blipFill rotWithShape="1">
+          <a:blip r:embed="rId8"/>
+          <a:srcRect l="12540" t="29586" r="17990" b="31354"/>
+          <a:stretch/>
+        </p:blipFill>
+        <p:spPr>
+          <a:xfrm>
+            <a:off x="8508601" y="6491287"/>
+            <a:ext cx="613214" cy="343842"/>
+          </a:xfrm>
+          <a:prstGeom prst="rect">
+            <a:avLst/>
+          </a:prstGeom>
+        </p:spPr>
+      </p:pic>
     </p:spTree>
   </p:cSld>
   <p:clrMap bg1="lt1" tx1="dk1" bg2="lt2" tx2="dk2" accent1="accent1" accent2="accent2" accent3="accent3" accent4="accent4" accent5="accent5" accent6="accent6" hlink="hlink" folHlink="folHlink"/>
@@ -4425,13 +4260,6 @@
     <p:sldLayoutId id="2147483651" r:id="rId4"/>
     <p:sldLayoutId id="2147483652" r:id="rId5"/>
   </p:sldLayoutIdLst>
-  <p:timing>
-    <p:tnLst>
-      <p:par>
-        <p:cTn id="1" dur="indefinite" restart="never" nodeType="tmRoot"/>
-      </p:par>
-    </p:tnLst>
-  </p:timing>
   <p:hf hdr="0" ftr="0" dt="0"/>
   <p:txStyles>
     <p:titleStyle>
@@ -4937,7 +4765,7 @@
           <a:p>
             <a:pPr lvl="0"/>
             <a:r>
-              <a:rPr lang="hu-HU" smtClean="0"/>
+              <a:rPr lang="hu-HU"/>
               <a:t>Mintacím szerkesztése</a:t>
             </a:r>
           </a:p>
@@ -4979,70 +4807,40 @@
           <a:p>
             <a:pPr lvl="0"/>
             <a:r>
-              <a:rPr lang="hu-HU" dirty="0" smtClean="0"/>
+              <a:rPr lang="hu-HU" dirty="0"/>
               <a:t>Mintaszöveg szerkesztése</a:t>
             </a:r>
           </a:p>
           <a:p>
             <a:pPr lvl="1"/>
             <a:r>
-              <a:rPr lang="hu-HU" dirty="0" smtClean="0"/>
+              <a:rPr lang="hu-HU" dirty="0"/>
               <a:t>Második szint</a:t>
             </a:r>
           </a:p>
           <a:p>
             <a:pPr lvl="2"/>
             <a:r>
-              <a:rPr lang="hu-HU" dirty="0" smtClean="0"/>
+              <a:rPr lang="hu-HU" dirty="0"/>
               <a:t>Harmadik szint</a:t>
             </a:r>
           </a:p>
           <a:p>
             <a:pPr lvl="3"/>
             <a:r>
-              <a:rPr lang="hu-HU" dirty="0" smtClean="0"/>
+              <a:rPr lang="hu-HU" dirty="0"/>
               <a:t>Negyedik szint</a:t>
             </a:r>
           </a:p>
           <a:p>
             <a:pPr lvl="4"/>
             <a:r>
-              <a:rPr lang="hu-HU" dirty="0" smtClean="0"/>
+              <a:rPr lang="hu-HU" dirty="0"/>
               <a:t>Ötödik szint</a:t>
             </a:r>
           </a:p>
         </p:txBody>
       </p:sp>
-      <p:pic>
-        <p:nvPicPr>
-          <p:cNvPr id="14" name="Kép 13"/>
-          <p:cNvPicPr>
-            <a:picLocks noChangeAspect="1"/>
-          </p:cNvPicPr>
-          <p:nvPr userDrawn="1"/>
-        </p:nvPicPr>
-        <p:blipFill>
-          <a:blip r:embed="rId7">
-            <a:extLst>
-              <a:ext uri="{28A0092B-C50C-407E-A947-70E740481C1C}">
-                <a14:useLocalDpi xmlns:a14="http://schemas.microsoft.com/office/drawing/2010/main" val="0"/>
-              </a:ext>
-            </a:extLst>
-          </a:blip>
-          <a:stretch>
-            <a:fillRect/>
-          </a:stretch>
-        </p:blipFill>
-        <p:spPr>
-          <a:xfrm>
-            <a:off x="8055354" y="6489700"/>
-            <a:ext cx="1051200" cy="351964"/>
-          </a:xfrm>
-          <a:prstGeom prst="rect">
-            <a:avLst/>
-          </a:prstGeom>
-        </p:spPr>
-      </p:pic>
       <p:sp>
         <p:nvSpPr>
           <p:cNvPr id="2" name="Dia számának helye 1"/>
@@ -5092,7 +4890,7 @@
           <p:nvPr userDrawn="1"/>
         </p:nvPicPr>
         <p:blipFill>
-          <a:blip r:embed="rId8">
+          <a:blip r:embed="rId7">
             <a:extLst>
               <a:ext uri="{28A0092B-C50C-407E-A947-70E740481C1C}">
                 <a14:useLocalDpi xmlns:a14="http://schemas.microsoft.com/office/drawing/2010/main" val="0"/>
@@ -5123,6 +4921,54 @@
           </a:extLst>
         </p:spPr>
       </p:pic>
+      <p:pic>
+        <p:nvPicPr>
+          <p:cNvPr id="3" name="Picture 4">
+            <a:extLst>
+              <a:ext uri="{FF2B5EF4-FFF2-40B4-BE49-F238E27FC236}">
+                <a16:creationId xmlns:a16="http://schemas.microsoft.com/office/drawing/2014/main" id="{B42A16EE-632F-4C10-9502-F66060EBDB8E}"/>
+              </a:ext>
+            </a:extLst>
+          </p:cNvPr>
+          <p:cNvPicPr>
+            <a:picLocks noChangeArrowheads="1"/>
+          </p:cNvPicPr>
+          <p:nvPr userDrawn="1"/>
+        </p:nvPicPr>
+        <p:blipFill>
+          <a:blip r:embed="rId8">
+            <a:biLevel thresh="50000"/>
+            <a:extLst>
+              <a:ext uri="{28A0092B-C50C-407E-A947-70E740481C1C}">
+                <a14:useLocalDpi xmlns:a14="http://schemas.microsoft.com/office/drawing/2010/main" val="0"/>
+              </a:ext>
+            </a:extLst>
+          </a:blip>
+          <a:srcRect/>
+          <a:stretch>
+            <a:fillRect/>
+          </a:stretch>
+        </p:blipFill>
+        <p:spPr bwMode="auto">
+          <a:xfrm>
+            <a:off x="8543091" y="6478485"/>
+            <a:ext cx="622509" cy="353659"/>
+          </a:xfrm>
+          <a:prstGeom prst="rect">
+            <a:avLst/>
+          </a:prstGeom>
+          <a:noFill/>
+          <a:extLst>
+            <a:ext uri="{909E8E84-426E-40DD-AFC4-6F175D3DCCD1}">
+              <a14:hiddenFill xmlns:a14="http://schemas.microsoft.com/office/drawing/2010/main">
+                <a:solidFill>
+                  <a:srgbClr val="FFFFFF"/>
+                </a:solidFill>
+              </a14:hiddenFill>
+            </a:ext>
+          </a:extLst>
+        </p:spPr>
+      </p:pic>
     </p:spTree>
     <p:extLst>
       <p:ext uri="{BB962C8B-B14F-4D97-AF65-F5344CB8AC3E}">
@@ -5138,13 +4984,6 @@
     <p:sldLayoutId id="2147483658" r:id="rId4"/>
     <p:sldLayoutId id="2147483659" r:id="rId5"/>
   </p:sldLayoutIdLst>
-  <p:timing>
-    <p:tnLst>
-      <p:par>
-        <p:cTn id="1" dur="indefinite" restart="never" nodeType="tmRoot"/>
-      </p:par>
-    </p:tnLst>
-  </p:timing>
   <p:hf hdr="0" ftr="0" dt="0"/>
   <p:txStyles>
     <p:titleStyle>
@@ -5576,23 +5415,23 @@
           <a:lstStyle/>
           <a:p>
             <a:r>
-              <a:rPr lang="hu-HU" dirty="0" err="1" smtClean="0"/>
+              <a:rPr lang="hu-HU" dirty="0" err="1"/>
               <a:t>Power</a:t>
             </a:r>
             <a:r>
-              <a:rPr lang="en-US" dirty="0" smtClean="0"/>
+              <a:rPr lang="en-US" dirty="0"/>
               <a:t>P</a:t>
             </a:r>
             <a:r>
-              <a:rPr lang="hu-HU" dirty="0" err="1" smtClean="0"/>
+              <a:rPr lang="hu-HU" dirty="0" err="1"/>
               <a:t>oint</a:t>
             </a:r>
             <a:r>
-              <a:rPr lang="hu-HU" dirty="0" smtClean="0"/>
+              <a:rPr lang="hu-HU" dirty="0"/>
               <a:t> </a:t>
             </a:r>
             <a:r>
-              <a:rPr lang="hu-HU" dirty="0" err="1" smtClean="0"/>
+              <a:rPr lang="hu-HU" dirty="0" err="1"/>
               <a:t>Template</a:t>
             </a:r>
             <a:endParaRPr lang="en-US" dirty="0"/>
@@ -5615,46 +5454,22 @@
           <a:lstStyle/>
           <a:p>
             <a:r>
-              <a:rPr lang="hu-HU" b="1" dirty="0" smtClean="0"/>
+              <a:rPr lang="hu-HU" b="1" dirty="0"/>
               <a:t>Előadó Elemér</a:t>
             </a:r>
             <a:r>
-              <a:rPr lang="en-GB" b="1" dirty="0" smtClean="0"/>
+              <a:rPr lang="en-GB" b="1" dirty="0"/>
               <a:t>,</a:t>
             </a:r>
             <a:r>
-              <a:rPr lang="en-GB" dirty="0" smtClean="0"/>
+              <a:rPr lang="en-GB" dirty="0"/>
               <a:t> </a:t>
             </a:r>
             <a:r>
-              <a:rPr lang="hu-HU" dirty="0" smtClean="0"/>
+              <a:rPr lang="hu-HU" dirty="0"/>
               <a:t>Társszerző Tamás</a:t>
             </a:r>
             <a:endParaRPr lang="en-US" b="1" dirty="0"/>
-          </a:p>
-        </p:txBody>
-      </p:sp>
-      <p:sp>
-        <p:nvSpPr>
-          <p:cNvPr id="3" name="Dia számának helye 2"/>
-          <p:cNvSpPr>
-            <a:spLocks noGrp="1"/>
-          </p:cNvSpPr>
-          <p:nvPr>
-            <p:ph type="sldNum" sz="quarter" idx="10"/>
-          </p:nvPr>
-        </p:nvSpPr>
-        <p:spPr/>
-        <p:txBody>
-          <a:bodyPr/>
-          <a:lstStyle/>
-          <a:p>
-            <a:fld id="{A7C85712-A09B-4560-9D1E-08050AA835BB}" type="slidenum">
-              <a:rPr lang="hu-HU" smtClean="0"/>
-              <a:pPr/>
-              <a:t>1</a:t>
-            </a:fld>
-            <a:endParaRPr lang="hu-HU" dirty="0"/>
           </a:p>
         </p:txBody>
       </p:sp>
@@ -5668,13 +5483,6 @@
   <p:clrMapOvr>
     <a:masterClrMapping/>
   </p:clrMapOvr>
-  <p:timing>
-    <p:tnLst>
-      <p:par>
-        <p:cTn id="1" dur="indefinite" restart="never" nodeType="tmRoot"/>
-      </p:par>
-    </p:tnLst>
-  </p:timing>
 </p:sld>
 </file>
 
@@ -5711,15 +5519,15 @@
           <a:lstStyle/>
           <a:p>
             <a:r>
-              <a:rPr lang="hu-HU" dirty="0" err="1" smtClean="0"/>
+              <a:rPr lang="hu-HU" dirty="0" err="1"/>
               <a:t>Example</a:t>
             </a:r>
             <a:r>
-              <a:rPr lang="hu-HU" dirty="0" smtClean="0"/>
+              <a:rPr lang="hu-HU" dirty="0"/>
               <a:t> </a:t>
             </a:r>
             <a:r>
-              <a:rPr lang="hu-HU" dirty="0" err="1" smtClean="0"/>
+              <a:rPr lang="hu-HU" dirty="0" err="1"/>
               <a:t>Slide</a:t>
             </a:r>
             <a:endParaRPr lang="en-US" dirty="0"/>
@@ -5745,23 +5553,17 @@
               <a:rPr lang="en-US" dirty="0">
                 <a:hlinkClick r:id="rId2"/>
               </a:rPr>
-              <a:t>http://xkcd.com/303</a:t>
-            </a:r>
-            <a:r>
-              <a:rPr lang="en-US" dirty="0" smtClean="0">
-                <a:hlinkClick r:id="rId2"/>
-              </a:rPr>
-              <a:t>/</a:t>
-            </a:r>
-            <a:endParaRPr lang="hu-HU" dirty="0" smtClean="0"/>
-          </a:p>
-          <a:p>
-            <a:r>
-              <a:rPr lang="hu-HU" dirty="0" smtClean="0"/>
+              <a:t>http://xkcd.com/303/</a:t>
+            </a:r>
+            <a:endParaRPr lang="hu-HU" dirty="0"/>
+          </a:p>
+          <a:p>
+            <a:r>
+              <a:rPr lang="hu-HU" dirty="0"/>
               <a:t>More </a:t>
             </a:r>
             <a:r>
-              <a:rPr lang="hu-HU" dirty="0" err="1" smtClean="0"/>
+              <a:rPr lang="hu-HU" dirty="0" err="1"/>
               <a:t>items</a:t>
             </a:r>
             <a:endParaRPr lang="en-US" dirty="0"/>
@@ -5919,13 +5721,6 @@
   <p:clrMapOvr>
     <a:masterClrMapping/>
   </p:clrMapOvr>
-  <p:timing>
-    <p:tnLst>
-      <p:par>
-        <p:cTn id="1" dur="indefinite" restart="never" nodeType="tmRoot"/>
-      </p:par>
-    </p:tnLst>
-  </p:timing>
 </p:sld>
 </file>
 
@@ -5985,15 +5780,15 @@
           <a:lstStyle/>
           <a:p>
             <a:r>
-              <a:rPr lang="hu-HU" dirty="0" err="1" smtClean="0"/>
+              <a:rPr lang="hu-HU" dirty="0" err="1"/>
               <a:t>Choosing</a:t>
             </a:r>
             <a:r>
-              <a:rPr lang="hu-HU" dirty="0" smtClean="0"/>
+              <a:rPr lang="hu-HU" dirty="0"/>
               <a:t> </a:t>
             </a:r>
             <a:r>
-              <a:rPr lang="hu-HU" dirty="0" err="1" smtClean="0"/>
+              <a:rPr lang="hu-HU" dirty="0" err="1"/>
               <a:t>Templates</a:t>
             </a:r>
             <a:endParaRPr lang="en-US" dirty="0"/>
@@ -6085,7 +5880,7 @@
           <a:p>
             <a:pPr algn="ctr"/>
             <a:r>
-              <a:rPr lang="hu-HU" sz="2400" dirty="0" err="1" smtClean="0">
+              <a:rPr lang="hu-HU" sz="2400" dirty="0" err="1">
                 <a:solidFill>
                   <a:schemeClr val="tx2"/>
                 </a:solidFill>
@@ -6093,18 +5888,13 @@
               <a:t>for</a:t>
             </a:r>
             <a:r>
-              <a:rPr lang="hu-HU" sz="2400" dirty="0" smtClean="0">
+              <a:rPr lang="hu-HU" sz="2400" dirty="0">
                 <a:solidFill>
                   <a:schemeClr val="tx2"/>
                 </a:solidFill>
               </a:rPr>
               <a:t> printing</a:t>
             </a:r>
-            <a:endParaRPr lang="hu-HU" sz="2400" dirty="0">
-              <a:solidFill>
-                <a:schemeClr val="tx2"/>
-              </a:solidFill>
-            </a:endParaRPr>
           </a:p>
         </p:txBody>
       </p:sp>
@@ -6169,7 +5959,7 @@
           <a:p>
             <a:pPr algn="ctr"/>
             <a:r>
-              <a:rPr lang="hu-HU" sz="2400" dirty="0" err="1" smtClean="0">
+              <a:rPr lang="hu-HU" sz="2400" dirty="0" err="1">
                 <a:solidFill>
                   <a:schemeClr val="tx2"/>
                 </a:solidFill>
@@ -6177,7 +5967,7 @@
               <a:t>for</a:t>
             </a:r>
             <a:r>
-              <a:rPr lang="hu-HU" sz="2400" dirty="0" smtClean="0">
+              <a:rPr lang="hu-HU" sz="2400" dirty="0">
                 <a:solidFill>
                   <a:schemeClr val="tx2"/>
                 </a:solidFill>
@@ -6185,7 +5975,7 @@
               <a:t> </a:t>
             </a:r>
             <a:r>
-              <a:rPr lang="hu-HU" sz="2400" dirty="0" err="1" smtClean="0">
+              <a:rPr lang="hu-HU" sz="2400" dirty="0" err="1">
                 <a:solidFill>
                   <a:schemeClr val="tx2"/>
                 </a:solidFill>
@@ -6210,13 +6000,6 @@
   <p:clrMapOvr>
     <a:masterClrMapping/>
   </p:clrMapOvr>
-  <p:timing>
-    <p:tnLst>
-      <p:par>
-        <p:cTn id="1" dur="indefinite" restart="never" nodeType="tmRoot"/>
-      </p:par>
-    </p:tnLst>
-  </p:timing>
 </p:sld>
 </file>
 

</xml_diff>